<commit_message>
Changed some slide titles to match up to what the presentation will be
</commit_message>
<xml_diff>
--- a/Presentation.pptx
+++ b/Presentation.pptx
@@ -5242,7 +5242,7 @@
           <a:p>
             <a:r>
               <a:rPr lang="en-US" dirty="0" smtClean="0"/>
-              <a:t>Hub Design</a:t>
+              <a:t>Timeline</a:t>
             </a:r>
             <a:endParaRPr lang="en-US" dirty="0"/>
           </a:p>
@@ -5318,7 +5318,7 @@
           <a:p>
             <a:r>
               <a:rPr lang="en-US" dirty="0" smtClean="0"/>
-              <a:t>Node Design</a:t>
+              <a:t>Budget</a:t>
             </a:r>
             <a:endParaRPr lang="en-US" dirty="0"/>
           </a:p>
@@ -5394,30 +5394,7 @@
           <a:p>
             <a:r>
               <a:rPr lang="en-US" dirty="0" smtClean="0"/>
-              <a:t>FAQs</a:t>
-            </a:r>
-            <a:endParaRPr lang="en-US" dirty="0"/>
-          </a:p>
-        </p:txBody>
-      </p:sp>
-      <p:sp>
-        <p:nvSpPr>
-          <p:cNvPr id="3" name="Content Placeholder 2"/>
-          <p:cNvSpPr>
-            <a:spLocks noGrp="1"/>
-          </p:cNvSpPr>
-          <p:nvPr>
-            <p:ph idx="1"/>
-          </p:nvPr>
-        </p:nvSpPr>
-        <p:spPr/>
-        <p:txBody>
-          <a:bodyPr/>
-          <a:lstStyle/>
-          <a:p>
-            <a:r>
-              <a:rPr lang="en-US" dirty="0" smtClean="0"/>
-              <a:t>Doth we even need this</a:t>
+              <a:t>Questions?</a:t>
             </a:r>
             <a:endParaRPr lang="en-US" dirty="0"/>
           </a:p>

</xml_diff>

<commit_message>
Updated expenses and Presentation
</commit_message>
<xml_diff>
--- a/Presentation.pptx
+++ b/Presentation.pptx
@@ -333,7 +333,7 @@
           <a:p>
             <a:fld id="{651A0C47-018D-4460-B945-BFF7981B6CA6}" type="datetimeFigureOut">
               <a:rPr lang="en-US" smtClean="0"/>
-              <a:t>8/13/15</a:t>
+              <a:t>8/17/15</a:t>
             </a:fld>
             <a:endParaRPr lang="en-US"/>
           </a:p>
@@ -665,7 +665,7 @@
           <a:p>
             <a:fld id="{651A0C47-018D-4460-B945-BFF7981B6CA6}" type="datetimeFigureOut">
               <a:rPr lang="en-US" smtClean="0"/>
-              <a:t>8/13/15</a:t>
+              <a:t>8/17/15</a:t>
             </a:fld>
             <a:endParaRPr lang="en-US"/>
           </a:p>
@@ -997,7 +997,7 @@
           <a:p>
             <a:fld id="{651A0C47-018D-4460-B945-BFF7981B6CA6}" type="datetimeFigureOut">
               <a:rPr lang="en-US" smtClean="0"/>
-              <a:t>8/13/15</a:t>
+              <a:t>8/17/15</a:t>
             </a:fld>
             <a:endParaRPr lang="en-US"/>
           </a:p>
@@ -1329,7 +1329,7 @@
           <a:p>
             <a:fld id="{651A0C47-018D-4460-B945-BFF7981B6CA6}" type="datetimeFigureOut">
               <a:rPr lang="en-US" smtClean="0"/>
-              <a:t>8/13/15</a:t>
+              <a:t>8/17/15</a:t>
             </a:fld>
             <a:endParaRPr lang="en-US"/>
           </a:p>
@@ -2018,7 +2018,7 @@
           <a:p>
             <a:fld id="{651A0C47-018D-4460-B945-BFF7981B6CA6}" type="datetimeFigureOut">
               <a:rPr lang="en-US" smtClean="0"/>
-              <a:t>8/13/15</a:t>
+              <a:t>8/17/15</a:t>
             </a:fld>
             <a:endParaRPr lang="en-US"/>
           </a:p>
@@ -2197,7 +2197,7 @@
           <a:p>
             <a:fld id="{651A0C47-018D-4460-B945-BFF7981B6CA6}" type="datetimeFigureOut">
               <a:rPr lang="en-US" smtClean="0"/>
-              <a:t>8/13/15</a:t>
+              <a:t>8/17/15</a:t>
             </a:fld>
             <a:endParaRPr lang="en-US"/>
           </a:p>
@@ -2371,7 +2371,7 @@
           <a:p>
             <a:fld id="{651A0C47-018D-4460-B945-BFF7981B6CA6}" type="datetimeFigureOut">
               <a:rPr lang="en-US" smtClean="0"/>
-              <a:t>8/13/15</a:t>
+              <a:t>8/17/15</a:t>
             </a:fld>
             <a:endParaRPr lang="en-US"/>
           </a:p>
@@ -2619,7 +2619,7 @@
           <a:p>
             <a:fld id="{651A0C47-018D-4460-B945-BFF7981B6CA6}" type="datetimeFigureOut">
               <a:rPr lang="en-US" smtClean="0"/>
-              <a:t>8/13/15</a:t>
+              <a:t>8/17/15</a:t>
             </a:fld>
             <a:endParaRPr lang="en-US"/>
           </a:p>
@@ -2949,7 +2949,7 @@
           <a:p>
             <a:fld id="{651A0C47-018D-4460-B945-BFF7981B6CA6}" type="datetimeFigureOut">
               <a:rPr lang="en-US" smtClean="0"/>
-              <a:t>8/13/15</a:t>
+              <a:t>8/17/15</a:t>
             </a:fld>
             <a:endParaRPr lang="en-US"/>
           </a:p>
@@ -3241,7 +3241,7 @@
           <a:p>
             <a:fld id="{651A0C47-018D-4460-B945-BFF7981B6CA6}" type="datetimeFigureOut">
               <a:rPr lang="en-US" smtClean="0"/>
-              <a:t>8/13/15</a:t>
+              <a:t>8/17/15</a:t>
             </a:fld>
             <a:endParaRPr lang="en-US"/>
           </a:p>
@@ -3677,7 +3677,7 @@
           <a:p>
             <a:fld id="{651A0C47-018D-4460-B945-BFF7981B6CA6}" type="datetimeFigureOut">
               <a:rPr lang="en-US" smtClean="0"/>
-              <a:t>8/13/15</a:t>
+              <a:t>8/17/15</a:t>
             </a:fld>
             <a:endParaRPr lang="en-US"/>
           </a:p>
@@ -3864,7 +3864,7 @@
           <a:p>
             <a:fld id="{651A0C47-018D-4460-B945-BFF7981B6CA6}" type="datetimeFigureOut">
               <a:rPr lang="en-US" smtClean="0"/>
-              <a:t>8/13/15</a:t>
+              <a:t>8/17/15</a:t>
             </a:fld>
             <a:endParaRPr lang="en-US"/>
           </a:p>
@@ -3954,7 +3954,7 @@
           <a:p>
             <a:fld id="{651A0C47-018D-4460-B945-BFF7981B6CA6}" type="datetimeFigureOut">
               <a:rPr lang="en-US" smtClean="0"/>
-              <a:t>8/13/15</a:t>
+              <a:t>8/17/15</a:t>
             </a:fld>
             <a:endParaRPr lang="en-US"/>
           </a:p>
@@ -4235,7 +4235,7 @@
           <a:p>
             <a:fld id="{651A0C47-018D-4460-B945-BFF7981B6CA6}" type="datetimeFigureOut">
               <a:rPr lang="en-US" smtClean="0"/>
-              <a:t>8/13/15</a:t>
+              <a:t>8/17/15</a:t>
             </a:fld>
             <a:endParaRPr lang="en-US"/>
           </a:p>
@@ -4450,7 +4450,7 @@
           <a:p>
             <a:fld id="{651A0C47-018D-4460-B945-BFF7981B6CA6}" type="datetimeFigureOut">
               <a:rPr lang="en-US" smtClean="0"/>
-              <a:t>8/13/15</a:t>
+              <a:t>8/17/15</a:t>
             </a:fld>
             <a:endParaRPr lang="en-US"/>
           </a:p>
@@ -4961,7 +4961,7 @@
         </p:nvSpPr>
         <p:spPr>
           <a:xfrm>
-            <a:off x="685800" y="3718934"/>
+            <a:off x="685800" y="4319098"/>
             <a:ext cx="7504114" cy="1200329"/>
           </a:xfrm>
           <a:prstGeom prst="rect">
@@ -5018,6 +5018,37 @@
           </a:p>
         </p:txBody>
       </p:sp>
+      <p:pic>
+        <p:nvPicPr>
+          <p:cNvPr id="3" name="Picture 2" descr="Tumblr_kxm7nkGnAo1qaqps8o1_500.jpg"/>
+          <p:cNvPicPr>
+            <a:picLocks noChangeAspect="1"/>
+          </p:cNvPicPr>
+          <p:nvPr/>
+        </p:nvPicPr>
+        <p:blipFill>
+          <a:blip r:embed="rId2">
+            <a:alphaModFix amt="10000"/>
+            <a:extLst>
+              <a:ext uri="{28A0092B-C50C-407E-A947-70E740481C1C}">
+                <a14:useLocalDpi xmlns:a14="http://schemas.microsoft.com/office/drawing/2010/main" val="0"/>
+              </a:ext>
+            </a:extLst>
+          </a:blip>
+          <a:stretch>
+            <a:fillRect/>
+          </a:stretch>
+        </p:blipFill>
+        <p:spPr>
+          <a:xfrm>
+            <a:off x="0" y="0"/>
+            <a:ext cx="9143999" cy="6858000"/>
+          </a:xfrm>
+          <a:prstGeom prst="rect">
+            <a:avLst/>
+          </a:prstGeom>
+        </p:spPr>
+      </p:pic>
     </p:spTree>
     <p:extLst>
       <p:ext uri="{BB962C8B-B14F-4D97-AF65-F5344CB8AC3E}">
@@ -5028,6 +5059,13 @@
   <p:clrMapOvr>
     <a:masterClrMapping/>
   </p:clrMapOvr>
+  <p:timing>
+    <p:tnLst>
+      <p:par>
+        <p:cTn xmlns:p14="http://schemas.microsoft.com/office/powerpoint/2010/main" id="1" dur="indefinite" restart="never" nodeType="tmRoot"/>
+      </p:par>
+    </p:tnLst>
+  </p:timing>
 </p:sld>
 </file>
 
@@ -5065,7 +5103,7 @@
           <a:p>
             <a:r>
               <a:rPr lang="en-US" dirty="0" smtClean="0"/>
-              <a:t>Abstract</a:t>
+              <a:t>Introduction</a:t>
             </a:r>
             <a:endParaRPr lang="en-US" dirty="0"/>
           </a:p>
@@ -5081,7 +5119,12 @@
             <p:ph idx="1"/>
           </p:nvPr>
         </p:nvSpPr>
-        <p:spPr/>
+        <p:spPr>
+          <a:xfrm>
+            <a:off x="685800" y="1869141"/>
+            <a:ext cx="7770813" cy="2031205"/>
+          </a:xfrm>
+        </p:spPr>
         <p:txBody>
           <a:bodyPr/>
           <a:lstStyle/>
@@ -5096,19 +5139,43 @@
               <a:rPr lang="en-US" dirty="0">
                 <a:effectLst/>
               </a:rPr>
-              <a:t> is an energy efficient, convenient new way to control your home lighting.  Connecting to your current home network </a:t>
-            </a:r>
-            <a:r>
-              <a:rPr lang="en-US" dirty="0" err="1">
+              <a:t> is an energy efficient, convenient new way to control your home </a:t>
+            </a:r>
+            <a:r>
+              <a:rPr lang="en-US" dirty="0" smtClean="0">
                 <a:effectLst/>
               </a:rPr>
-              <a:t>Nosferatu</a:t>
+              <a:t>lighting.  Bringing </a:t>
             </a:r>
             <a:r>
               <a:rPr lang="en-US" dirty="0">
                 <a:effectLst/>
               </a:rPr>
-              <a:t> will be able to automatically control the lights in your house. Bringing Wi-Fi and motion sensors to your light switches allows you to set schedules and rules for managing your home lighting, saving money, energy and time.</a:t>
+              <a:t>Wi-Fi and motion sensors to your light switches allows you to set schedules and rules </a:t>
+            </a:r>
+            <a:r>
+              <a:rPr lang="en-US" dirty="0" smtClean="0">
+                <a:effectLst/>
+              </a:rPr>
+              <a:t>to manage </a:t>
+            </a:r>
+            <a:r>
+              <a:rPr lang="en-US" dirty="0">
+                <a:effectLst/>
+              </a:rPr>
+              <a:t>your home lighting</a:t>
+            </a:r>
+            <a:r>
+              <a:rPr lang="en-US" dirty="0" smtClean="0">
+                <a:effectLst/>
+              </a:rPr>
+              <a:t>, as well as save </a:t>
+            </a:r>
+            <a:r>
+              <a:rPr lang="en-US" dirty="0">
+                <a:effectLst/>
+              </a:rPr>
+              <a:t>money, energy and time.</a:t>
             </a:r>
           </a:p>
           <a:p>
@@ -5119,6 +5186,36 @@
           </a:p>
         </p:txBody>
       </p:sp>
+      <p:pic>
+        <p:nvPicPr>
+          <p:cNvPr id="4" name="Picture 3" descr="tumblr_lp1w7deZBC1qjdk2k.gif"/>
+          <p:cNvPicPr>
+            <a:picLocks noChangeAspect="1"/>
+          </p:cNvPicPr>
+          <p:nvPr/>
+        </p:nvPicPr>
+        <p:blipFill>
+          <a:blip r:embed="rId2">
+            <a:extLst>
+              <a:ext uri="{28A0092B-C50C-407E-A947-70E740481C1C}">
+                <a14:useLocalDpi xmlns:a14="http://schemas.microsoft.com/office/drawing/2010/main" val="0"/>
+              </a:ext>
+            </a:extLst>
+          </a:blip>
+          <a:stretch>
+            <a:fillRect/>
+          </a:stretch>
+        </p:blipFill>
+        <p:spPr>
+          <a:xfrm>
+            <a:off x="2617662" y="4042883"/>
+            <a:ext cx="3550691" cy="2364760"/>
+          </a:xfrm>
+          <a:prstGeom prst="rect">
+            <a:avLst/>
+          </a:prstGeom>
+        </p:spPr>
+      </p:pic>
     </p:spTree>
     <p:extLst>
       <p:ext uri="{BB962C8B-B14F-4D97-AF65-F5344CB8AC3E}">
@@ -5129,6 +5226,13 @@
   <p:clrMapOvr>
     <a:masterClrMapping/>
   </p:clrMapOvr>
+  <p:timing>
+    <p:tnLst>
+      <p:par>
+        <p:cTn xmlns:p14="http://schemas.microsoft.com/office/powerpoint/2010/main" id="1" dur="indefinite" restart="never" nodeType="tmRoot"/>
+      </p:par>
+    </p:tnLst>
+  </p:timing>
 </p:sld>
 </file>
 
@@ -5205,6 +5309,13 @@
   <p:clrMapOvr>
     <a:masterClrMapping/>
   </p:clrMapOvr>
+  <p:timing>
+    <p:tnLst>
+      <p:par>
+        <p:cTn xmlns:p14="http://schemas.microsoft.com/office/powerpoint/2010/main" id="1" dur="indefinite" restart="never" nodeType="tmRoot"/>
+      </p:par>
+    </p:tnLst>
+  </p:timing>
 </p:sld>
 </file>
 
@@ -5265,7 +5376,7 @@
           <a:p>
             <a:r>
               <a:rPr lang="en-US" dirty="0" smtClean="0"/>
-              <a:t>Server software slide</a:t>
+              <a:t>Gantt Chart  / Tasks</a:t>
             </a:r>
             <a:endParaRPr lang="en-US" dirty="0"/>
           </a:p>
@@ -5281,6 +5392,13 @@
   <p:clrMapOvr>
     <a:masterClrMapping/>
   </p:clrMapOvr>
+  <p:timing>
+    <p:tnLst>
+      <p:par>
+        <p:cTn xmlns:p14="http://schemas.microsoft.com/office/powerpoint/2010/main" id="1" dur="indefinite" restart="never" nodeType="tmRoot"/>
+      </p:par>
+    </p:tnLst>
+  </p:timing>
 </p:sld>
 </file>
 
@@ -5324,29 +5442,1450 @@
           </a:p>
         </p:txBody>
       </p:sp>
-      <p:sp>
-        <p:nvSpPr>
-          <p:cNvPr id="3" name="Content Placeholder 2"/>
-          <p:cNvSpPr>
-            <a:spLocks noGrp="1"/>
-          </p:cNvSpPr>
-          <p:nvPr>
-            <p:ph idx="1"/>
-          </p:nvPr>
-        </p:nvSpPr>
-        <p:spPr/>
-        <p:txBody>
-          <a:bodyPr/>
-          <a:lstStyle/>
-          <a:p>
-            <a:r>
-              <a:rPr lang="en-US" dirty="0" smtClean="0"/>
-              <a:t>Node circuit diagram</a:t>
-            </a:r>
-            <a:endParaRPr lang="en-US" dirty="0"/>
-          </a:p>
-        </p:txBody>
-      </p:sp>
+      <p:graphicFrame>
+        <p:nvGraphicFramePr>
+          <p:cNvPr id="4" name="Table 3"/>
+          <p:cNvGraphicFramePr>
+            <a:graphicFrameLocks noGrp="1"/>
+          </p:cNvGraphicFramePr>
+          <p:nvPr>
+            <p:extLst>
+              <p:ext uri="{D42A27DB-BD31-4B8C-83A1-F6EECF244321}">
+                <p14:modId xmlns:p14="http://schemas.microsoft.com/office/powerpoint/2010/main" val="86649516"/>
+              </p:ext>
+            </p:extLst>
+          </p:nvPr>
+        </p:nvGraphicFramePr>
+        <p:xfrm>
+          <a:off x="685800" y="1705452"/>
+          <a:ext cx="7770813" cy="3788722"/>
+        </p:xfrm>
+        <a:graphic>
+          <a:graphicData uri="http://schemas.openxmlformats.org/drawingml/2006/table">
+            <a:tbl>
+              <a:tblPr>
+                <a:tableStyleId>{3C2FFA5D-87B4-456A-9821-1D502468CF0F}</a:tableStyleId>
+              </a:tblPr>
+              <a:tblGrid>
+                <a:gridCol w="1501806"/>
+                <a:gridCol w="2466269"/>
+                <a:gridCol w="1446694"/>
+                <a:gridCol w="2356044"/>
+              </a:tblGrid>
+              <a:tr h="342561">
+                <a:tc>
+                  <a:txBody>
+                    <a:bodyPr/>
+                    <a:lstStyle/>
+                    <a:p>
+                      <a:pPr algn="l" fontAlgn="b"/>
+                      <a:r>
+                        <a:rPr lang="en-US" sz="1500" u="none" strike="noStrike">
+                          <a:effectLst/>
+                        </a:rPr>
+                        <a:t>Part List</a:t>
+                      </a:r>
+                      <a:endParaRPr lang="en-US" sz="1500" b="1" i="0" u="none" strike="noStrike">
+                        <a:solidFill>
+                          <a:srgbClr val="44546A"/>
+                        </a:solidFill>
+                        <a:effectLst/>
+                        <a:latin typeface="Calibri"/>
+                      </a:endParaRPr>
+                    </a:p>
+                  </a:txBody>
+                  <a:tcPr marL="12700" marR="12700" marT="12700" marB="0" anchor="b"/>
+                </a:tc>
+                <a:tc>
+                  <a:txBody>
+                    <a:bodyPr/>
+                    <a:lstStyle/>
+                    <a:p>
+                      <a:pPr algn="l" fontAlgn="b"/>
+                      <a:r>
+                        <a:rPr lang="en-US" sz="1500" u="none" strike="noStrike" dirty="0">
+                          <a:effectLst/>
+                        </a:rPr>
+                        <a:t>Cost Estimate Per Part</a:t>
+                      </a:r>
+                      <a:endParaRPr lang="en-US" sz="1500" b="1" i="0" u="none" strike="noStrike" dirty="0">
+                        <a:solidFill>
+                          <a:srgbClr val="44546A"/>
+                        </a:solidFill>
+                        <a:effectLst/>
+                        <a:latin typeface="Calibri"/>
+                      </a:endParaRPr>
+                    </a:p>
+                  </a:txBody>
+                  <a:tcPr marL="12700" marR="12700" marT="12700" marB="0" anchor="b"/>
+                </a:tc>
+                <a:tc>
+                  <a:txBody>
+                    <a:bodyPr/>
+                    <a:lstStyle/>
+                    <a:p>
+                      <a:pPr algn="l" fontAlgn="b"/>
+                      <a:r>
+                        <a:rPr lang="en-US" sz="1500" u="none" strike="noStrike">
+                          <a:effectLst/>
+                        </a:rPr>
+                        <a:t>Quantity</a:t>
+                      </a:r>
+                      <a:endParaRPr lang="en-US" sz="1500" b="1" i="0" u="none" strike="noStrike">
+                        <a:solidFill>
+                          <a:srgbClr val="44546A"/>
+                        </a:solidFill>
+                        <a:effectLst/>
+                        <a:latin typeface="Calibri"/>
+                      </a:endParaRPr>
+                    </a:p>
+                  </a:txBody>
+                  <a:tcPr marL="12700" marR="12700" marT="12700" marB="0" anchor="b"/>
+                </a:tc>
+                <a:tc>
+                  <a:txBody>
+                    <a:bodyPr/>
+                    <a:lstStyle/>
+                    <a:p>
+                      <a:pPr algn="r" fontAlgn="b"/>
+                      <a:r>
+                        <a:rPr lang="en-US" sz="1500" u="none" strike="noStrike">
+                          <a:effectLst/>
+                        </a:rPr>
+                        <a:t>Cost Estimate(-tax)</a:t>
+                      </a:r>
+                      <a:endParaRPr lang="en-US" sz="1500" b="1" i="0" u="none" strike="noStrike">
+                        <a:solidFill>
+                          <a:srgbClr val="44546A"/>
+                        </a:solidFill>
+                        <a:effectLst/>
+                        <a:latin typeface="Calibri"/>
+                      </a:endParaRPr>
+                    </a:p>
+                  </a:txBody>
+                  <a:tcPr marL="12700" marR="12700" marT="12700" marB="0" anchor="b"/>
+                </a:tc>
+              </a:tr>
+              <a:tr h="256921">
+                <a:tc>
+                  <a:txBody>
+                    <a:bodyPr/>
+                    <a:lstStyle/>
+                    <a:p>
+                      <a:pPr algn="l" fontAlgn="ctr"/>
+                      <a:r>
+                        <a:rPr lang="en-US" sz="1100" u="none" strike="noStrike">
+                          <a:effectLst/>
+                        </a:rPr>
+                        <a:t>Arduino</a:t>
+                      </a:r>
+                      <a:endParaRPr lang="en-US" sz="1100" b="0" i="0" u="none" strike="noStrike">
+                        <a:solidFill>
+                          <a:srgbClr val="000000"/>
+                        </a:solidFill>
+                        <a:effectLst/>
+                        <a:latin typeface="Calibri"/>
+                      </a:endParaRPr>
+                    </a:p>
+                  </a:txBody>
+                  <a:tcPr marL="12700" marR="12700" marT="12700" marB="0" anchor="ctr"/>
+                </a:tc>
+                <a:tc>
+                  <a:txBody>
+                    <a:bodyPr/>
+                    <a:lstStyle/>
+                    <a:p>
+                      <a:pPr algn="ctr" fontAlgn="ctr"/>
+                      <a:r>
+                        <a:rPr lang="en-US" sz="1100" u="none" strike="noStrike">
+                          <a:effectLst/>
+                        </a:rPr>
+                        <a:t>$10.00</a:t>
+                      </a:r>
+                      <a:endParaRPr lang="en-US" sz="1100" b="0" i="0" u="none" strike="noStrike">
+                        <a:solidFill>
+                          <a:srgbClr val="000000"/>
+                        </a:solidFill>
+                        <a:effectLst/>
+                        <a:latin typeface="Calibri"/>
+                      </a:endParaRPr>
+                    </a:p>
+                  </a:txBody>
+                  <a:tcPr marL="12700" marR="12700" marT="12700" marB="0" anchor="ctr"/>
+                </a:tc>
+                <a:tc>
+                  <a:txBody>
+                    <a:bodyPr/>
+                    <a:lstStyle/>
+                    <a:p>
+                      <a:pPr algn="ctr" fontAlgn="ctr"/>
+                      <a:r>
+                        <a:rPr lang="en-US" sz="1100" u="none" strike="noStrike">
+                          <a:effectLst/>
+                        </a:rPr>
+                        <a:t>4</a:t>
+                      </a:r>
+                      <a:endParaRPr lang="en-US" sz="1100" b="0" i="0" u="none" strike="noStrike">
+                        <a:solidFill>
+                          <a:srgbClr val="000000"/>
+                        </a:solidFill>
+                        <a:effectLst/>
+                        <a:latin typeface="Calibri"/>
+                      </a:endParaRPr>
+                    </a:p>
+                  </a:txBody>
+                  <a:tcPr marL="12700" marR="12700" marT="12700" marB="0" anchor="ctr"/>
+                </a:tc>
+                <a:tc>
+                  <a:txBody>
+                    <a:bodyPr/>
+                    <a:lstStyle/>
+                    <a:p>
+                      <a:pPr algn="r" fontAlgn="ctr"/>
+                      <a:r>
+                        <a:rPr lang="en-US" sz="1100" u="none" strike="noStrike">
+                          <a:effectLst/>
+                        </a:rPr>
+                        <a:t>$40.00</a:t>
+                      </a:r>
+                      <a:endParaRPr lang="en-US" sz="1100" b="0" i="0" u="none" strike="noStrike">
+                        <a:solidFill>
+                          <a:srgbClr val="000000"/>
+                        </a:solidFill>
+                        <a:effectLst/>
+                        <a:latin typeface="Calibri"/>
+                      </a:endParaRPr>
+                    </a:p>
+                  </a:txBody>
+                  <a:tcPr marL="12700" marR="12700" marT="12700" marB="0" anchor="ctr"/>
+                </a:tc>
+              </a:tr>
+              <a:tr h="243218">
+                <a:tc>
+                  <a:txBody>
+                    <a:bodyPr/>
+                    <a:lstStyle/>
+                    <a:p>
+                      <a:pPr algn="l" fontAlgn="b"/>
+                      <a:r>
+                        <a:rPr lang="en-US" sz="1100" u="none" strike="noStrike">
+                          <a:effectLst/>
+                        </a:rPr>
+                        <a:t>Motion Sensor</a:t>
+                      </a:r>
+                      <a:endParaRPr lang="en-US" sz="1100" b="0" i="0" u="none" strike="noStrike">
+                        <a:solidFill>
+                          <a:srgbClr val="000000"/>
+                        </a:solidFill>
+                        <a:effectLst/>
+                        <a:latin typeface="Calibri"/>
+                      </a:endParaRPr>
+                    </a:p>
+                  </a:txBody>
+                  <a:tcPr marL="12700" marR="12700" marT="12700" marB="0" anchor="b"/>
+                </a:tc>
+                <a:tc>
+                  <a:txBody>
+                    <a:bodyPr/>
+                    <a:lstStyle/>
+                    <a:p>
+                      <a:pPr algn="ctr" fontAlgn="ctr"/>
+                      <a:r>
+                        <a:rPr lang="en-US" sz="1100" u="none" strike="noStrike">
+                          <a:effectLst/>
+                        </a:rPr>
+                        <a:t>$10.00</a:t>
+                      </a:r>
+                      <a:endParaRPr lang="en-US" sz="1100" b="0" i="0" u="none" strike="noStrike">
+                        <a:solidFill>
+                          <a:srgbClr val="000000"/>
+                        </a:solidFill>
+                        <a:effectLst/>
+                        <a:latin typeface="Calibri"/>
+                      </a:endParaRPr>
+                    </a:p>
+                  </a:txBody>
+                  <a:tcPr marL="12700" marR="12700" marT="12700" marB="0" anchor="ctr"/>
+                </a:tc>
+                <a:tc>
+                  <a:txBody>
+                    <a:bodyPr/>
+                    <a:lstStyle/>
+                    <a:p>
+                      <a:pPr algn="ctr" fontAlgn="ctr"/>
+                      <a:r>
+                        <a:rPr lang="en-US" sz="1100" u="none" strike="noStrike">
+                          <a:effectLst/>
+                        </a:rPr>
+                        <a:t>4</a:t>
+                      </a:r>
+                      <a:endParaRPr lang="en-US" sz="1100" b="0" i="0" u="none" strike="noStrike">
+                        <a:solidFill>
+                          <a:srgbClr val="000000"/>
+                        </a:solidFill>
+                        <a:effectLst/>
+                        <a:latin typeface="Calibri"/>
+                      </a:endParaRPr>
+                    </a:p>
+                  </a:txBody>
+                  <a:tcPr marL="12700" marR="12700" marT="12700" marB="0" anchor="ctr"/>
+                </a:tc>
+                <a:tc>
+                  <a:txBody>
+                    <a:bodyPr/>
+                    <a:lstStyle/>
+                    <a:p>
+                      <a:pPr algn="r" fontAlgn="ctr"/>
+                      <a:r>
+                        <a:rPr lang="en-US" sz="1100" u="none" strike="noStrike">
+                          <a:effectLst/>
+                        </a:rPr>
+                        <a:t>$40.00</a:t>
+                      </a:r>
+                      <a:endParaRPr lang="en-US" sz="1100" b="0" i="0" u="none" strike="noStrike">
+                        <a:solidFill>
+                          <a:srgbClr val="000000"/>
+                        </a:solidFill>
+                        <a:effectLst/>
+                        <a:latin typeface="Calibri"/>
+                      </a:endParaRPr>
+                    </a:p>
+                  </a:txBody>
+                  <a:tcPr marL="12700" marR="12700" marT="12700" marB="0" anchor="ctr"/>
+                </a:tc>
+              </a:tr>
+              <a:tr h="243218">
+                <a:tc>
+                  <a:txBody>
+                    <a:bodyPr/>
+                    <a:lstStyle/>
+                    <a:p>
+                      <a:pPr algn="l" fontAlgn="b"/>
+                      <a:r>
+                        <a:rPr lang="en-US" sz="1100" u="none" strike="noStrike">
+                          <a:effectLst/>
+                        </a:rPr>
+                        <a:t>Wifi Module</a:t>
+                      </a:r>
+                      <a:endParaRPr lang="en-US" sz="1100" b="0" i="0" u="none" strike="noStrike">
+                        <a:solidFill>
+                          <a:srgbClr val="000000"/>
+                        </a:solidFill>
+                        <a:effectLst/>
+                        <a:latin typeface="Calibri"/>
+                      </a:endParaRPr>
+                    </a:p>
+                  </a:txBody>
+                  <a:tcPr marL="12700" marR="12700" marT="12700" marB="0" anchor="b"/>
+                </a:tc>
+                <a:tc>
+                  <a:txBody>
+                    <a:bodyPr/>
+                    <a:lstStyle/>
+                    <a:p>
+                      <a:pPr algn="ctr" fontAlgn="ctr"/>
+                      <a:r>
+                        <a:rPr lang="en-US" sz="1100" u="none" strike="noStrike">
+                          <a:effectLst/>
+                        </a:rPr>
+                        <a:t>$7.00</a:t>
+                      </a:r>
+                      <a:endParaRPr lang="en-US" sz="1100" b="0" i="0" u="none" strike="noStrike">
+                        <a:solidFill>
+                          <a:srgbClr val="000000"/>
+                        </a:solidFill>
+                        <a:effectLst/>
+                        <a:latin typeface="Calibri"/>
+                      </a:endParaRPr>
+                    </a:p>
+                  </a:txBody>
+                  <a:tcPr marL="12700" marR="12700" marT="12700" marB="0" anchor="ctr"/>
+                </a:tc>
+                <a:tc>
+                  <a:txBody>
+                    <a:bodyPr/>
+                    <a:lstStyle/>
+                    <a:p>
+                      <a:pPr algn="ctr" fontAlgn="ctr"/>
+                      <a:r>
+                        <a:rPr lang="en-US" sz="1100" u="none" strike="noStrike">
+                          <a:effectLst/>
+                        </a:rPr>
+                        <a:t>4</a:t>
+                      </a:r>
+                      <a:endParaRPr lang="en-US" sz="1100" b="0" i="0" u="none" strike="noStrike">
+                        <a:solidFill>
+                          <a:srgbClr val="000000"/>
+                        </a:solidFill>
+                        <a:effectLst/>
+                        <a:latin typeface="Calibri"/>
+                      </a:endParaRPr>
+                    </a:p>
+                  </a:txBody>
+                  <a:tcPr marL="12700" marR="12700" marT="12700" marB="0" anchor="ctr"/>
+                </a:tc>
+                <a:tc>
+                  <a:txBody>
+                    <a:bodyPr/>
+                    <a:lstStyle/>
+                    <a:p>
+                      <a:pPr algn="r" fontAlgn="ctr"/>
+                      <a:r>
+                        <a:rPr lang="en-US" sz="1100" u="none" strike="noStrike">
+                          <a:effectLst/>
+                        </a:rPr>
+                        <a:t>$28.00</a:t>
+                      </a:r>
+                      <a:endParaRPr lang="en-US" sz="1100" b="0" i="0" u="none" strike="noStrike">
+                        <a:solidFill>
+                          <a:srgbClr val="000000"/>
+                        </a:solidFill>
+                        <a:effectLst/>
+                        <a:latin typeface="Calibri"/>
+                      </a:endParaRPr>
+                    </a:p>
+                  </a:txBody>
+                  <a:tcPr marL="12700" marR="12700" marT="12700" marB="0" anchor="ctr"/>
+                </a:tc>
+              </a:tr>
+              <a:tr h="243218">
+                <a:tc>
+                  <a:txBody>
+                    <a:bodyPr/>
+                    <a:lstStyle/>
+                    <a:p>
+                      <a:pPr algn="l" fontAlgn="b"/>
+                      <a:r>
+                        <a:rPr lang="en-US" sz="1100" u="none" strike="noStrike">
+                          <a:effectLst/>
+                        </a:rPr>
+                        <a:t>Relay</a:t>
+                      </a:r>
+                      <a:endParaRPr lang="en-US" sz="1100" b="0" i="0" u="none" strike="noStrike">
+                        <a:solidFill>
+                          <a:srgbClr val="000000"/>
+                        </a:solidFill>
+                        <a:effectLst/>
+                        <a:latin typeface="Calibri"/>
+                      </a:endParaRPr>
+                    </a:p>
+                  </a:txBody>
+                  <a:tcPr marL="12700" marR="12700" marT="12700" marB="0" anchor="b"/>
+                </a:tc>
+                <a:tc>
+                  <a:txBody>
+                    <a:bodyPr/>
+                    <a:lstStyle/>
+                    <a:p>
+                      <a:pPr algn="ctr" fontAlgn="ctr"/>
+                      <a:r>
+                        <a:rPr lang="en-US" sz="1100" u="none" strike="noStrike" dirty="0">
+                          <a:effectLst/>
+                        </a:rPr>
+                        <a:t>$8.00</a:t>
+                      </a:r>
+                      <a:endParaRPr lang="en-US" sz="1100" b="0" i="0" u="none" strike="noStrike" dirty="0">
+                        <a:solidFill>
+                          <a:srgbClr val="000000"/>
+                        </a:solidFill>
+                        <a:effectLst/>
+                        <a:latin typeface="Calibri"/>
+                      </a:endParaRPr>
+                    </a:p>
+                  </a:txBody>
+                  <a:tcPr marL="12700" marR="12700" marT="12700" marB="0" anchor="ctr"/>
+                </a:tc>
+                <a:tc>
+                  <a:txBody>
+                    <a:bodyPr/>
+                    <a:lstStyle/>
+                    <a:p>
+                      <a:pPr algn="ctr" fontAlgn="ctr"/>
+                      <a:r>
+                        <a:rPr lang="en-US" sz="1100" u="none" strike="noStrike">
+                          <a:effectLst/>
+                        </a:rPr>
+                        <a:t>4</a:t>
+                      </a:r>
+                      <a:endParaRPr lang="en-US" sz="1100" b="0" i="0" u="none" strike="noStrike">
+                        <a:solidFill>
+                          <a:srgbClr val="000000"/>
+                        </a:solidFill>
+                        <a:effectLst/>
+                        <a:latin typeface="Calibri"/>
+                      </a:endParaRPr>
+                    </a:p>
+                  </a:txBody>
+                  <a:tcPr marL="12700" marR="12700" marT="12700" marB="0" anchor="ctr"/>
+                </a:tc>
+                <a:tc>
+                  <a:txBody>
+                    <a:bodyPr/>
+                    <a:lstStyle/>
+                    <a:p>
+                      <a:pPr algn="r" fontAlgn="ctr"/>
+                      <a:r>
+                        <a:rPr lang="en-US" sz="1100" u="none" strike="noStrike">
+                          <a:effectLst/>
+                        </a:rPr>
+                        <a:t>$32.00</a:t>
+                      </a:r>
+                      <a:endParaRPr lang="en-US" sz="1100" b="0" i="0" u="none" strike="noStrike">
+                        <a:solidFill>
+                          <a:srgbClr val="000000"/>
+                        </a:solidFill>
+                        <a:effectLst/>
+                        <a:latin typeface="Calibri"/>
+                      </a:endParaRPr>
+                    </a:p>
+                  </a:txBody>
+                  <a:tcPr marL="12700" marR="12700" marT="12700" marB="0" anchor="ctr"/>
+                </a:tc>
+              </a:tr>
+              <a:tr h="243218">
+                <a:tc>
+                  <a:txBody>
+                    <a:bodyPr/>
+                    <a:lstStyle/>
+                    <a:p>
+                      <a:pPr algn="l" fontAlgn="b"/>
+                      <a:r>
+                        <a:rPr lang="en-US" sz="1100" u="none" strike="noStrike">
+                          <a:effectLst/>
+                        </a:rPr>
+                        <a:t>Transformer</a:t>
+                      </a:r>
+                      <a:endParaRPr lang="en-US" sz="1100" b="0" i="0" u="none" strike="noStrike">
+                        <a:solidFill>
+                          <a:srgbClr val="000000"/>
+                        </a:solidFill>
+                        <a:effectLst/>
+                        <a:latin typeface="Calibri"/>
+                      </a:endParaRPr>
+                    </a:p>
+                  </a:txBody>
+                  <a:tcPr marL="12700" marR="12700" marT="12700" marB="0" anchor="b"/>
+                </a:tc>
+                <a:tc>
+                  <a:txBody>
+                    <a:bodyPr/>
+                    <a:lstStyle/>
+                    <a:p>
+                      <a:pPr algn="ctr" fontAlgn="ctr"/>
+                      <a:r>
+                        <a:rPr lang="en-US" sz="1100" u="none" strike="noStrike">
+                          <a:effectLst/>
+                        </a:rPr>
+                        <a:t>$7.00</a:t>
+                      </a:r>
+                      <a:endParaRPr lang="en-US" sz="1100" b="0" i="0" u="none" strike="noStrike">
+                        <a:solidFill>
+                          <a:srgbClr val="000000"/>
+                        </a:solidFill>
+                        <a:effectLst/>
+                        <a:latin typeface="Calibri"/>
+                      </a:endParaRPr>
+                    </a:p>
+                  </a:txBody>
+                  <a:tcPr marL="12700" marR="12700" marT="12700" marB="0" anchor="ctr"/>
+                </a:tc>
+                <a:tc>
+                  <a:txBody>
+                    <a:bodyPr/>
+                    <a:lstStyle/>
+                    <a:p>
+                      <a:pPr algn="ctr" fontAlgn="ctr"/>
+                      <a:r>
+                        <a:rPr lang="en-US" sz="1100" u="none" strike="noStrike">
+                          <a:effectLst/>
+                        </a:rPr>
+                        <a:t>4</a:t>
+                      </a:r>
+                      <a:endParaRPr lang="en-US" sz="1100" b="0" i="0" u="none" strike="noStrike">
+                        <a:solidFill>
+                          <a:srgbClr val="000000"/>
+                        </a:solidFill>
+                        <a:effectLst/>
+                        <a:latin typeface="Calibri"/>
+                      </a:endParaRPr>
+                    </a:p>
+                  </a:txBody>
+                  <a:tcPr marL="12700" marR="12700" marT="12700" marB="0" anchor="ctr"/>
+                </a:tc>
+                <a:tc>
+                  <a:txBody>
+                    <a:bodyPr/>
+                    <a:lstStyle/>
+                    <a:p>
+                      <a:pPr algn="r" fontAlgn="ctr"/>
+                      <a:r>
+                        <a:rPr lang="en-US" sz="1100" u="none" strike="noStrike">
+                          <a:effectLst/>
+                        </a:rPr>
+                        <a:t>$28.00</a:t>
+                      </a:r>
+                      <a:endParaRPr lang="en-US" sz="1100" b="0" i="0" u="none" strike="noStrike">
+                        <a:solidFill>
+                          <a:srgbClr val="000000"/>
+                        </a:solidFill>
+                        <a:effectLst/>
+                        <a:latin typeface="Calibri"/>
+                      </a:endParaRPr>
+                    </a:p>
+                  </a:txBody>
+                  <a:tcPr marL="12700" marR="12700" marT="12700" marB="0" anchor="ctr"/>
+                </a:tc>
+              </a:tr>
+              <a:tr h="243218">
+                <a:tc>
+                  <a:txBody>
+                    <a:bodyPr/>
+                    <a:lstStyle/>
+                    <a:p>
+                      <a:pPr algn="l" fontAlgn="b"/>
+                      <a:r>
+                        <a:rPr lang="en-US" sz="1100" u="none" strike="noStrike">
+                          <a:effectLst/>
+                        </a:rPr>
+                        <a:t>Micro SD Card</a:t>
+                      </a:r>
+                      <a:endParaRPr lang="en-US" sz="1100" b="0" i="0" u="none" strike="noStrike">
+                        <a:solidFill>
+                          <a:srgbClr val="000000"/>
+                        </a:solidFill>
+                        <a:effectLst/>
+                        <a:latin typeface="Calibri"/>
+                      </a:endParaRPr>
+                    </a:p>
+                  </a:txBody>
+                  <a:tcPr marL="12700" marR="12700" marT="12700" marB="0" anchor="b"/>
+                </a:tc>
+                <a:tc>
+                  <a:txBody>
+                    <a:bodyPr/>
+                    <a:lstStyle/>
+                    <a:p>
+                      <a:pPr algn="ctr" fontAlgn="ctr"/>
+                      <a:r>
+                        <a:rPr lang="en-US" sz="1100" u="none" strike="noStrike">
+                          <a:effectLst/>
+                        </a:rPr>
+                        <a:t>$13.00</a:t>
+                      </a:r>
+                      <a:endParaRPr lang="en-US" sz="1100" b="0" i="0" u="none" strike="noStrike">
+                        <a:solidFill>
+                          <a:srgbClr val="000000"/>
+                        </a:solidFill>
+                        <a:effectLst/>
+                        <a:latin typeface="Calibri"/>
+                      </a:endParaRPr>
+                    </a:p>
+                  </a:txBody>
+                  <a:tcPr marL="12700" marR="12700" marT="12700" marB="0" anchor="ctr"/>
+                </a:tc>
+                <a:tc>
+                  <a:txBody>
+                    <a:bodyPr/>
+                    <a:lstStyle/>
+                    <a:p>
+                      <a:pPr algn="ctr" fontAlgn="ctr"/>
+                      <a:r>
+                        <a:rPr lang="en-US" sz="1100" u="none" strike="noStrike">
+                          <a:effectLst/>
+                        </a:rPr>
+                        <a:t>1</a:t>
+                      </a:r>
+                      <a:endParaRPr lang="en-US" sz="1100" b="0" i="0" u="none" strike="noStrike">
+                        <a:solidFill>
+                          <a:srgbClr val="000000"/>
+                        </a:solidFill>
+                        <a:effectLst/>
+                        <a:latin typeface="Calibri"/>
+                      </a:endParaRPr>
+                    </a:p>
+                  </a:txBody>
+                  <a:tcPr marL="12700" marR="12700" marT="12700" marB="0" anchor="ctr"/>
+                </a:tc>
+                <a:tc>
+                  <a:txBody>
+                    <a:bodyPr/>
+                    <a:lstStyle/>
+                    <a:p>
+                      <a:pPr algn="r" fontAlgn="ctr"/>
+                      <a:r>
+                        <a:rPr lang="en-US" sz="1100" u="none" strike="noStrike">
+                          <a:effectLst/>
+                        </a:rPr>
+                        <a:t>$13.00</a:t>
+                      </a:r>
+                      <a:endParaRPr lang="en-US" sz="1100" b="0" i="0" u="none" strike="noStrike">
+                        <a:solidFill>
+                          <a:srgbClr val="000000"/>
+                        </a:solidFill>
+                        <a:effectLst/>
+                        <a:latin typeface="Calibri"/>
+                      </a:endParaRPr>
+                    </a:p>
+                  </a:txBody>
+                  <a:tcPr marL="12700" marR="12700" marT="12700" marB="0" anchor="ctr"/>
+                </a:tc>
+              </a:tr>
+              <a:tr h="243218">
+                <a:tc>
+                  <a:txBody>
+                    <a:bodyPr/>
+                    <a:lstStyle/>
+                    <a:p>
+                      <a:pPr algn="l" fontAlgn="b"/>
+                      <a:r>
+                        <a:rPr lang="en-US" sz="1100" u="none" strike="noStrike">
+                          <a:effectLst/>
+                        </a:rPr>
+                        <a:t>Button</a:t>
+                      </a:r>
+                      <a:endParaRPr lang="en-US" sz="1100" b="0" i="0" u="none" strike="noStrike">
+                        <a:solidFill>
+                          <a:srgbClr val="000000"/>
+                        </a:solidFill>
+                        <a:effectLst/>
+                        <a:latin typeface="Calibri"/>
+                      </a:endParaRPr>
+                    </a:p>
+                  </a:txBody>
+                  <a:tcPr marL="12700" marR="12700" marT="12700" marB="0" anchor="b"/>
+                </a:tc>
+                <a:tc>
+                  <a:txBody>
+                    <a:bodyPr/>
+                    <a:lstStyle/>
+                    <a:p>
+                      <a:pPr algn="ctr" fontAlgn="ctr"/>
+                      <a:r>
+                        <a:rPr lang="en-US" sz="1100" u="none" strike="noStrike">
+                          <a:effectLst/>
+                        </a:rPr>
+                        <a:t>$0.50</a:t>
+                      </a:r>
+                      <a:endParaRPr lang="en-US" sz="1100" b="0" i="0" u="none" strike="noStrike">
+                        <a:solidFill>
+                          <a:srgbClr val="000000"/>
+                        </a:solidFill>
+                        <a:effectLst/>
+                        <a:latin typeface="Calibri"/>
+                      </a:endParaRPr>
+                    </a:p>
+                  </a:txBody>
+                  <a:tcPr marL="12700" marR="12700" marT="12700" marB="0" anchor="ctr"/>
+                </a:tc>
+                <a:tc>
+                  <a:txBody>
+                    <a:bodyPr/>
+                    <a:lstStyle/>
+                    <a:p>
+                      <a:pPr algn="ctr" fontAlgn="ctr"/>
+                      <a:r>
+                        <a:rPr lang="en-US" sz="1100" u="none" strike="noStrike">
+                          <a:effectLst/>
+                        </a:rPr>
+                        <a:t>4</a:t>
+                      </a:r>
+                      <a:endParaRPr lang="en-US" sz="1100" b="0" i="0" u="none" strike="noStrike">
+                        <a:solidFill>
+                          <a:srgbClr val="000000"/>
+                        </a:solidFill>
+                        <a:effectLst/>
+                        <a:latin typeface="Calibri"/>
+                      </a:endParaRPr>
+                    </a:p>
+                  </a:txBody>
+                  <a:tcPr marL="12700" marR="12700" marT="12700" marB="0" anchor="ctr"/>
+                </a:tc>
+                <a:tc>
+                  <a:txBody>
+                    <a:bodyPr/>
+                    <a:lstStyle/>
+                    <a:p>
+                      <a:pPr algn="r" fontAlgn="ctr"/>
+                      <a:r>
+                        <a:rPr lang="en-US" sz="1100" u="none" strike="noStrike">
+                          <a:effectLst/>
+                        </a:rPr>
+                        <a:t>$2.00</a:t>
+                      </a:r>
+                      <a:endParaRPr lang="en-US" sz="1100" b="0" i="0" u="none" strike="noStrike">
+                        <a:solidFill>
+                          <a:srgbClr val="000000"/>
+                        </a:solidFill>
+                        <a:effectLst/>
+                        <a:latin typeface="Calibri"/>
+                      </a:endParaRPr>
+                    </a:p>
+                  </a:txBody>
+                  <a:tcPr marL="12700" marR="12700" marT="12700" marB="0" anchor="ctr"/>
+                </a:tc>
+              </a:tr>
+              <a:tr h="243218">
+                <a:tc>
+                  <a:txBody>
+                    <a:bodyPr/>
+                    <a:lstStyle/>
+                    <a:p>
+                      <a:pPr algn="l" fontAlgn="b"/>
+                      <a:r>
+                        <a:rPr lang="en-US" sz="1100" u="none" strike="noStrike">
+                          <a:effectLst/>
+                        </a:rPr>
+                        <a:t>LED</a:t>
+                      </a:r>
+                      <a:endParaRPr lang="en-US" sz="1100" b="0" i="0" u="none" strike="noStrike">
+                        <a:solidFill>
+                          <a:srgbClr val="000000"/>
+                        </a:solidFill>
+                        <a:effectLst/>
+                        <a:latin typeface="Calibri"/>
+                      </a:endParaRPr>
+                    </a:p>
+                  </a:txBody>
+                  <a:tcPr marL="12700" marR="12700" marT="12700" marB="0" anchor="b"/>
+                </a:tc>
+                <a:tc>
+                  <a:txBody>
+                    <a:bodyPr/>
+                    <a:lstStyle/>
+                    <a:p>
+                      <a:pPr algn="ctr" fontAlgn="ctr"/>
+                      <a:r>
+                        <a:rPr lang="en-US" sz="1100" u="none" strike="noStrike">
+                          <a:effectLst/>
+                        </a:rPr>
+                        <a:t>$0.35</a:t>
+                      </a:r>
+                      <a:endParaRPr lang="en-US" sz="1100" b="0" i="0" u="none" strike="noStrike">
+                        <a:solidFill>
+                          <a:srgbClr val="000000"/>
+                        </a:solidFill>
+                        <a:effectLst/>
+                        <a:latin typeface="Calibri"/>
+                      </a:endParaRPr>
+                    </a:p>
+                  </a:txBody>
+                  <a:tcPr marL="12700" marR="12700" marT="12700" marB="0" anchor="ctr"/>
+                </a:tc>
+                <a:tc>
+                  <a:txBody>
+                    <a:bodyPr/>
+                    <a:lstStyle/>
+                    <a:p>
+                      <a:pPr algn="ctr" fontAlgn="ctr"/>
+                      <a:r>
+                        <a:rPr lang="en-US" sz="1100" u="none" strike="noStrike">
+                          <a:effectLst/>
+                        </a:rPr>
+                        <a:t>4</a:t>
+                      </a:r>
+                      <a:endParaRPr lang="en-US" sz="1100" b="0" i="0" u="none" strike="noStrike">
+                        <a:solidFill>
+                          <a:srgbClr val="000000"/>
+                        </a:solidFill>
+                        <a:effectLst/>
+                        <a:latin typeface="Calibri"/>
+                      </a:endParaRPr>
+                    </a:p>
+                  </a:txBody>
+                  <a:tcPr marL="12700" marR="12700" marT="12700" marB="0" anchor="ctr"/>
+                </a:tc>
+                <a:tc>
+                  <a:txBody>
+                    <a:bodyPr/>
+                    <a:lstStyle/>
+                    <a:p>
+                      <a:pPr algn="r" fontAlgn="ctr"/>
+                      <a:r>
+                        <a:rPr lang="en-US" sz="1100" u="none" strike="noStrike">
+                          <a:effectLst/>
+                        </a:rPr>
+                        <a:t>$1.40</a:t>
+                      </a:r>
+                      <a:endParaRPr lang="en-US" sz="1100" b="0" i="0" u="none" strike="noStrike">
+                        <a:solidFill>
+                          <a:srgbClr val="000000"/>
+                        </a:solidFill>
+                        <a:effectLst/>
+                        <a:latin typeface="Calibri"/>
+                      </a:endParaRPr>
+                    </a:p>
+                  </a:txBody>
+                  <a:tcPr marL="12700" marR="12700" marT="12700" marB="0" anchor="ctr"/>
+                </a:tc>
+              </a:tr>
+              <a:tr h="243218">
+                <a:tc>
+                  <a:txBody>
+                    <a:bodyPr/>
+                    <a:lstStyle/>
+                    <a:p>
+                      <a:pPr algn="l" fontAlgn="b"/>
+                      <a:r>
+                        <a:rPr lang="en-US" sz="1100" u="none" strike="noStrike">
+                          <a:effectLst/>
+                        </a:rPr>
+                        <a:t>Rasberry Pi</a:t>
+                      </a:r>
+                      <a:endParaRPr lang="en-US" sz="1100" b="0" i="0" u="none" strike="noStrike">
+                        <a:solidFill>
+                          <a:srgbClr val="000000"/>
+                        </a:solidFill>
+                        <a:effectLst/>
+                        <a:latin typeface="Calibri"/>
+                      </a:endParaRPr>
+                    </a:p>
+                  </a:txBody>
+                  <a:tcPr marL="12700" marR="12700" marT="12700" marB="0" anchor="b"/>
+                </a:tc>
+                <a:tc>
+                  <a:txBody>
+                    <a:bodyPr/>
+                    <a:lstStyle/>
+                    <a:p>
+                      <a:pPr algn="ctr" fontAlgn="ctr"/>
+                      <a:r>
+                        <a:rPr lang="en-US" sz="1100" u="none" strike="noStrike">
+                          <a:effectLst/>
+                        </a:rPr>
+                        <a:t>$42.00</a:t>
+                      </a:r>
+                      <a:endParaRPr lang="en-US" sz="1100" b="0" i="0" u="none" strike="noStrike">
+                        <a:solidFill>
+                          <a:srgbClr val="000000"/>
+                        </a:solidFill>
+                        <a:effectLst/>
+                        <a:latin typeface="Calibri"/>
+                      </a:endParaRPr>
+                    </a:p>
+                  </a:txBody>
+                  <a:tcPr marL="12700" marR="12700" marT="12700" marB="0" anchor="ctr"/>
+                </a:tc>
+                <a:tc>
+                  <a:txBody>
+                    <a:bodyPr/>
+                    <a:lstStyle/>
+                    <a:p>
+                      <a:pPr algn="ctr" fontAlgn="ctr"/>
+                      <a:r>
+                        <a:rPr lang="en-US" sz="1100" u="none" strike="noStrike">
+                          <a:effectLst/>
+                        </a:rPr>
+                        <a:t>1</a:t>
+                      </a:r>
+                      <a:endParaRPr lang="en-US" sz="1100" b="0" i="0" u="none" strike="noStrike">
+                        <a:solidFill>
+                          <a:srgbClr val="000000"/>
+                        </a:solidFill>
+                        <a:effectLst/>
+                        <a:latin typeface="Calibri"/>
+                      </a:endParaRPr>
+                    </a:p>
+                  </a:txBody>
+                  <a:tcPr marL="12700" marR="12700" marT="12700" marB="0" anchor="ctr"/>
+                </a:tc>
+                <a:tc>
+                  <a:txBody>
+                    <a:bodyPr/>
+                    <a:lstStyle/>
+                    <a:p>
+                      <a:pPr algn="r" fontAlgn="ctr"/>
+                      <a:r>
+                        <a:rPr lang="en-US" sz="1100" u="none" strike="noStrike">
+                          <a:effectLst/>
+                        </a:rPr>
+                        <a:t>$42.00</a:t>
+                      </a:r>
+                      <a:endParaRPr lang="en-US" sz="1100" b="0" i="0" u="none" strike="noStrike">
+                        <a:solidFill>
+                          <a:srgbClr val="000000"/>
+                        </a:solidFill>
+                        <a:effectLst/>
+                        <a:latin typeface="Calibri"/>
+                      </a:endParaRPr>
+                    </a:p>
+                  </a:txBody>
+                  <a:tcPr marL="12700" marR="12700" marT="12700" marB="0" anchor="ctr"/>
+                </a:tc>
+              </a:tr>
+              <a:tr h="243218">
+                <a:tc>
+                  <a:txBody>
+                    <a:bodyPr/>
+                    <a:lstStyle/>
+                    <a:p>
+                      <a:pPr algn="l" fontAlgn="b"/>
+                      <a:r>
+                        <a:rPr lang="en-US" sz="1100" u="none" strike="noStrike">
+                          <a:effectLst/>
+                        </a:rPr>
+                        <a:t>Wifi Source Module</a:t>
+                      </a:r>
+                      <a:endParaRPr lang="en-US" sz="1100" b="0" i="0" u="none" strike="noStrike">
+                        <a:solidFill>
+                          <a:srgbClr val="000000"/>
+                        </a:solidFill>
+                        <a:effectLst/>
+                        <a:latin typeface="Calibri"/>
+                      </a:endParaRPr>
+                    </a:p>
+                  </a:txBody>
+                  <a:tcPr marL="12700" marR="12700" marT="12700" marB="0" anchor="b"/>
+                </a:tc>
+                <a:tc>
+                  <a:txBody>
+                    <a:bodyPr/>
+                    <a:lstStyle/>
+                    <a:p>
+                      <a:pPr algn="ctr" fontAlgn="ctr"/>
+                      <a:r>
+                        <a:rPr lang="en-US" sz="1100" u="none" strike="noStrike">
+                          <a:effectLst/>
+                        </a:rPr>
+                        <a:t>$20.00</a:t>
+                      </a:r>
+                      <a:endParaRPr lang="en-US" sz="1100" b="0" i="0" u="none" strike="noStrike">
+                        <a:solidFill>
+                          <a:srgbClr val="000000"/>
+                        </a:solidFill>
+                        <a:effectLst/>
+                        <a:latin typeface="Calibri"/>
+                      </a:endParaRPr>
+                    </a:p>
+                  </a:txBody>
+                  <a:tcPr marL="12700" marR="12700" marT="12700" marB="0" anchor="ctr"/>
+                </a:tc>
+                <a:tc>
+                  <a:txBody>
+                    <a:bodyPr/>
+                    <a:lstStyle/>
+                    <a:p>
+                      <a:pPr algn="ctr" fontAlgn="ctr"/>
+                      <a:r>
+                        <a:rPr lang="en-US" sz="1100" u="none" strike="noStrike">
+                          <a:effectLst/>
+                        </a:rPr>
+                        <a:t>1</a:t>
+                      </a:r>
+                      <a:endParaRPr lang="en-US" sz="1100" b="0" i="0" u="none" strike="noStrike">
+                        <a:solidFill>
+                          <a:srgbClr val="000000"/>
+                        </a:solidFill>
+                        <a:effectLst/>
+                        <a:latin typeface="Calibri"/>
+                      </a:endParaRPr>
+                    </a:p>
+                  </a:txBody>
+                  <a:tcPr marL="12700" marR="12700" marT="12700" marB="0" anchor="ctr"/>
+                </a:tc>
+                <a:tc>
+                  <a:txBody>
+                    <a:bodyPr/>
+                    <a:lstStyle/>
+                    <a:p>
+                      <a:pPr algn="r" fontAlgn="ctr"/>
+                      <a:r>
+                        <a:rPr lang="en-US" sz="1100" u="none" strike="noStrike">
+                          <a:effectLst/>
+                        </a:rPr>
+                        <a:t>$20.00</a:t>
+                      </a:r>
+                      <a:endParaRPr lang="en-US" sz="1100" b="0" i="0" u="none" strike="noStrike">
+                        <a:solidFill>
+                          <a:srgbClr val="000000"/>
+                        </a:solidFill>
+                        <a:effectLst/>
+                        <a:latin typeface="Calibri"/>
+                      </a:endParaRPr>
+                    </a:p>
+                  </a:txBody>
+                  <a:tcPr marL="12700" marR="12700" marT="12700" marB="0" anchor="ctr"/>
+                </a:tc>
+              </a:tr>
+              <a:tr h="243218">
+                <a:tc>
+                  <a:txBody>
+                    <a:bodyPr/>
+                    <a:lstStyle/>
+                    <a:p>
+                      <a:pPr algn="l" fontAlgn="b"/>
+                      <a:r>
+                        <a:rPr lang="en-US" sz="1100" u="none" strike="noStrike">
+                          <a:effectLst/>
+                        </a:rPr>
+                        <a:t>Wall Adapter</a:t>
+                      </a:r>
+                      <a:endParaRPr lang="en-US" sz="1100" b="0" i="0" u="none" strike="noStrike">
+                        <a:solidFill>
+                          <a:srgbClr val="000000"/>
+                        </a:solidFill>
+                        <a:effectLst/>
+                        <a:latin typeface="Calibri"/>
+                      </a:endParaRPr>
+                    </a:p>
+                  </a:txBody>
+                  <a:tcPr marL="12700" marR="12700" marT="12700" marB="0" anchor="b"/>
+                </a:tc>
+                <a:tc>
+                  <a:txBody>
+                    <a:bodyPr/>
+                    <a:lstStyle/>
+                    <a:p>
+                      <a:pPr algn="ctr" fontAlgn="ctr"/>
+                      <a:r>
+                        <a:rPr lang="en-US" sz="1100" u="none" strike="noStrike" dirty="0">
+                          <a:effectLst/>
+                        </a:rPr>
+                        <a:t>$3.00</a:t>
+                      </a:r>
+                      <a:endParaRPr lang="en-US" sz="1100" b="0" i="0" u="none" strike="noStrike" dirty="0">
+                        <a:solidFill>
+                          <a:srgbClr val="000000"/>
+                        </a:solidFill>
+                        <a:effectLst/>
+                        <a:latin typeface="Calibri"/>
+                      </a:endParaRPr>
+                    </a:p>
+                  </a:txBody>
+                  <a:tcPr marL="12700" marR="12700" marT="12700" marB="0" anchor="ctr"/>
+                </a:tc>
+                <a:tc>
+                  <a:txBody>
+                    <a:bodyPr/>
+                    <a:lstStyle/>
+                    <a:p>
+                      <a:pPr algn="ctr" fontAlgn="ctr"/>
+                      <a:r>
+                        <a:rPr lang="en-US" sz="1100" u="none" strike="noStrike">
+                          <a:effectLst/>
+                        </a:rPr>
+                        <a:t>1</a:t>
+                      </a:r>
+                      <a:endParaRPr lang="en-US" sz="1100" b="0" i="0" u="none" strike="noStrike">
+                        <a:solidFill>
+                          <a:srgbClr val="000000"/>
+                        </a:solidFill>
+                        <a:effectLst/>
+                        <a:latin typeface="Calibri"/>
+                      </a:endParaRPr>
+                    </a:p>
+                  </a:txBody>
+                  <a:tcPr marL="12700" marR="12700" marT="12700" marB="0" anchor="ctr"/>
+                </a:tc>
+                <a:tc>
+                  <a:txBody>
+                    <a:bodyPr/>
+                    <a:lstStyle/>
+                    <a:p>
+                      <a:pPr algn="r" fontAlgn="ctr"/>
+                      <a:r>
+                        <a:rPr lang="en-US" sz="1100" u="none" strike="noStrike">
+                          <a:effectLst/>
+                        </a:rPr>
+                        <a:t>$3.00</a:t>
+                      </a:r>
+                      <a:endParaRPr lang="en-US" sz="1100" b="0" i="0" u="none" strike="noStrike">
+                        <a:solidFill>
+                          <a:srgbClr val="000000"/>
+                        </a:solidFill>
+                        <a:effectLst/>
+                        <a:latin typeface="Calibri"/>
+                      </a:endParaRPr>
+                    </a:p>
+                  </a:txBody>
+                  <a:tcPr marL="12700" marR="12700" marT="12700" marB="0" anchor="ctr"/>
+                </a:tc>
+              </a:tr>
+              <a:tr h="243218">
+                <a:tc>
+                  <a:txBody>
+                    <a:bodyPr/>
+                    <a:lstStyle/>
+                    <a:p>
+                      <a:pPr algn="l" fontAlgn="b"/>
+                      <a:r>
+                        <a:rPr lang="en-US" sz="1100" u="none" strike="noStrike">
+                          <a:effectLst/>
+                        </a:rPr>
+                        <a:t>Programming Board</a:t>
+                      </a:r>
+                      <a:endParaRPr lang="en-US" sz="1100" b="0" i="0" u="none" strike="noStrike">
+                        <a:solidFill>
+                          <a:srgbClr val="000000"/>
+                        </a:solidFill>
+                        <a:effectLst/>
+                        <a:latin typeface="Calibri"/>
+                      </a:endParaRPr>
+                    </a:p>
+                  </a:txBody>
+                  <a:tcPr marL="12700" marR="12700" marT="12700" marB="0" anchor="b"/>
+                </a:tc>
+                <a:tc>
+                  <a:txBody>
+                    <a:bodyPr/>
+                    <a:lstStyle/>
+                    <a:p>
+                      <a:pPr algn="ctr" fontAlgn="ctr"/>
+                      <a:r>
+                        <a:rPr lang="en-US" sz="1100" u="none" strike="noStrike">
+                          <a:effectLst/>
+                        </a:rPr>
+                        <a:t>$15.00</a:t>
+                      </a:r>
+                      <a:endParaRPr lang="en-US" sz="1100" b="0" i="0" u="none" strike="noStrike">
+                        <a:solidFill>
+                          <a:srgbClr val="000000"/>
+                        </a:solidFill>
+                        <a:effectLst/>
+                        <a:latin typeface="Calibri"/>
+                      </a:endParaRPr>
+                    </a:p>
+                  </a:txBody>
+                  <a:tcPr marL="12700" marR="12700" marT="12700" marB="0" anchor="ctr"/>
+                </a:tc>
+                <a:tc>
+                  <a:txBody>
+                    <a:bodyPr/>
+                    <a:lstStyle/>
+                    <a:p>
+                      <a:pPr algn="ctr" fontAlgn="b"/>
+                      <a:r>
+                        <a:rPr lang="en-US" sz="1100" u="none" strike="noStrike">
+                          <a:effectLst/>
+                        </a:rPr>
+                        <a:t>1</a:t>
+                      </a:r>
+                      <a:endParaRPr lang="en-US" sz="1100" b="0" i="0" u="none" strike="noStrike">
+                        <a:solidFill>
+                          <a:srgbClr val="000000"/>
+                        </a:solidFill>
+                        <a:effectLst/>
+                        <a:latin typeface="Calibri"/>
+                      </a:endParaRPr>
+                    </a:p>
+                  </a:txBody>
+                  <a:tcPr marL="12700" marR="12700" marT="12700" marB="0" anchor="b"/>
+                </a:tc>
+                <a:tc>
+                  <a:txBody>
+                    <a:bodyPr/>
+                    <a:lstStyle/>
+                    <a:p>
+                      <a:pPr algn="r" fontAlgn="ctr"/>
+                      <a:r>
+                        <a:rPr lang="en-US" sz="1100" u="none" strike="noStrike">
+                          <a:effectLst/>
+                        </a:rPr>
+                        <a:t>$15.00</a:t>
+                      </a:r>
+                      <a:endParaRPr lang="en-US" sz="1100" b="0" i="0" u="none" strike="noStrike">
+                        <a:solidFill>
+                          <a:srgbClr val="000000"/>
+                        </a:solidFill>
+                        <a:effectLst/>
+                        <a:latin typeface="Calibri"/>
+                      </a:endParaRPr>
+                    </a:p>
+                  </a:txBody>
+                  <a:tcPr marL="12700" marR="12700" marT="12700" marB="0" anchor="ctr"/>
+                </a:tc>
+              </a:tr>
+              <a:tr h="256921">
+                <a:tc>
+                  <a:txBody>
+                    <a:bodyPr/>
+                    <a:lstStyle/>
+                    <a:p>
+                      <a:pPr algn="l" fontAlgn="b"/>
+                      <a:r>
+                        <a:rPr lang="en-US" sz="1100" u="none" strike="noStrike">
+                          <a:effectLst/>
+                        </a:rPr>
+                        <a:t>3D Printing Materials</a:t>
+                      </a:r>
+                      <a:endParaRPr lang="en-US" sz="1100" b="0" i="0" u="none" strike="noStrike">
+                        <a:solidFill>
+                          <a:srgbClr val="000000"/>
+                        </a:solidFill>
+                        <a:effectLst/>
+                        <a:latin typeface="Calibri"/>
+                      </a:endParaRPr>
+                    </a:p>
+                  </a:txBody>
+                  <a:tcPr marL="12700" marR="12700" marT="12700" marB="0" anchor="b"/>
+                </a:tc>
+                <a:tc>
+                  <a:txBody>
+                    <a:bodyPr/>
+                    <a:lstStyle/>
+                    <a:p>
+                      <a:pPr algn="ctr" fontAlgn="b"/>
+                      <a:r>
+                        <a:rPr lang="en-US" sz="1100" u="none" strike="noStrike">
+                          <a:effectLst/>
+                        </a:rPr>
+                        <a:t>$20.00</a:t>
+                      </a:r>
+                      <a:endParaRPr lang="en-US" sz="1100" b="0" i="0" u="none" strike="noStrike">
+                        <a:solidFill>
+                          <a:srgbClr val="000000"/>
+                        </a:solidFill>
+                        <a:effectLst/>
+                        <a:latin typeface="Calibri"/>
+                      </a:endParaRPr>
+                    </a:p>
+                  </a:txBody>
+                  <a:tcPr marL="12700" marR="12700" marT="12700" marB="0" anchor="b"/>
+                </a:tc>
+                <a:tc>
+                  <a:txBody>
+                    <a:bodyPr/>
+                    <a:lstStyle/>
+                    <a:p>
+                      <a:pPr algn="ctr" fontAlgn="ctr"/>
+                      <a:r>
+                        <a:rPr lang="en-US" sz="1100" u="none" strike="noStrike">
+                          <a:effectLst/>
+                        </a:rPr>
+                        <a:t>1</a:t>
+                      </a:r>
+                      <a:endParaRPr lang="en-US" sz="1100" b="0" i="0" u="none" strike="noStrike">
+                        <a:solidFill>
+                          <a:srgbClr val="000000"/>
+                        </a:solidFill>
+                        <a:effectLst/>
+                        <a:latin typeface="Calibri"/>
+                      </a:endParaRPr>
+                    </a:p>
+                  </a:txBody>
+                  <a:tcPr marL="12700" marR="12700" marT="12700" marB="0" anchor="ctr"/>
+                </a:tc>
+                <a:tc>
+                  <a:txBody>
+                    <a:bodyPr/>
+                    <a:lstStyle/>
+                    <a:p>
+                      <a:pPr algn="r" fontAlgn="ctr"/>
+                      <a:r>
+                        <a:rPr lang="en-US" sz="1100" u="none" strike="noStrike">
+                          <a:effectLst/>
+                        </a:rPr>
+                        <a:t>$20.00</a:t>
+                      </a:r>
+                      <a:endParaRPr lang="en-US" sz="1100" b="0" i="0" u="none" strike="noStrike">
+                        <a:solidFill>
+                          <a:srgbClr val="000000"/>
+                        </a:solidFill>
+                        <a:effectLst/>
+                        <a:latin typeface="Calibri"/>
+                      </a:endParaRPr>
+                    </a:p>
+                  </a:txBody>
+                  <a:tcPr marL="12700" marR="12700" marT="12700" marB="0" anchor="ctr"/>
+                </a:tc>
+              </a:tr>
+              <a:tr h="256921">
+                <a:tc>
+                  <a:txBody>
+                    <a:bodyPr/>
+                    <a:lstStyle/>
+                    <a:p>
+                      <a:pPr algn="l" fontAlgn="b"/>
+                      <a:r>
+                        <a:rPr lang="en-US" sz="1100" u="none" strike="noStrike">
+                          <a:effectLst/>
+                        </a:rPr>
+                        <a:t>Totals</a:t>
+                      </a:r>
+                      <a:endParaRPr lang="en-US" sz="1100" b="1" i="0" u="none" strike="noStrike">
+                        <a:solidFill>
+                          <a:srgbClr val="000000"/>
+                        </a:solidFill>
+                        <a:effectLst/>
+                        <a:latin typeface="Calibri"/>
+                      </a:endParaRPr>
+                    </a:p>
+                  </a:txBody>
+                  <a:tcPr marL="12700" marR="12700" marT="12700" marB="0" anchor="b"/>
+                </a:tc>
+                <a:tc>
+                  <a:txBody>
+                    <a:bodyPr/>
+                    <a:lstStyle/>
+                    <a:p>
+                      <a:pPr algn="l" fontAlgn="b"/>
+                      <a:r>
+                        <a:rPr lang="en-US" sz="1100" u="none" strike="noStrike">
+                          <a:effectLst/>
+                        </a:rPr>
+                        <a:t> </a:t>
+                      </a:r>
+                      <a:endParaRPr lang="en-US" sz="1100" b="0" i="0" u="none" strike="noStrike">
+                        <a:solidFill>
+                          <a:srgbClr val="000000"/>
+                        </a:solidFill>
+                        <a:effectLst/>
+                        <a:latin typeface="Calibri"/>
+                      </a:endParaRPr>
+                    </a:p>
+                  </a:txBody>
+                  <a:tcPr marL="12700" marR="12700" marT="12700" marB="0" anchor="b"/>
+                </a:tc>
+                <a:tc>
+                  <a:txBody>
+                    <a:bodyPr/>
+                    <a:lstStyle/>
+                    <a:p>
+                      <a:pPr algn="l" fontAlgn="b"/>
+                      <a:r>
+                        <a:rPr lang="en-US" sz="1100" u="none" strike="noStrike">
+                          <a:effectLst/>
+                        </a:rPr>
+                        <a:t> </a:t>
+                      </a:r>
+                      <a:endParaRPr lang="en-US" sz="1100" b="0" i="0" u="none" strike="noStrike">
+                        <a:solidFill>
+                          <a:srgbClr val="000000"/>
+                        </a:solidFill>
+                        <a:effectLst/>
+                        <a:latin typeface="Calibri"/>
+                      </a:endParaRPr>
+                    </a:p>
+                  </a:txBody>
+                  <a:tcPr marL="12700" marR="12700" marT="12700" marB="0" anchor="b"/>
+                </a:tc>
+                <a:tc>
+                  <a:txBody>
+                    <a:bodyPr/>
+                    <a:lstStyle/>
+                    <a:p>
+                      <a:pPr algn="r" fontAlgn="b"/>
+                      <a:r>
+                        <a:rPr lang="en-US" sz="1100" u="none" strike="noStrike" dirty="0">
+                          <a:effectLst/>
+                        </a:rPr>
+                        <a:t>$284.40</a:t>
+                      </a:r>
+                      <a:endParaRPr lang="en-US" sz="1100" b="0" i="0" u="none" strike="noStrike" dirty="0">
+                        <a:solidFill>
+                          <a:srgbClr val="000000"/>
+                        </a:solidFill>
+                        <a:effectLst/>
+                        <a:latin typeface="Calibri"/>
+                      </a:endParaRPr>
+                    </a:p>
+                  </a:txBody>
+                  <a:tcPr marL="12700" marR="12700" marT="12700" marB="0" anchor="b"/>
+                </a:tc>
+              </a:tr>
+            </a:tbl>
+          </a:graphicData>
+        </a:graphic>
+      </p:graphicFrame>
     </p:spTree>
     <p:extLst>
       <p:ext uri="{BB962C8B-B14F-4D97-AF65-F5344CB8AC3E}">
@@ -5357,6 +6896,13 @@
   <p:clrMapOvr>
     <a:masterClrMapping/>
   </p:clrMapOvr>
+  <p:timing>
+    <p:tnLst>
+      <p:par>
+        <p:cTn xmlns:p14="http://schemas.microsoft.com/office/powerpoint/2010/main" id="1" dur="indefinite" restart="never" nodeType="tmRoot"/>
+      </p:par>
+    </p:tnLst>
+  </p:timing>
 </p:sld>
 </file>
 
@@ -5410,6 +6956,13 @@
   <p:clrMapOvr>
     <a:masterClrMapping/>
   </p:clrMapOvr>
+  <p:timing>
+    <p:tnLst>
+      <p:par>
+        <p:cTn xmlns:p14="http://schemas.microsoft.com/office/powerpoint/2010/main" id="1" dur="indefinite" restart="never" nodeType="tmRoot"/>
+      </p:par>
+    </p:tnLst>
+  </p:timing>
 </p:sld>
 </file>
 

</xml_diff>

<commit_message>
Connor added more sections to his introduction of the project
</commit_message>
<xml_diff>
--- a/Presentation.pptx
+++ b/Presentation.pptx
@@ -5,17 +5,19 @@
     <p:sldMasterId id="2147483660" r:id="rId1"/>
   </p:sldMasterIdLst>
   <p:notesMasterIdLst>
-    <p:notesMasterId r:id="rId10"/>
+    <p:notesMasterId r:id="rId12"/>
   </p:notesMasterIdLst>
   <p:sldIdLst>
     <p:sldId id="256" r:id="rId2"/>
-    <p:sldId id="257" r:id="rId3"/>
-    <p:sldId id="258" r:id="rId4"/>
-    <p:sldId id="262" r:id="rId5"/>
-    <p:sldId id="259" r:id="rId6"/>
-    <p:sldId id="260" r:id="rId7"/>
-    <p:sldId id="263" r:id="rId8"/>
-    <p:sldId id="261" r:id="rId9"/>
+    <p:sldId id="264" r:id="rId3"/>
+    <p:sldId id="257" r:id="rId4"/>
+    <p:sldId id="265" r:id="rId5"/>
+    <p:sldId id="258" r:id="rId6"/>
+    <p:sldId id="262" r:id="rId7"/>
+    <p:sldId id="259" r:id="rId8"/>
+    <p:sldId id="260" r:id="rId9"/>
+    <p:sldId id="263" r:id="rId10"/>
+    <p:sldId id="261" r:id="rId11"/>
   </p:sldIdLst>
   <p:sldSz cx="9144000" cy="6858000" type="screen4x3"/>
   <p:notesSz cx="6858000" cy="9144000"/>
@@ -199,7 +201,7 @@
           <a:p>
             <a:fld id="{3054C299-8359-5B4D-8FA7-E9A587887A0D}" type="datetimeFigureOut">
               <a:rPr lang="en-US" smtClean="0"/>
-              <a:t>8/17/15</a:t>
+              <a:t>8/19/15</a:t>
             </a:fld>
             <a:endParaRPr lang="en-US"/>
           </a:p>
@@ -513,11 +515,7 @@
           <a:p>
             <a:r>
               <a:rPr lang="en-US" dirty="0" smtClean="0"/>
-              <a:t>Connor – Energy</a:t>
-            </a:r>
-            <a:r>
-              <a:rPr lang="en-US" baseline="0" dirty="0" smtClean="0"/>
-              <a:t> efficient &amp; convenient, replace current in home light switch with Wi-Fi and motion controlled switches, use rules and scheduling to help save money and time with home lighting, example going away on vacation can turn on lights at night time, or not have hallway lights turn on at night when walking around the house</a:t>
+              <a:t>Connor</a:t>
             </a:r>
             <a:endParaRPr lang="en-US" dirty="0"/>
           </a:p>
@@ -549,7 +547,7 @@
     </p:spTree>
     <p:extLst>
       <p:ext uri="{BB962C8B-B14F-4D97-AF65-F5344CB8AC3E}">
-        <p14:creationId xmlns:p14="http://schemas.microsoft.com/office/powerpoint/2010/main" val="37883933"/>
+        <p14:creationId xmlns:p14="http://schemas.microsoft.com/office/powerpoint/2010/main" val="1583942582"/>
       </p:ext>
     </p:extLst>
   </p:cSld>
@@ -605,7 +603,7 @@
           <a:p>
             <a:r>
               <a:rPr lang="en-US" dirty="0" smtClean="0"/>
-              <a:t>Chris</a:t>
+              <a:t>Connor</a:t>
             </a:r>
             <a:endParaRPr lang="en-US" dirty="0"/>
           </a:p>
@@ -637,7 +635,7 @@
     </p:spTree>
     <p:extLst>
       <p:ext uri="{BB962C8B-B14F-4D97-AF65-F5344CB8AC3E}">
-        <p14:creationId xmlns:p14="http://schemas.microsoft.com/office/powerpoint/2010/main" val="184800196"/>
+        <p14:creationId xmlns:p14="http://schemas.microsoft.com/office/powerpoint/2010/main" val="37883933"/>
       </p:ext>
     </p:extLst>
   </p:cSld>
@@ -693,7 +691,7 @@
           <a:p>
             <a:r>
               <a:rPr lang="en-US" dirty="0" smtClean="0"/>
-              <a:t>Dan</a:t>
+              <a:t>Chris</a:t>
             </a:r>
             <a:endParaRPr lang="en-US" dirty="0"/>
           </a:p>
@@ -716,7 +714,7 @@
           <a:p>
             <a:fld id="{05332D8B-7B6C-A54D-BAC6-226B3ACA1459}" type="slidenum">
               <a:rPr lang="en-US" smtClean="0"/>
-              <a:t>4</a:t>
+              <a:t>5</a:t>
             </a:fld>
             <a:endParaRPr lang="en-US"/>
           </a:p>
@@ -725,7 +723,7 @@
     </p:spTree>
     <p:extLst>
       <p:ext uri="{BB962C8B-B14F-4D97-AF65-F5344CB8AC3E}">
-        <p14:creationId xmlns:p14="http://schemas.microsoft.com/office/powerpoint/2010/main" val="1151576839"/>
+        <p14:creationId xmlns:p14="http://schemas.microsoft.com/office/powerpoint/2010/main" val="184800196"/>
       </p:ext>
     </p:extLst>
   </p:cSld>
@@ -781,7 +779,7 @@
           <a:p>
             <a:r>
               <a:rPr lang="en-US" dirty="0" smtClean="0"/>
-              <a:t>Joe – at the end w/ advanced features mention a few stretch goals we may try</a:t>
+              <a:t>Dan</a:t>
             </a:r>
             <a:endParaRPr lang="en-US" dirty="0"/>
           </a:p>
@@ -804,7 +802,7 @@
           <a:p>
             <a:fld id="{05332D8B-7B6C-A54D-BAC6-226B3ACA1459}" type="slidenum">
               <a:rPr lang="en-US" smtClean="0"/>
-              <a:t>5</a:t>
+              <a:t>6</a:t>
             </a:fld>
             <a:endParaRPr lang="en-US"/>
           </a:p>
@@ -813,7 +811,7 @@
     </p:spTree>
     <p:extLst>
       <p:ext uri="{BB962C8B-B14F-4D97-AF65-F5344CB8AC3E}">
-        <p14:creationId xmlns:p14="http://schemas.microsoft.com/office/powerpoint/2010/main" val="282400902"/>
+        <p14:creationId xmlns:p14="http://schemas.microsoft.com/office/powerpoint/2010/main" val="1151576839"/>
       </p:ext>
     </p:extLst>
   </p:cSld>
@@ -869,7 +867,7 @@
           <a:p>
             <a:r>
               <a:rPr lang="en-US" dirty="0" smtClean="0"/>
-              <a:t>Gunnar</a:t>
+              <a:t>Joe – at the end w/ advanced features mention a few stretch goals we may try</a:t>
             </a:r>
             <a:endParaRPr lang="en-US" dirty="0"/>
           </a:p>
@@ -892,7 +890,7 @@
           <a:p>
             <a:fld id="{05332D8B-7B6C-A54D-BAC6-226B3ACA1459}" type="slidenum">
               <a:rPr lang="en-US" smtClean="0"/>
-              <a:t>6</a:t>
+              <a:t>7</a:t>
             </a:fld>
             <a:endParaRPr lang="en-US"/>
           </a:p>
@@ -901,7 +899,7 @@
     </p:spTree>
     <p:extLst>
       <p:ext uri="{BB962C8B-B14F-4D97-AF65-F5344CB8AC3E}">
-        <p14:creationId xmlns:p14="http://schemas.microsoft.com/office/powerpoint/2010/main" val="4135037039"/>
+        <p14:creationId xmlns:p14="http://schemas.microsoft.com/office/powerpoint/2010/main" val="282400902"/>
       </p:ext>
     </p:extLst>
   </p:cSld>
@@ -957,7 +955,7 @@
           <a:p>
             <a:r>
               <a:rPr lang="en-US" dirty="0" smtClean="0"/>
-              <a:t>Gunnar</a:t>
+              <a:t>Joe</a:t>
             </a:r>
             <a:endParaRPr lang="en-US" dirty="0"/>
           </a:p>
@@ -980,7 +978,7 @@
           <a:p>
             <a:fld id="{05332D8B-7B6C-A54D-BAC6-226B3ACA1459}" type="slidenum">
               <a:rPr lang="en-US" smtClean="0"/>
-              <a:t>7</a:t>
+              <a:t>8</a:t>
             </a:fld>
             <a:endParaRPr lang="en-US"/>
           </a:p>
@@ -989,7 +987,7 @@
     </p:spTree>
     <p:extLst>
       <p:ext uri="{BB962C8B-B14F-4D97-AF65-F5344CB8AC3E}">
-        <p14:creationId xmlns:p14="http://schemas.microsoft.com/office/powerpoint/2010/main" val="30328140"/>
+        <p14:creationId xmlns:p14="http://schemas.microsoft.com/office/powerpoint/2010/main" val="4135037039"/>
       </p:ext>
     </p:extLst>
   </p:cSld>
@@ -1045,7 +1043,7 @@
           <a:p>
             <a:r>
               <a:rPr lang="en-US" dirty="0" smtClean="0"/>
-              <a:t>Everyone</a:t>
+              <a:t>Gunnar</a:t>
             </a:r>
             <a:endParaRPr lang="en-US" dirty="0"/>
           </a:p>
@@ -1068,7 +1066,95 @@
           <a:p>
             <a:fld id="{05332D8B-7B6C-A54D-BAC6-226B3ACA1459}" type="slidenum">
               <a:rPr lang="en-US" smtClean="0"/>
-              <a:t>8</a:t>
+              <a:t>9</a:t>
+            </a:fld>
+            <a:endParaRPr lang="en-US"/>
+          </a:p>
+        </p:txBody>
+      </p:sp>
+    </p:spTree>
+    <p:extLst>
+      <p:ext uri="{BB962C8B-B14F-4D97-AF65-F5344CB8AC3E}">
+        <p14:creationId xmlns:p14="http://schemas.microsoft.com/office/powerpoint/2010/main" val="30328140"/>
+      </p:ext>
+    </p:extLst>
+  </p:cSld>
+  <p:clrMapOvr>
+    <a:masterClrMapping/>
+  </p:clrMapOvr>
+</p:notes>
+</file>
+
+<file path=ppt/notesSlides/notesSlide8.xml><?xml version="1.0" encoding="utf-8"?>
+<p:notes xmlns:a="http://schemas.openxmlformats.org/drawingml/2006/main" xmlns:r="http://schemas.openxmlformats.org/officeDocument/2006/relationships" xmlns:p="http://schemas.openxmlformats.org/presentationml/2006/main">
+  <p:cSld>
+    <p:spTree>
+      <p:nvGrpSpPr>
+        <p:cNvPr id="1" name=""/>
+        <p:cNvGrpSpPr/>
+        <p:nvPr/>
+      </p:nvGrpSpPr>
+      <p:grpSpPr>
+        <a:xfrm>
+          <a:off x="0" y="0"/>
+          <a:ext cx="0" cy="0"/>
+          <a:chOff x="0" y="0"/>
+          <a:chExt cx="0" cy="0"/>
+        </a:xfrm>
+      </p:grpSpPr>
+      <p:sp>
+        <p:nvSpPr>
+          <p:cNvPr id="2" name="Slide Image Placeholder 1"/>
+          <p:cNvSpPr>
+            <a:spLocks noGrp="1" noRot="1" noChangeAspect="1"/>
+          </p:cNvSpPr>
+          <p:nvPr>
+            <p:ph type="sldImg"/>
+          </p:nvPr>
+        </p:nvSpPr>
+        <p:spPr/>
+      </p:sp>
+      <p:sp>
+        <p:nvSpPr>
+          <p:cNvPr id="3" name="Notes Placeholder 2"/>
+          <p:cNvSpPr>
+            <a:spLocks noGrp="1"/>
+          </p:cNvSpPr>
+          <p:nvPr>
+            <p:ph type="body" idx="1"/>
+          </p:nvPr>
+        </p:nvSpPr>
+        <p:spPr/>
+        <p:txBody>
+          <a:bodyPr/>
+          <a:lstStyle/>
+          <a:p>
+            <a:r>
+              <a:rPr lang="en-US" dirty="0" smtClean="0"/>
+              <a:t>Everyone</a:t>
+            </a:r>
+            <a:endParaRPr lang="en-US" dirty="0"/>
+          </a:p>
+        </p:txBody>
+      </p:sp>
+      <p:sp>
+        <p:nvSpPr>
+          <p:cNvPr id="4" name="Slide Number Placeholder 3"/>
+          <p:cNvSpPr>
+            <a:spLocks noGrp="1"/>
+          </p:cNvSpPr>
+          <p:nvPr>
+            <p:ph type="sldNum" sz="quarter" idx="10"/>
+          </p:nvPr>
+        </p:nvSpPr>
+        <p:spPr/>
+        <p:txBody>
+          <a:bodyPr/>
+          <a:lstStyle/>
+          <a:p>
+            <a:fld id="{05332D8B-7B6C-A54D-BAC6-226B3ACA1459}" type="slidenum">
+              <a:rPr lang="en-US" smtClean="0"/>
+              <a:t>10</a:t>
             </a:fld>
             <a:endParaRPr lang="en-US"/>
           </a:p>
@@ -1308,7 +1394,7 @@
           <a:p>
             <a:fld id="{651A0C47-018D-4460-B945-BFF7981B6CA6}" type="datetimeFigureOut">
               <a:rPr lang="en-US" smtClean="0"/>
-              <a:t>8/17/15</a:t>
+              <a:t>8/19/15</a:t>
             </a:fld>
             <a:endParaRPr lang="en-US"/>
           </a:p>
@@ -1640,7 +1726,7 @@
           <a:p>
             <a:fld id="{651A0C47-018D-4460-B945-BFF7981B6CA6}" type="datetimeFigureOut">
               <a:rPr lang="en-US" smtClean="0"/>
-              <a:t>8/17/15</a:t>
+              <a:t>8/19/15</a:t>
             </a:fld>
             <a:endParaRPr lang="en-US"/>
           </a:p>
@@ -1972,7 +2058,7 @@
           <a:p>
             <a:fld id="{651A0C47-018D-4460-B945-BFF7981B6CA6}" type="datetimeFigureOut">
               <a:rPr lang="en-US" smtClean="0"/>
-              <a:t>8/17/15</a:t>
+              <a:t>8/19/15</a:t>
             </a:fld>
             <a:endParaRPr lang="en-US"/>
           </a:p>
@@ -2304,7 +2390,7 @@
           <a:p>
             <a:fld id="{651A0C47-018D-4460-B945-BFF7981B6CA6}" type="datetimeFigureOut">
               <a:rPr lang="en-US" smtClean="0"/>
-              <a:t>8/17/15</a:t>
+              <a:t>8/19/15</a:t>
             </a:fld>
             <a:endParaRPr lang="en-US"/>
           </a:p>
@@ -2993,7 +3079,7 @@
           <a:p>
             <a:fld id="{651A0C47-018D-4460-B945-BFF7981B6CA6}" type="datetimeFigureOut">
               <a:rPr lang="en-US" smtClean="0"/>
-              <a:t>8/17/15</a:t>
+              <a:t>8/19/15</a:t>
             </a:fld>
             <a:endParaRPr lang="en-US"/>
           </a:p>
@@ -3172,7 +3258,7 @@
           <a:p>
             <a:fld id="{651A0C47-018D-4460-B945-BFF7981B6CA6}" type="datetimeFigureOut">
               <a:rPr lang="en-US" smtClean="0"/>
-              <a:t>8/17/15</a:t>
+              <a:t>8/19/15</a:t>
             </a:fld>
             <a:endParaRPr lang="en-US"/>
           </a:p>
@@ -3346,7 +3432,7 @@
           <a:p>
             <a:fld id="{651A0C47-018D-4460-B945-BFF7981B6CA6}" type="datetimeFigureOut">
               <a:rPr lang="en-US" smtClean="0"/>
-              <a:t>8/17/15</a:t>
+              <a:t>8/19/15</a:t>
             </a:fld>
             <a:endParaRPr lang="en-US"/>
           </a:p>
@@ -3594,7 +3680,7 @@
           <a:p>
             <a:fld id="{651A0C47-018D-4460-B945-BFF7981B6CA6}" type="datetimeFigureOut">
               <a:rPr lang="en-US" smtClean="0"/>
-              <a:t>8/17/15</a:t>
+              <a:t>8/19/15</a:t>
             </a:fld>
             <a:endParaRPr lang="en-US"/>
           </a:p>
@@ -3924,7 +4010,7 @@
           <a:p>
             <a:fld id="{651A0C47-018D-4460-B945-BFF7981B6CA6}" type="datetimeFigureOut">
               <a:rPr lang="en-US" smtClean="0"/>
-              <a:t>8/17/15</a:t>
+              <a:t>8/19/15</a:t>
             </a:fld>
             <a:endParaRPr lang="en-US"/>
           </a:p>
@@ -4216,7 +4302,7 @@
           <a:p>
             <a:fld id="{651A0C47-018D-4460-B945-BFF7981B6CA6}" type="datetimeFigureOut">
               <a:rPr lang="en-US" smtClean="0"/>
-              <a:t>8/17/15</a:t>
+              <a:t>8/19/15</a:t>
             </a:fld>
             <a:endParaRPr lang="en-US"/>
           </a:p>
@@ -4652,7 +4738,7 @@
           <a:p>
             <a:fld id="{651A0C47-018D-4460-B945-BFF7981B6CA6}" type="datetimeFigureOut">
               <a:rPr lang="en-US" smtClean="0"/>
-              <a:t>8/17/15</a:t>
+              <a:t>8/19/15</a:t>
             </a:fld>
             <a:endParaRPr lang="en-US"/>
           </a:p>
@@ -4839,7 +4925,7 @@
           <a:p>
             <a:fld id="{651A0C47-018D-4460-B945-BFF7981B6CA6}" type="datetimeFigureOut">
               <a:rPr lang="en-US" smtClean="0"/>
-              <a:t>8/17/15</a:t>
+              <a:t>8/19/15</a:t>
             </a:fld>
             <a:endParaRPr lang="en-US"/>
           </a:p>
@@ -4929,7 +5015,7 @@
           <a:p>
             <a:fld id="{651A0C47-018D-4460-B945-BFF7981B6CA6}" type="datetimeFigureOut">
               <a:rPr lang="en-US" smtClean="0"/>
-              <a:t>8/17/15</a:t>
+              <a:t>8/19/15</a:t>
             </a:fld>
             <a:endParaRPr lang="en-US"/>
           </a:p>
@@ -5210,7 +5296,7 @@
           <a:p>
             <a:fld id="{651A0C47-018D-4460-B945-BFF7981B6CA6}" type="datetimeFigureOut">
               <a:rPr lang="en-US" smtClean="0"/>
-              <a:t>8/17/15</a:t>
+              <a:t>8/19/15</a:t>
             </a:fld>
             <a:endParaRPr lang="en-US"/>
           </a:p>
@@ -5425,7 +5511,7 @@
           <a:p>
             <a:fld id="{651A0C47-018D-4460-B945-BFF7981B6CA6}" type="datetimeFigureOut">
               <a:rPr lang="en-US" smtClean="0"/>
-              <a:t>8/17/15</a:t>
+              <a:t>8/19/15</a:t>
             </a:fld>
             <a:endParaRPr lang="en-US"/>
           </a:p>
@@ -6024,6 +6110,36 @@
           </a:prstGeom>
         </p:spPr>
       </p:pic>
+      <p:sp>
+        <p:nvSpPr>
+          <p:cNvPr id="5" name="TextBox 4"/>
+          <p:cNvSpPr txBox="1"/>
+          <p:nvPr/>
+        </p:nvSpPr>
+        <p:spPr>
+          <a:xfrm>
+            <a:off x="2177065" y="3469479"/>
+            <a:ext cx="4572624" cy="369332"/>
+          </a:xfrm>
+          <a:prstGeom prst="rect">
+            <a:avLst/>
+          </a:prstGeom>
+          <a:noFill/>
+        </p:spPr>
+        <p:txBody>
+          <a:bodyPr wrap="none" rtlCol="0">
+            <a:spAutoFit/>
+          </a:bodyPr>
+          <a:lstStyle/>
+          <a:p>
+            <a:r>
+              <a:rPr lang="en-US" dirty="0" smtClean="0"/>
+              <a:t>We will Hash Slinging Slash your electric bill</a:t>
+            </a:r>
+            <a:endParaRPr lang="en-US" dirty="0"/>
+          </a:p>
+        </p:txBody>
+      </p:sp>
     </p:spTree>
     <p:extLst>
       <p:ext uri="{BB962C8B-B14F-4D97-AF65-F5344CB8AC3E}">
@@ -6044,7 +6160,574 @@
 </p:sld>
 </file>
 
+<file path=ppt/slides/slide10.xml><?xml version="1.0" encoding="utf-8"?>
+<p:sld xmlns:a="http://schemas.openxmlformats.org/drawingml/2006/main" xmlns:r="http://schemas.openxmlformats.org/officeDocument/2006/relationships" xmlns:p="http://schemas.openxmlformats.org/presentationml/2006/main">
+  <p:cSld>
+    <p:spTree>
+      <p:nvGrpSpPr>
+        <p:cNvPr id="1" name=""/>
+        <p:cNvGrpSpPr/>
+        <p:nvPr/>
+      </p:nvGrpSpPr>
+      <p:grpSpPr>
+        <a:xfrm>
+          <a:off x="0" y="0"/>
+          <a:ext cx="0" cy="0"/>
+          <a:chOff x="0" y="0"/>
+          <a:chExt cx="0" cy="0"/>
+        </a:xfrm>
+      </p:grpSpPr>
+      <p:sp>
+        <p:nvSpPr>
+          <p:cNvPr id="2" name="Title 1"/>
+          <p:cNvSpPr>
+            <a:spLocks noGrp="1"/>
+          </p:cNvSpPr>
+          <p:nvPr>
+            <p:ph type="title"/>
+          </p:nvPr>
+        </p:nvSpPr>
+        <p:spPr/>
+        <p:txBody>
+          <a:bodyPr/>
+          <a:lstStyle/>
+          <a:p>
+            <a:r>
+              <a:rPr lang="en-US" dirty="0" smtClean="0"/>
+              <a:t>Questions?</a:t>
+            </a:r>
+            <a:endParaRPr lang="en-US" dirty="0"/>
+          </a:p>
+        </p:txBody>
+      </p:sp>
+    </p:spTree>
+    <p:extLst>
+      <p:ext uri="{BB962C8B-B14F-4D97-AF65-F5344CB8AC3E}">
+        <p14:creationId xmlns:p14="http://schemas.microsoft.com/office/powerpoint/2010/main" val="1079122949"/>
+      </p:ext>
+    </p:extLst>
+  </p:cSld>
+  <p:clrMapOvr>
+    <a:masterClrMapping/>
+  </p:clrMapOvr>
+  <p:timing>
+    <p:tnLst>
+      <p:par>
+        <p:cTn xmlns:p14="http://schemas.microsoft.com/office/powerpoint/2010/main" id="1" dur="indefinite" restart="never" nodeType="tmRoot"/>
+      </p:par>
+    </p:tnLst>
+  </p:timing>
+</p:sld>
+</file>
+
 <file path=ppt/slides/slide2.xml><?xml version="1.0" encoding="utf-8"?>
+<p:sld xmlns:a="http://schemas.openxmlformats.org/drawingml/2006/main" xmlns:r="http://schemas.openxmlformats.org/officeDocument/2006/relationships" xmlns:p="http://schemas.openxmlformats.org/presentationml/2006/main">
+  <p:cSld>
+    <p:spTree>
+      <p:nvGrpSpPr>
+        <p:cNvPr id="1" name=""/>
+        <p:cNvGrpSpPr/>
+        <p:nvPr/>
+      </p:nvGrpSpPr>
+      <p:grpSpPr>
+        <a:xfrm>
+          <a:off x="0" y="0"/>
+          <a:ext cx="0" cy="0"/>
+          <a:chOff x="0" y="0"/>
+          <a:chExt cx="0" cy="0"/>
+        </a:xfrm>
+      </p:grpSpPr>
+      <p:pic>
+        <p:nvPicPr>
+          <p:cNvPr id="4" name="Picture 3" descr="lutron-Lndry-P_Occ_Sensor_Manual_Switch.jpg"/>
+          <p:cNvPicPr>
+            <a:picLocks noChangeAspect="1"/>
+          </p:cNvPicPr>
+          <p:nvPr/>
+        </p:nvPicPr>
+        <p:blipFill>
+          <a:blip r:embed="rId3" cstate="print">
+            <a:extLst>
+              <a:ext uri="{28A0092B-C50C-407E-A947-70E740481C1C}">
+                <a14:useLocalDpi xmlns:a14="http://schemas.microsoft.com/office/drawing/2010/main" val="0"/>
+              </a:ext>
+            </a:extLst>
+          </a:blip>
+          <a:stretch>
+            <a:fillRect/>
+          </a:stretch>
+        </p:blipFill>
+        <p:spPr>
+          <a:xfrm>
+            <a:off x="129588" y="3646889"/>
+            <a:ext cx="2823655" cy="2106446"/>
+          </a:xfrm>
+          <a:prstGeom prst="rect">
+            <a:avLst/>
+          </a:prstGeom>
+        </p:spPr>
+      </p:pic>
+      <p:pic>
+        <p:nvPicPr>
+          <p:cNvPr id="6" name="Picture 5" descr="tumblr_lfo0gz7n2T1qc9h2yo1_500.png"/>
+          <p:cNvPicPr>
+            <a:picLocks noChangeAspect="1"/>
+          </p:cNvPicPr>
+          <p:nvPr/>
+        </p:nvPicPr>
+        <p:blipFill>
+          <a:blip r:embed="rId4">
+            <a:extLst>
+              <a:ext uri="{28A0092B-C50C-407E-A947-70E740481C1C}">
+                <a14:useLocalDpi xmlns:a14="http://schemas.microsoft.com/office/drawing/2010/main" val="0"/>
+              </a:ext>
+            </a:extLst>
+          </a:blip>
+          <a:stretch>
+            <a:fillRect/>
+          </a:stretch>
+        </p:blipFill>
+        <p:spPr>
+          <a:xfrm>
+            <a:off x="5943192" y="3301266"/>
+            <a:ext cx="2829863" cy="2829863"/>
+          </a:xfrm>
+          <a:prstGeom prst="rect">
+            <a:avLst/>
+          </a:prstGeom>
+        </p:spPr>
+      </p:pic>
+      <p:pic>
+        <p:nvPicPr>
+          <p:cNvPr id="5" name="Picture 4" descr="giphy.gif"/>
+          <p:cNvPicPr>
+            <a:picLocks noChangeAspect="1"/>
+          </p:cNvPicPr>
+          <p:nvPr/>
+        </p:nvPicPr>
+        <p:blipFill>
+          <a:blip r:embed="rId5">
+            <a:extLst>
+              <a:ext uri="{28A0092B-C50C-407E-A947-70E740481C1C}">
+                <a14:useLocalDpi xmlns:a14="http://schemas.microsoft.com/office/drawing/2010/main" val="0"/>
+              </a:ext>
+            </a:extLst>
+          </a:blip>
+          <a:stretch>
+            <a:fillRect/>
+          </a:stretch>
+        </p:blipFill>
+        <p:spPr>
+          <a:xfrm>
+            <a:off x="2112272" y="3301266"/>
+            <a:ext cx="4051220" cy="3038415"/>
+          </a:xfrm>
+          <a:prstGeom prst="rect">
+            <a:avLst/>
+          </a:prstGeom>
+        </p:spPr>
+      </p:pic>
+      <p:sp>
+        <p:nvSpPr>
+          <p:cNvPr id="2" name="Title 1"/>
+          <p:cNvSpPr>
+            <a:spLocks noGrp="1"/>
+          </p:cNvSpPr>
+          <p:nvPr>
+            <p:ph type="title"/>
+          </p:nvPr>
+        </p:nvSpPr>
+        <p:spPr>
+          <a:xfrm>
+            <a:off x="685800" y="121023"/>
+            <a:ext cx="7770813" cy="1429871"/>
+          </a:xfrm>
+        </p:spPr>
+        <p:txBody>
+          <a:bodyPr/>
+          <a:lstStyle/>
+          <a:p>
+            <a:r>
+              <a:rPr lang="en-US" dirty="0" smtClean="0"/>
+              <a:t>The Problem</a:t>
+            </a:r>
+            <a:endParaRPr lang="en-US" dirty="0"/>
+          </a:p>
+        </p:txBody>
+      </p:sp>
+      <p:sp>
+        <p:nvSpPr>
+          <p:cNvPr id="3" name="Content Placeholder 2"/>
+          <p:cNvSpPr>
+            <a:spLocks noGrp="1"/>
+          </p:cNvSpPr>
+          <p:nvPr>
+            <p:ph idx="1"/>
+          </p:nvPr>
+        </p:nvSpPr>
+        <p:spPr>
+          <a:xfrm>
+            <a:off x="685800" y="1460188"/>
+            <a:ext cx="7770813" cy="1629508"/>
+          </a:xfrm>
+        </p:spPr>
+        <p:txBody>
+          <a:bodyPr>
+            <a:normAutofit fontScale="92500"/>
+          </a:bodyPr>
+          <a:lstStyle/>
+          <a:p>
+            <a:r>
+              <a:rPr lang="en-US" dirty="0" smtClean="0"/>
+              <a:t>Pesky light switches that are impossible to find in the dark</a:t>
+            </a:r>
+          </a:p>
+          <a:p>
+            <a:r>
+              <a:rPr lang="en-US" dirty="0" smtClean="0"/>
+              <a:t>Needing to get out of your comfortable bed to turn off lights</a:t>
+            </a:r>
+          </a:p>
+          <a:p>
+            <a:r>
+              <a:rPr lang="en-US" dirty="0" smtClean="0"/>
+              <a:t>Bumping into furniture on your way to the bathroom late at night</a:t>
+            </a:r>
+            <a:endParaRPr lang="en-US" dirty="0"/>
+          </a:p>
+        </p:txBody>
+      </p:sp>
+    </p:spTree>
+    <p:extLst>
+      <p:ext uri="{BB962C8B-B14F-4D97-AF65-F5344CB8AC3E}">
+        <p14:creationId xmlns:p14="http://schemas.microsoft.com/office/powerpoint/2010/main" val="3920223107"/>
+      </p:ext>
+    </p:extLst>
+  </p:cSld>
+  <p:clrMapOvr>
+    <a:masterClrMapping/>
+  </p:clrMapOvr>
+  <p:timing>
+    <p:tnLst>
+      <p:par>
+        <p:cTn xmlns:p14="http://schemas.microsoft.com/office/powerpoint/2010/main" id="1" dur="indefinite" restart="never" nodeType="tmRoot">
+          <p:childTnLst>
+            <p:seq concurrent="1" nextAc="seek">
+              <p:cTn id="2" dur="indefinite" nodeType="mainSeq">
+                <p:childTnLst>
+                  <p:par>
+                    <p:cTn id="3" fill="hold">
+                      <p:stCondLst>
+                        <p:cond delay="indefinite"/>
+                      </p:stCondLst>
+                      <p:childTnLst>
+                        <p:par>
+                          <p:cTn id="4" fill="hold">
+                            <p:stCondLst>
+                              <p:cond delay="0"/>
+                            </p:stCondLst>
+                            <p:childTnLst>
+                              <p:par>
+                                <p:cTn id="5" presetID="1" presetClass="entr" presetSubtype="0" fill="hold" nodeType="clickEffect">
+                                  <p:stCondLst>
+                                    <p:cond delay="0"/>
+                                  </p:stCondLst>
+                                  <p:childTnLst>
+                                    <p:set>
+                                      <p:cBhvr>
+                                        <p:cTn id="6" dur="1" fill="hold">
+                                          <p:stCondLst>
+                                            <p:cond delay="0"/>
+                                          </p:stCondLst>
+                                        </p:cTn>
+                                        <p:tgtEl>
+                                          <p:spTgt spid="4"/>
+                                        </p:tgtEl>
+                                        <p:attrNameLst>
+                                          <p:attrName>style.visibility</p:attrName>
+                                        </p:attrNameLst>
+                                      </p:cBhvr>
+                                      <p:to>
+                                        <p:strVal val="visible"/>
+                                      </p:to>
+                                    </p:set>
+                                  </p:childTnLst>
+                                </p:cTn>
+                              </p:par>
+                            </p:childTnLst>
+                          </p:cTn>
+                        </p:par>
+                      </p:childTnLst>
+                    </p:cTn>
+                  </p:par>
+                  <p:par>
+                    <p:cTn id="7" fill="hold">
+                      <p:stCondLst>
+                        <p:cond delay="indefinite"/>
+                      </p:stCondLst>
+                      <p:childTnLst>
+                        <p:par>
+                          <p:cTn id="8" fill="hold">
+                            <p:stCondLst>
+                              <p:cond delay="0"/>
+                            </p:stCondLst>
+                            <p:childTnLst>
+                              <p:par>
+                                <p:cTn id="9" presetID="1" presetClass="entr" presetSubtype="0" fill="hold" nodeType="clickEffect">
+                                  <p:stCondLst>
+                                    <p:cond delay="0"/>
+                                  </p:stCondLst>
+                                  <p:childTnLst>
+                                    <p:set>
+                                      <p:cBhvr>
+                                        <p:cTn id="10" dur="1" fill="hold">
+                                          <p:stCondLst>
+                                            <p:cond delay="0"/>
+                                          </p:stCondLst>
+                                        </p:cTn>
+                                        <p:tgtEl>
+                                          <p:spTgt spid="3">
+                                            <p:txEl>
+                                              <p:pRg st="1" end="1"/>
+                                            </p:txEl>
+                                          </p:spTgt>
+                                        </p:tgtEl>
+                                        <p:attrNameLst>
+                                          <p:attrName>style.visibility</p:attrName>
+                                        </p:attrNameLst>
+                                      </p:cBhvr>
+                                      <p:to>
+                                        <p:strVal val="visible"/>
+                                      </p:to>
+                                    </p:set>
+                                  </p:childTnLst>
+                                </p:cTn>
+                              </p:par>
+                            </p:childTnLst>
+                          </p:cTn>
+                        </p:par>
+                      </p:childTnLst>
+                    </p:cTn>
+                  </p:par>
+                  <p:par>
+                    <p:cTn id="11" fill="hold">
+                      <p:stCondLst>
+                        <p:cond delay="indefinite"/>
+                      </p:stCondLst>
+                      <p:childTnLst>
+                        <p:par>
+                          <p:cTn id="12" fill="hold">
+                            <p:stCondLst>
+                              <p:cond delay="0"/>
+                            </p:stCondLst>
+                            <p:childTnLst>
+                              <p:par>
+                                <p:cTn id="13" presetID="2" presetClass="entr" presetSubtype="4" fill="hold" nodeType="clickEffect">
+                                  <p:stCondLst>
+                                    <p:cond delay="0"/>
+                                  </p:stCondLst>
+                                  <p:childTnLst>
+                                    <p:set>
+                                      <p:cBhvr>
+                                        <p:cTn id="14" dur="1" fill="hold">
+                                          <p:stCondLst>
+                                            <p:cond delay="0"/>
+                                          </p:stCondLst>
+                                        </p:cTn>
+                                        <p:tgtEl>
+                                          <p:spTgt spid="6"/>
+                                        </p:tgtEl>
+                                        <p:attrNameLst>
+                                          <p:attrName>style.visibility</p:attrName>
+                                        </p:attrNameLst>
+                                      </p:cBhvr>
+                                      <p:to>
+                                        <p:strVal val="visible"/>
+                                      </p:to>
+                                    </p:set>
+                                    <p:anim calcmode="lin" valueType="num">
+                                      <p:cBhvr additive="base">
+                                        <p:cTn id="15" dur="500" fill="hold"/>
+                                        <p:tgtEl>
+                                          <p:spTgt spid="6"/>
+                                        </p:tgtEl>
+                                        <p:attrNameLst>
+                                          <p:attrName>ppt_x</p:attrName>
+                                        </p:attrNameLst>
+                                      </p:cBhvr>
+                                      <p:tavLst>
+                                        <p:tav tm="0">
+                                          <p:val>
+                                            <p:strVal val="#ppt_x"/>
+                                          </p:val>
+                                        </p:tav>
+                                        <p:tav tm="100000">
+                                          <p:val>
+                                            <p:strVal val="#ppt_x"/>
+                                          </p:val>
+                                        </p:tav>
+                                      </p:tavLst>
+                                    </p:anim>
+                                    <p:anim calcmode="lin" valueType="num">
+                                      <p:cBhvr additive="base">
+                                        <p:cTn id="16" dur="500" fill="hold"/>
+                                        <p:tgtEl>
+                                          <p:spTgt spid="6"/>
+                                        </p:tgtEl>
+                                        <p:attrNameLst>
+                                          <p:attrName>ppt_y</p:attrName>
+                                        </p:attrNameLst>
+                                      </p:cBhvr>
+                                      <p:tavLst>
+                                        <p:tav tm="0">
+                                          <p:val>
+                                            <p:strVal val="1+#ppt_h/2"/>
+                                          </p:val>
+                                        </p:tav>
+                                        <p:tav tm="100000">
+                                          <p:val>
+                                            <p:strVal val="#ppt_y"/>
+                                          </p:val>
+                                        </p:tav>
+                                      </p:tavLst>
+                                    </p:anim>
+                                  </p:childTnLst>
+                                </p:cTn>
+                              </p:par>
+                            </p:childTnLst>
+                          </p:cTn>
+                        </p:par>
+                      </p:childTnLst>
+                    </p:cTn>
+                  </p:par>
+                  <p:par>
+                    <p:cTn id="17" fill="hold">
+                      <p:stCondLst>
+                        <p:cond delay="indefinite"/>
+                      </p:stCondLst>
+                      <p:childTnLst>
+                        <p:par>
+                          <p:cTn id="18" fill="hold">
+                            <p:stCondLst>
+                              <p:cond delay="0"/>
+                            </p:stCondLst>
+                            <p:childTnLst>
+                              <p:par>
+                                <p:cTn id="19" presetID="1" presetClass="entr" presetSubtype="0" fill="hold" nodeType="clickEffect">
+                                  <p:stCondLst>
+                                    <p:cond delay="0"/>
+                                  </p:stCondLst>
+                                  <p:childTnLst>
+                                    <p:set>
+                                      <p:cBhvr>
+                                        <p:cTn id="20" dur="1" fill="hold">
+                                          <p:stCondLst>
+                                            <p:cond delay="0"/>
+                                          </p:stCondLst>
+                                        </p:cTn>
+                                        <p:tgtEl>
+                                          <p:spTgt spid="3">
+                                            <p:txEl>
+                                              <p:pRg st="2" end="2"/>
+                                            </p:txEl>
+                                          </p:spTgt>
+                                        </p:tgtEl>
+                                        <p:attrNameLst>
+                                          <p:attrName>style.visibility</p:attrName>
+                                        </p:attrNameLst>
+                                      </p:cBhvr>
+                                      <p:to>
+                                        <p:strVal val="visible"/>
+                                      </p:to>
+                                    </p:set>
+                                  </p:childTnLst>
+                                </p:cTn>
+                              </p:par>
+                            </p:childTnLst>
+                          </p:cTn>
+                        </p:par>
+                      </p:childTnLst>
+                    </p:cTn>
+                  </p:par>
+                  <p:par>
+                    <p:cTn id="21" fill="hold">
+                      <p:stCondLst>
+                        <p:cond delay="indefinite"/>
+                      </p:stCondLst>
+                      <p:childTnLst>
+                        <p:par>
+                          <p:cTn id="22" fill="hold">
+                            <p:stCondLst>
+                              <p:cond delay="0"/>
+                            </p:stCondLst>
+                            <p:childTnLst>
+                              <p:par>
+                                <p:cTn id="23" presetID="5" presetClass="entr" presetSubtype="10" fill="hold" nodeType="clickEffect">
+                                  <p:stCondLst>
+                                    <p:cond delay="0"/>
+                                  </p:stCondLst>
+                                  <p:childTnLst>
+                                    <p:set>
+                                      <p:cBhvr>
+                                        <p:cTn id="24" dur="1" fill="hold">
+                                          <p:stCondLst>
+                                            <p:cond delay="0"/>
+                                          </p:stCondLst>
+                                        </p:cTn>
+                                        <p:tgtEl>
+                                          <p:spTgt spid="5"/>
+                                        </p:tgtEl>
+                                        <p:attrNameLst>
+                                          <p:attrName>style.visibility</p:attrName>
+                                        </p:attrNameLst>
+                                      </p:cBhvr>
+                                      <p:to>
+                                        <p:strVal val="visible"/>
+                                      </p:to>
+                                    </p:set>
+                                    <p:animEffect transition="in" filter="checkerboard(across)">
+                                      <p:cBhvr>
+                                        <p:cTn id="25" dur="500"/>
+                                        <p:tgtEl>
+                                          <p:spTgt spid="5"/>
+                                        </p:tgtEl>
+                                      </p:cBhvr>
+                                    </p:animEffect>
+                                  </p:childTnLst>
+                                </p:cTn>
+                              </p:par>
+                            </p:childTnLst>
+                          </p:cTn>
+                        </p:par>
+                      </p:childTnLst>
+                    </p:cTn>
+                  </p:par>
+                </p:childTnLst>
+              </p:cTn>
+              <p:prevCondLst>
+                <p:cond evt="onPrev" delay="0">
+                  <p:tgtEl>
+                    <p:sldTgt/>
+                  </p:tgtEl>
+                </p:cond>
+              </p:prevCondLst>
+              <p:nextCondLst>
+                <p:cond evt="onNext" delay="0">
+                  <p:tgtEl>
+                    <p:sldTgt/>
+                  </p:tgtEl>
+                </p:cond>
+              </p:nextCondLst>
+            </p:seq>
+          </p:childTnLst>
+        </p:cTn>
+      </p:par>
+    </p:tnLst>
+  </p:timing>
+</p:sld>
+</file>
+
+<file path=ppt/slides/slide3.xml><?xml version="1.0" encoding="utf-8"?>
 <p:sld xmlns:a="http://schemas.openxmlformats.org/drawingml/2006/main" xmlns:r="http://schemas.openxmlformats.org/officeDocument/2006/relationships" xmlns:p="http://schemas.openxmlformats.org/presentationml/2006/main">
   <p:cSld>
     <p:spTree>
@@ -6183,8 +6866,8 @@
         </p:blipFill>
         <p:spPr>
           <a:xfrm>
-            <a:off x="2617662" y="4042883"/>
-            <a:ext cx="3550691" cy="2364760"/>
+            <a:off x="2086356" y="3689033"/>
+            <a:ext cx="4250460" cy="2830806"/>
           </a:xfrm>
           <a:prstGeom prst="rect">
             <a:avLst/>
@@ -6211,7 +6894,135 @@
 </p:sld>
 </file>
 
-<file path=ppt/slides/slide3.xml><?xml version="1.0" encoding="utf-8"?>
+<file path=ppt/slides/slide4.xml><?xml version="1.0" encoding="utf-8"?>
+<p:sld xmlns:a="http://schemas.openxmlformats.org/drawingml/2006/main" xmlns:r="http://schemas.openxmlformats.org/officeDocument/2006/relationships" xmlns:p="http://schemas.openxmlformats.org/presentationml/2006/main">
+  <p:cSld>
+    <p:spTree>
+      <p:nvGrpSpPr>
+        <p:cNvPr id="1" name=""/>
+        <p:cNvGrpSpPr/>
+        <p:nvPr/>
+      </p:nvGrpSpPr>
+      <p:grpSpPr>
+        <a:xfrm>
+          <a:off x="0" y="0"/>
+          <a:ext cx="0" cy="0"/>
+          <a:chOff x="0" y="0"/>
+          <a:chExt cx="0" cy="0"/>
+        </a:xfrm>
+      </p:grpSpPr>
+      <p:sp>
+        <p:nvSpPr>
+          <p:cNvPr id="2" name="Title 1"/>
+          <p:cNvSpPr>
+            <a:spLocks noGrp="1"/>
+          </p:cNvSpPr>
+          <p:nvPr>
+            <p:ph type="title"/>
+          </p:nvPr>
+        </p:nvSpPr>
+        <p:spPr/>
+        <p:txBody>
+          <a:bodyPr/>
+          <a:lstStyle/>
+          <a:p>
+            <a:r>
+              <a:rPr lang="en-US" dirty="0" smtClean="0"/>
+              <a:t>Uses</a:t>
+            </a:r>
+            <a:endParaRPr lang="en-US" dirty="0"/>
+          </a:p>
+        </p:txBody>
+      </p:sp>
+      <p:sp>
+        <p:nvSpPr>
+          <p:cNvPr id="3" name="Content Placeholder 2"/>
+          <p:cNvSpPr>
+            <a:spLocks noGrp="1"/>
+          </p:cNvSpPr>
+          <p:nvPr>
+            <p:ph idx="1"/>
+          </p:nvPr>
+        </p:nvSpPr>
+        <p:spPr/>
+        <p:txBody>
+          <a:bodyPr/>
+          <a:lstStyle/>
+          <a:p>
+            <a:r>
+              <a:rPr lang="en-US" dirty="0" smtClean="0"/>
+              <a:t>Walk into a room, motion sensor turns light on automatically</a:t>
+            </a:r>
+          </a:p>
+          <a:p>
+            <a:pPr lvl="1"/>
+            <a:r>
+              <a:rPr lang="en-US" dirty="0" smtClean="0"/>
+              <a:t>With rules you can set a switch to not respond to motion at certain times of day</a:t>
+            </a:r>
+          </a:p>
+          <a:p>
+            <a:r>
+              <a:rPr lang="en-US" dirty="0" smtClean="0"/>
+              <a:t>Going away on vacation, can set a schedule to turn on some house lights to deter robbers</a:t>
+            </a:r>
+          </a:p>
+          <a:p>
+            <a:r>
+              <a:rPr lang="en-US" dirty="0" smtClean="0"/>
+              <a:t>Turn off/on a light from your computer or phone anywhere</a:t>
+            </a:r>
+          </a:p>
+          <a:p>
+            <a:pPr lvl="1"/>
+            <a:r>
+              <a:rPr lang="en-US" dirty="0" smtClean="0"/>
+              <a:t>In bed</a:t>
+            </a:r>
+          </a:p>
+          <a:p>
+            <a:pPr lvl="1"/>
+            <a:r>
+              <a:rPr lang="en-US" dirty="0" smtClean="0"/>
+              <a:t>At work</a:t>
+            </a:r>
+          </a:p>
+          <a:p>
+            <a:pPr lvl="1"/>
+            <a:r>
+              <a:rPr lang="en-US" dirty="0" smtClean="0"/>
+              <a:t>At </a:t>
+            </a:r>
+            <a:r>
+              <a:rPr lang="en-US" dirty="0" err="1" smtClean="0"/>
+              <a:t>Conor</a:t>
+            </a:r>
+            <a:r>
+              <a:rPr lang="en-US" dirty="0" smtClean="0"/>
+              <a:t> </a:t>
+            </a:r>
+            <a:r>
+              <a:rPr lang="en-US" dirty="0" err="1" smtClean="0"/>
+              <a:t>Larkins</a:t>
+            </a:r>
+            <a:endParaRPr lang="en-US" dirty="0"/>
+          </a:p>
+        </p:txBody>
+      </p:sp>
+    </p:spTree>
+    <p:extLst>
+      <p:ext uri="{BB962C8B-B14F-4D97-AF65-F5344CB8AC3E}">
+        <p14:creationId xmlns:p14="http://schemas.microsoft.com/office/powerpoint/2010/main" val="2335861722"/>
+      </p:ext>
+    </p:extLst>
+  </p:cSld>
+  <p:clrMapOvr>
+    <a:masterClrMapping/>
+  </p:clrMapOvr>
+</p:sld>
+</file>
+
+<file path=ppt/slides/slide5.xml><?xml version="1.0" encoding="utf-8"?>
 <p:sld xmlns:a="http://schemas.openxmlformats.org/drawingml/2006/main" xmlns:r="http://schemas.openxmlformats.org/officeDocument/2006/relationships" xmlns:p="http://schemas.openxmlformats.org/presentationml/2006/main">
   <p:cSld>
     <p:spTree>
@@ -6295,7 +7106,7 @@
 </p:sld>
 </file>
 
-<file path=ppt/slides/slide4.xml><?xml version="1.0" encoding="utf-8"?>
+<file path=ppt/slides/slide6.xml><?xml version="1.0" encoding="utf-8"?>
 <p:sld xmlns:a="http://schemas.openxmlformats.org/drawingml/2006/main" xmlns:r="http://schemas.openxmlformats.org/officeDocument/2006/relationships" xmlns:p="http://schemas.openxmlformats.org/presentationml/2006/main">
   <p:cSld>
     <p:spTree>
@@ -6384,7 +7195,7 @@
 </p:sld>
 </file>
 
-<file path=ppt/slides/slide5.xml><?xml version="1.0" encoding="utf-8"?>
+<file path=ppt/slides/slide7.xml><?xml version="1.0" encoding="utf-8"?>
 <p:sld xmlns:a="http://schemas.openxmlformats.org/drawingml/2006/main" xmlns:r="http://schemas.openxmlformats.org/officeDocument/2006/relationships" xmlns:p="http://schemas.openxmlformats.org/presentationml/2006/main">
   <p:cSld>
     <p:spTree>
@@ -12616,1647 +13427,6 @@
     <p:extLst>
       <p:ext uri="{BB962C8B-B14F-4D97-AF65-F5344CB8AC3E}">
         <p14:creationId xmlns:p14="http://schemas.microsoft.com/office/powerpoint/2010/main" val="3881248493"/>
-      </p:ext>
-    </p:extLst>
-  </p:cSld>
-  <p:clrMapOvr>
-    <a:masterClrMapping/>
-  </p:clrMapOvr>
-  <p:timing>
-    <p:tnLst>
-      <p:par>
-        <p:cTn xmlns:p14="http://schemas.microsoft.com/office/powerpoint/2010/main" id="1" dur="indefinite" restart="never" nodeType="tmRoot"/>
-      </p:par>
-    </p:tnLst>
-  </p:timing>
-</p:sld>
-</file>
-
-<file path=ppt/slides/slide6.xml><?xml version="1.0" encoding="utf-8"?>
-<p:sld xmlns:a="http://schemas.openxmlformats.org/drawingml/2006/main" xmlns:r="http://schemas.openxmlformats.org/officeDocument/2006/relationships" xmlns:p="http://schemas.openxmlformats.org/presentationml/2006/main">
-  <p:cSld>
-    <p:spTree>
-      <p:nvGrpSpPr>
-        <p:cNvPr id="1" name=""/>
-        <p:cNvGrpSpPr/>
-        <p:nvPr/>
-      </p:nvGrpSpPr>
-      <p:grpSpPr>
-        <a:xfrm>
-          <a:off x="0" y="0"/>
-          <a:ext cx="0" cy="0"/>
-          <a:chOff x="0" y="0"/>
-          <a:chExt cx="0" cy="0"/>
-        </a:xfrm>
-      </p:grpSpPr>
-      <p:sp>
-        <p:nvSpPr>
-          <p:cNvPr id="2" name="Title 1"/>
-          <p:cNvSpPr>
-            <a:spLocks noGrp="1"/>
-          </p:cNvSpPr>
-          <p:nvPr>
-            <p:ph type="title"/>
-          </p:nvPr>
-        </p:nvSpPr>
-        <p:spPr/>
-        <p:txBody>
-          <a:bodyPr/>
-          <a:lstStyle/>
-          <a:p>
-            <a:r>
-              <a:rPr lang="en-US" dirty="0" smtClean="0"/>
-              <a:t>Budget</a:t>
-            </a:r>
-            <a:endParaRPr lang="en-US" dirty="0"/>
-          </a:p>
-        </p:txBody>
-      </p:sp>
-      <p:graphicFrame>
-        <p:nvGraphicFramePr>
-          <p:cNvPr id="4" name="Table 3"/>
-          <p:cNvGraphicFramePr>
-            <a:graphicFrameLocks noGrp="1"/>
-          </p:cNvGraphicFramePr>
-          <p:nvPr>
-            <p:extLst>
-              <p:ext uri="{D42A27DB-BD31-4B8C-83A1-F6EECF244321}">
-                <p14:modId xmlns:p14="http://schemas.microsoft.com/office/powerpoint/2010/main" val="2089835287"/>
-              </p:ext>
-            </p:extLst>
-          </p:nvPr>
-        </p:nvGraphicFramePr>
-        <p:xfrm>
-          <a:off x="685800" y="1360584"/>
-          <a:ext cx="7770813" cy="5209102"/>
-        </p:xfrm>
-        <a:graphic>
-          <a:graphicData uri="http://schemas.openxmlformats.org/drawingml/2006/table">
-            <a:tbl>
-              <a:tblPr>
-                <a:tableStyleId>{3C2FFA5D-87B4-456A-9821-1D502468CF0F}</a:tableStyleId>
-              </a:tblPr>
-              <a:tblGrid>
-                <a:gridCol w="1501806"/>
-                <a:gridCol w="2466269"/>
-                <a:gridCol w="1446694"/>
-                <a:gridCol w="2356044"/>
-              </a:tblGrid>
-              <a:tr h="470985">
-                <a:tc>
-                  <a:txBody>
-                    <a:bodyPr/>
-                    <a:lstStyle/>
-                    <a:p>
-                      <a:pPr algn="l" fontAlgn="b"/>
-                      <a:r>
-                        <a:rPr lang="en-US" sz="1500" u="none" strike="noStrike">
-                          <a:effectLst/>
-                        </a:rPr>
-                        <a:t>Part List</a:t>
-                      </a:r>
-                      <a:endParaRPr lang="en-US" sz="1500" b="1" i="0" u="none" strike="noStrike">
-                        <a:solidFill>
-                          <a:srgbClr val="44546A"/>
-                        </a:solidFill>
-                        <a:effectLst/>
-                        <a:latin typeface="Calibri"/>
-                      </a:endParaRPr>
-                    </a:p>
-                  </a:txBody>
-                  <a:tcPr marL="12700" marR="12700" marT="12700" marB="0" anchor="b"/>
-                </a:tc>
-                <a:tc>
-                  <a:txBody>
-                    <a:bodyPr/>
-                    <a:lstStyle/>
-                    <a:p>
-                      <a:pPr algn="l" fontAlgn="b"/>
-                      <a:r>
-                        <a:rPr lang="en-US" sz="1500" u="none" strike="noStrike" dirty="0">
-                          <a:effectLst/>
-                        </a:rPr>
-                        <a:t>Cost Estimate Per Part</a:t>
-                      </a:r>
-                      <a:endParaRPr lang="en-US" sz="1500" b="1" i="0" u="none" strike="noStrike" dirty="0">
-                        <a:solidFill>
-                          <a:srgbClr val="44546A"/>
-                        </a:solidFill>
-                        <a:effectLst/>
-                        <a:latin typeface="Calibri"/>
-                      </a:endParaRPr>
-                    </a:p>
-                  </a:txBody>
-                  <a:tcPr marL="12700" marR="12700" marT="12700" marB="0" anchor="b"/>
-                </a:tc>
-                <a:tc>
-                  <a:txBody>
-                    <a:bodyPr/>
-                    <a:lstStyle/>
-                    <a:p>
-                      <a:pPr algn="l" fontAlgn="b"/>
-                      <a:r>
-                        <a:rPr lang="en-US" sz="1500" u="none" strike="noStrike">
-                          <a:effectLst/>
-                        </a:rPr>
-                        <a:t>Quantity</a:t>
-                      </a:r>
-                      <a:endParaRPr lang="en-US" sz="1500" b="1" i="0" u="none" strike="noStrike">
-                        <a:solidFill>
-                          <a:srgbClr val="44546A"/>
-                        </a:solidFill>
-                        <a:effectLst/>
-                        <a:latin typeface="Calibri"/>
-                      </a:endParaRPr>
-                    </a:p>
-                  </a:txBody>
-                  <a:tcPr marL="12700" marR="12700" marT="12700" marB="0" anchor="b"/>
-                </a:tc>
-                <a:tc>
-                  <a:txBody>
-                    <a:bodyPr/>
-                    <a:lstStyle/>
-                    <a:p>
-                      <a:pPr algn="r" fontAlgn="b"/>
-                      <a:r>
-                        <a:rPr lang="en-US" sz="1500" u="none" strike="noStrike">
-                          <a:effectLst/>
-                        </a:rPr>
-                        <a:t>Cost Estimate(-tax)</a:t>
-                      </a:r>
-                      <a:endParaRPr lang="en-US" sz="1500" b="1" i="0" u="none" strike="noStrike">
-                        <a:solidFill>
-                          <a:srgbClr val="44546A"/>
-                        </a:solidFill>
-                        <a:effectLst/>
-                        <a:latin typeface="Calibri"/>
-                      </a:endParaRPr>
-                    </a:p>
-                  </a:txBody>
-                  <a:tcPr marL="12700" marR="12700" marT="12700" marB="0" anchor="b"/>
-                </a:tc>
-              </a:tr>
-              <a:tr h="353239">
-                <a:tc>
-                  <a:txBody>
-                    <a:bodyPr/>
-                    <a:lstStyle/>
-                    <a:p>
-                      <a:pPr algn="l" fontAlgn="ctr"/>
-                      <a:r>
-                        <a:rPr lang="en-US" sz="1100" u="none" strike="noStrike">
-                          <a:effectLst/>
-                        </a:rPr>
-                        <a:t>Arduino</a:t>
-                      </a:r>
-                      <a:endParaRPr lang="en-US" sz="1100" b="0" i="0" u="none" strike="noStrike">
-                        <a:solidFill>
-                          <a:srgbClr val="000000"/>
-                        </a:solidFill>
-                        <a:effectLst/>
-                        <a:latin typeface="Calibri"/>
-                      </a:endParaRPr>
-                    </a:p>
-                  </a:txBody>
-                  <a:tcPr marL="12700" marR="12700" marT="12700" marB="0" anchor="ctr"/>
-                </a:tc>
-                <a:tc>
-                  <a:txBody>
-                    <a:bodyPr/>
-                    <a:lstStyle/>
-                    <a:p>
-                      <a:pPr algn="ctr" fontAlgn="ctr"/>
-                      <a:r>
-                        <a:rPr lang="en-US" sz="1100" u="none" strike="noStrike">
-                          <a:effectLst/>
-                        </a:rPr>
-                        <a:t>$10.00</a:t>
-                      </a:r>
-                      <a:endParaRPr lang="en-US" sz="1100" b="0" i="0" u="none" strike="noStrike">
-                        <a:solidFill>
-                          <a:srgbClr val="000000"/>
-                        </a:solidFill>
-                        <a:effectLst/>
-                        <a:latin typeface="Calibri"/>
-                      </a:endParaRPr>
-                    </a:p>
-                  </a:txBody>
-                  <a:tcPr marL="12700" marR="12700" marT="12700" marB="0" anchor="ctr"/>
-                </a:tc>
-                <a:tc>
-                  <a:txBody>
-                    <a:bodyPr/>
-                    <a:lstStyle/>
-                    <a:p>
-                      <a:pPr algn="ctr" fontAlgn="ctr"/>
-                      <a:r>
-                        <a:rPr lang="en-US" sz="1100" u="none" strike="noStrike">
-                          <a:effectLst/>
-                        </a:rPr>
-                        <a:t>4</a:t>
-                      </a:r>
-                      <a:endParaRPr lang="en-US" sz="1100" b="0" i="0" u="none" strike="noStrike">
-                        <a:solidFill>
-                          <a:srgbClr val="000000"/>
-                        </a:solidFill>
-                        <a:effectLst/>
-                        <a:latin typeface="Calibri"/>
-                      </a:endParaRPr>
-                    </a:p>
-                  </a:txBody>
-                  <a:tcPr marL="12700" marR="12700" marT="12700" marB="0" anchor="ctr"/>
-                </a:tc>
-                <a:tc>
-                  <a:txBody>
-                    <a:bodyPr/>
-                    <a:lstStyle/>
-                    <a:p>
-                      <a:pPr algn="r" fontAlgn="ctr"/>
-                      <a:r>
-                        <a:rPr lang="en-US" sz="1100" u="none" strike="noStrike">
-                          <a:effectLst/>
-                        </a:rPr>
-                        <a:t>$40.00</a:t>
-                      </a:r>
-                      <a:endParaRPr lang="en-US" sz="1100" b="0" i="0" u="none" strike="noStrike">
-                        <a:solidFill>
-                          <a:srgbClr val="000000"/>
-                        </a:solidFill>
-                        <a:effectLst/>
-                        <a:latin typeface="Calibri"/>
-                      </a:endParaRPr>
-                    </a:p>
-                  </a:txBody>
-                  <a:tcPr marL="12700" marR="12700" marT="12700" marB="0" anchor="ctr"/>
-                </a:tc>
-              </a:tr>
-              <a:tr h="334400">
-                <a:tc>
-                  <a:txBody>
-                    <a:bodyPr/>
-                    <a:lstStyle/>
-                    <a:p>
-                      <a:pPr algn="l" fontAlgn="b"/>
-                      <a:r>
-                        <a:rPr lang="en-US" sz="1100" u="none" strike="noStrike" dirty="0">
-                          <a:effectLst/>
-                        </a:rPr>
-                        <a:t>Motion Sensor</a:t>
-                      </a:r>
-                      <a:endParaRPr lang="en-US" sz="1100" b="0" i="0" u="none" strike="noStrike" dirty="0">
-                        <a:solidFill>
-                          <a:srgbClr val="000000"/>
-                        </a:solidFill>
-                        <a:effectLst/>
-                        <a:latin typeface="Calibri"/>
-                      </a:endParaRPr>
-                    </a:p>
-                  </a:txBody>
-                  <a:tcPr marL="12700" marR="12700" marT="12700" marB="0" anchor="b"/>
-                </a:tc>
-                <a:tc>
-                  <a:txBody>
-                    <a:bodyPr/>
-                    <a:lstStyle/>
-                    <a:p>
-                      <a:pPr algn="ctr" fontAlgn="ctr"/>
-                      <a:r>
-                        <a:rPr lang="en-US" sz="1100" u="none" strike="noStrike">
-                          <a:effectLst/>
-                        </a:rPr>
-                        <a:t>$10.00</a:t>
-                      </a:r>
-                      <a:endParaRPr lang="en-US" sz="1100" b="0" i="0" u="none" strike="noStrike">
-                        <a:solidFill>
-                          <a:srgbClr val="000000"/>
-                        </a:solidFill>
-                        <a:effectLst/>
-                        <a:latin typeface="Calibri"/>
-                      </a:endParaRPr>
-                    </a:p>
-                  </a:txBody>
-                  <a:tcPr marL="12700" marR="12700" marT="12700" marB="0" anchor="ctr"/>
-                </a:tc>
-                <a:tc>
-                  <a:txBody>
-                    <a:bodyPr/>
-                    <a:lstStyle/>
-                    <a:p>
-                      <a:pPr algn="ctr" fontAlgn="ctr"/>
-                      <a:r>
-                        <a:rPr lang="en-US" sz="1100" u="none" strike="noStrike">
-                          <a:effectLst/>
-                        </a:rPr>
-                        <a:t>4</a:t>
-                      </a:r>
-                      <a:endParaRPr lang="en-US" sz="1100" b="0" i="0" u="none" strike="noStrike">
-                        <a:solidFill>
-                          <a:srgbClr val="000000"/>
-                        </a:solidFill>
-                        <a:effectLst/>
-                        <a:latin typeface="Calibri"/>
-                      </a:endParaRPr>
-                    </a:p>
-                  </a:txBody>
-                  <a:tcPr marL="12700" marR="12700" marT="12700" marB="0" anchor="ctr"/>
-                </a:tc>
-                <a:tc>
-                  <a:txBody>
-                    <a:bodyPr/>
-                    <a:lstStyle/>
-                    <a:p>
-                      <a:pPr algn="r" fontAlgn="ctr"/>
-                      <a:r>
-                        <a:rPr lang="en-US" sz="1100" u="none" strike="noStrike" dirty="0">
-                          <a:effectLst/>
-                        </a:rPr>
-                        <a:t>$40.00</a:t>
-                      </a:r>
-                      <a:endParaRPr lang="en-US" sz="1100" b="0" i="0" u="none" strike="noStrike" dirty="0">
-                        <a:solidFill>
-                          <a:srgbClr val="000000"/>
-                        </a:solidFill>
-                        <a:effectLst/>
-                        <a:latin typeface="Calibri"/>
-                      </a:endParaRPr>
-                    </a:p>
-                  </a:txBody>
-                  <a:tcPr marL="12700" marR="12700" marT="12700" marB="0" anchor="ctr"/>
-                </a:tc>
-              </a:tr>
-              <a:tr h="334400">
-                <a:tc>
-                  <a:txBody>
-                    <a:bodyPr/>
-                    <a:lstStyle/>
-                    <a:p>
-                      <a:pPr algn="l" fontAlgn="b"/>
-                      <a:r>
-                        <a:rPr lang="en-US" sz="1100" u="none" strike="noStrike">
-                          <a:effectLst/>
-                        </a:rPr>
-                        <a:t>Wifi Module</a:t>
-                      </a:r>
-                      <a:endParaRPr lang="en-US" sz="1100" b="0" i="0" u="none" strike="noStrike">
-                        <a:solidFill>
-                          <a:srgbClr val="000000"/>
-                        </a:solidFill>
-                        <a:effectLst/>
-                        <a:latin typeface="Calibri"/>
-                      </a:endParaRPr>
-                    </a:p>
-                  </a:txBody>
-                  <a:tcPr marL="12700" marR="12700" marT="12700" marB="0" anchor="b"/>
-                </a:tc>
-                <a:tc>
-                  <a:txBody>
-                    <a:bodyPr/>
-                    <a:lstStyle/>
-                    <a:p>
-                      <a:pPr algn="ctr" fontAlgn="ctr"/>
-                      <a:r>
-                        <a:rPr lang="en-US" sz="1100" u="none" strike="noStrike">
-                          <a:effectLst/>
-                        </a:rPr>
-                        <a:t>$7.00</a:t>
-                      </a:r>
-                      <a:endParaRPr lang="en-US" sz="1100" b="0" i="0" u="none" strike="noStrike">
-                        <a:solidFill>
-                          <a:srgbClr val="000000"/>
-                        </a:solidFill>
-                        <a:effectLst/>
-                        <a:latin typeface="Calibri"/>
-                      </a:endParaRPr>
-                    </a:p>
-                  </a:txBody>
-                  <a:tcPr marL="12700" marR="12700" marT="12700" marB="0" anchor="ctr"/>
-                </a:tc>
-                <a:tc>
-                  <a:txBody>
-                    <a:bodyPr/>
-                    <a:lstStyle/>
-                    <a:p>
-                      <a:pPr algn="ctr" fontAlgn="ctr"/>
-                      <a:r>
-                        <a:rPr lang="en-US" sz="1100" u="none" strike="noStrike">
-                          <a:effectLst/>
-                        </a:rPr>
-                        <a:t>4</a:t>
-                      </a:r>
-                      <a:endParaRPr lang="en-US" sz="1100" b="0" i="0" u="none" strike="noStrike">
-                        <a:solidFill>
-                          <a:srgbClr val="000000"/>
-                        </a:solidFill>
-                        <a:effectLst/>
-                        <a:latin typeface="Calibri"/>
-                      </a:endParaRPr>
-                    </a:p>
-                  </a:txBody>
-                  <a:tcPr marL="12700" marR="12700" marT="12700" marB="0" anchor="ctr"/>
-                </a:tc>
-                <a:tc>
-                  <a:txBody>
-                    <a:bodyPr/>
-                    <a:lstStyle/>
-                    <a:p>
-                      <a:pPr algn="r" fontAlgn="ctr"/>
-                      <a:r>
-                        <a:rPr lang="en-US" sz="1100" u="none" strike="noStrike">
-                          <a:effectLst/>
-                        </a:rPr>
-                        <a:t>$28.00</a:t>
-                      </a:r>
-                      <a:endParaRPr lang="en-US" sz="1100" b="0" i="0" u="none" strike="noStrike">
-                        <a:solidFill>
-                          <a:srgbClr val="000000"/>
-                        </a:solidFill>
-                        <a:effectLst/>
-                        <a:latin typeface="Calibri"/>
-                      </a:endParaRPr>
-                    </a:p>
-                  </a:txBody>
-                  <a:tcPr marL="12700" marR="12700" marT="12700" marB="0" anchor="ctr"/>
-                </a:tc>
-              </a:tr>
-              <a:tr h="334400">
-                <a:tc>
-                  <a:txBody>
-                    <a:bodyPr/>
-                    <a:lstStyle/>
-                    <a:p>
-                      <a:pPr algn="l" fontAlgn="b"/>
-                      <a:r>
-                        <a:rPr lang="en-US" sz="1100" u="none" strike="noStrike">
-                          <a:effectLst/>
-                        </a:rPr>
-                        <a:t>Relay</a:t>
-                      </a:r>
-                      <a:endParaRPr lang="en-US" sz="1100" b="0" i="0" u="none" strike="noStrike">
-                        <a:solidFill>
-                          <a:srgbClr val="000000"/>
-                        </a:solidFill>
-                        <a:effectLst/>
-                        <a:latin typeface="Calibri"/>
-                      </a:endParaRPr>
-                    </a:p>
-                  </a:txBody>
-                  <a:tcPr marL="12700" marR="12700" marT="12700" marB="0" anchor="b"/>
-                </a:tc>
-                <a:tc>
-                  <a:txBody>
-                    <a:bodyPr/>
-                    <a:lstStyle/>
-                    <a:p>
-                      <a:pPr algn="ctr" fontAlgn="ctr"/>
-                      <a:r>
-                        <a:rPr lang="en-US" sz="1100" u="none" strike="noStrike" dirty="0">
-                          <a:effectLst/>
-                        </a:rPr>
-                        <a:t>$8.00</a:t>
-                      </a:r>
-                      <a:endParaRPr lang="en-US" sz="1100" b="0" i="0" u="none" strike="noStrike" dirty="0">
-                        <a:solidFill>
-                          <a:srgbClr val="000000"/>
-                        </a:solidFill>
-                        <a:effectLst/>
-                        <a:latin typeface="Calibri"/>
-                      </a:endParaRPr>
-                    </a:p>
-                  </a:txBody>
-                  <a:tcPr marL="12700" marR="12700" marT="12700" marB="0" anchor="ctr"/>
-                </a:tc>
-                <a:tc>
-                  <a:txBody>
-                    <a:bodyPr/>
-                    <a:lstStyle/>
-                    <a:p>
-                      <a:pPr algn="ctr" fontAlgn="ctr"/>
-                      <a:r>
-                        <a:rPr lang="en-US" sz="1100" u="none" strike="noStrike">
-                          <a:effectLst/>
-                        </a:rPr>
-                        <a:t>4</a:t>
-                      </a:r>
-                      <a:endParaRPr lang="en-US" sz="1100" b="0" i="0" u="none" strike="noStrike">
-                        <a:solidFill>
-                          <a:srgbClr val="000000"/>
-                        </a:solidFill>
-                        <a:effectLst/>
-                        <a:latin typeface="Calibri"/>
-                      </a:endParaRPr>
-                    </a:p>
-                  </a:txBody>
-                  <a:tcPr marL="12700" marR="12700" marT="12700" marB="0" anchor="ctr"/>
-                </a:tc>
-                <a:tc>
-                  <a:txBody>
-                    <a:bodyPr/>
-                    <a:lstStyle/>
-                    <a:p>
-                      <a:pPr algn="r" fontAlgn="ctr"/>
-                      <a:r>
-                        <a:rPr lang="en-US" sz="1100" u="none" strike="noStrike">
-                          <a:effectLst/>
-                        </a:rPr>
-                        <a:t>$32.00</a:t>
-                      </a:r>
-                      <a:endParaRPr lang="en-US" sz="1100" b="0" i="0" u="none" strike="noStrike">
-                        <a:solidFill>
-                          <a:srgbClr val="000000"/>
-                        </a:solidFill>
-                        <a:effectLst/>
-                        <a:latin typeface="Calibri"/>
-                      </a:endParaRPr>
-                    </a:p>
-                  </a:txBody>
-                  <a:tcPr marL="12700" marR="12700" marT="12700" marB="0" anchor="ctr"/>
-                </a:tc>
-              </a:tr>
-              <a:tr h="334400">
-                <a:tc>
-                  <a:txBody>
-                    <a:bodyPr/>
-                    <a:lstStyle/>
-                    <a:p>
-                      <a:pPr algn="l" fontAlgn="b"/>
-                      <a:r>
-                        <a:rPr lang="en-US" sz="1100" u="none" strike="noStrike">
-                          <a:effectLst/>
-                        </a:rPr>
-                        <a:t>Transformer</a:t>
-                      </a:r>
-                      <a:endParaRPr lang="en-US" sz="1100" b="0" i="0" u="none" strike="noStrike">
-                        <a:solidFill>
-                          <a:srgbClr val="000000"/>
-                        </a:solidFill>
-                        <a:effectLst/>
-                        <a:latin typeface="Calibri"/>
-                      </a:endParaRPr>
-                    </a:p>
-                  </a:txBody>
-                  <a:tcPr marL="12700" marR="12700" marT="12700" marB="0" anchor="b"/>
-                </a:tc>
-                <a:tc>
-                  <a:txBody>
-                    <a:bodyPr/>
-                    <a:lstStyle/>
-                    <a:p>
-                      <a:pPr algn="ctr" fontAlgn="ctr"/>
-                      <a:r>
-                        <a:rPr lang="en-US" sz="1100" u="none" strike="noStrike">
-                          <a:effectLst/>
-                        </a:rPr>
-                        <a:t>$7.00</a:t>
-                      </a:r>
-                      <a:endParaRPr lang="en-US" sz="1100" b="0" i="0" u="none" strike="noStrike">
-                        <a:solidFill>
-                          <a:srgbClr val="000000"/>
-                        </a:solidFill>
-                        <a:effectLst/>
-                        <a:latin typeface="Calibri"/>
-                      </a:endParaRPr>
-                    </a:p>
-                  </a:txBody>
-                  <a:tcPr marL="12700" marR="12700" marT="12700" marB="0" anchor="ctr"/>
-                </a:tc>
-                <a:tc>
-                  <a:txBody>
-                    <a:bodyPr/>
-                    <a:lstStyle/>
-                    <a:p>
-                      <a:pPr algn="ctr" fontAlgn="ctr"/>
-                      <a:r>
-                        <a:rPr lang="en-US" sz="1100" u="none" strike="noStrike">
-                          <a:effectLst/>
-                        </a:rPr>
-                        <a:t>4</a:t>
-                      </a:r>
-                      <a:endParaRPr lang="en-US" sz="1100" b="0" i="0" u="none" strike="noStrike">
-                        <a:solidFill>
-                          <a:srgbClr val="000000"/>
-                        </a:solidFill>
-                        <a:effectLst/>
-                        <a:latin typeface="Calibri"/>
-                      </a:endParaRPr>
-                    </a:p>
-                  </a:txBody>
-                  <a:tcPr marL="12700" marR="12700" marT="12700" marB="0" anchor="ctr"/>
-                </a:tc>
-                <a:tc>
-                  <a:txBody>
-                    <a:bodyPr/>
-                    <a:lstStyle/>
-                    <a:p>
-                      <a:pPr algn="r" fontAlgn="ctr"/>
-                      <a:r>
-                        <a:rPr lang="en-US" sz="1100" u="none" strike="noStrike">
-                          <a:effectLst/>
-                        </a:rPr>
-                        <a:t>$28.00</a:t>
-                      </a:r>
-                      <a:endParaRPr lang="en-US" sz="1100" b="0" i="0" u="none" strike="noStrike">
-                        <a:solidFill>
-                          <a:srgbClr val="000000"/>
-                        </a:solidFill>
-                        <a:effectLst/>
-                        <a:latin typeface="Calibri"/>
-                      </a:endParaRPr>
-                    </a:p>
-                  </a:txBody>
-                  <a:tcPr marL="12700" marR="12700" marT="12700" marB="0" anchor="ctr"/>
-                </a:tc>
-              </a:tr>
-              <a:tr h="334400">
-                <a:tc>
-                  <a:txBody>
-                    <a:bodyPr/>
-                    <a:lstStyle/>
-                    <a:p>
-                      <a:pPr algn="l" fontAlgn="b"/>
-                      <a:r>
-                        <a:rPr lang="en-US" sz="1100" u="none" strike="noStrike">
-                          <a:effectLst/>
-                        </a:rPr>
-                        <a:t>Micro SD Card</a:t>
-                      </a:r>
-                      <a:endParaRPr lang="en-US" sz="1100" b="0" i="0" u="none" strike="noStrike">
-                        <a:solidFill>
-                          <a:srgbClr val="000000"/>
-                        </a:solidFill>
-                        <a:effectLst/>
-                        <a:latin typeface="Calibri"/>
-                      </a:endParaRPr>
-                    </a:p>
-                  </a:txBody>
-                  <a:tcPr marL="12700" marR="12700" marT="12700" marB="0" anchor="b"/>
-                </a:tc>
-                <a:tc>
-                  <a:txBody>
-                    <a:bodyPr/>
-                    <a:lstStyle/>
-                    <a:p>
-                      <a:pPr algn="ctr" fontAlgn="ctr"/>
-                      <a:r>
-                        <a:rPr lang="en-US" sz="1100" u="none" strike="noStrike">
-                          <a:effectLst/>
-                        </a:rPr>
-                        <a:t>$13.00</a:t>
-                      </a:r>
-                      <a:endParaRPr lang="en-US" sz="1100" b="0" i="0" u="none" strike="noStrike">
-                        <a:solidFill>
-                          <a:srgbClr val="000000"/>
-                        </a:solidFill>
-                        <a:effectLst/>
-                        <a:latin typeface="Calibri"/>
-                      </a:endParaRPr>
-                    </a:p>
-                  </a:txBody>
-                  <a:tcPr marL="12700" marR="12700" marT="12700" marB="0" anchor="ctr"/>
-                </a:tc>
-                <a:tc>
-                  <a:txBody>
-                    <a:bodyPr/>
-                    <a:lstStyle/>
-                    <a:p>
-                      <a:pPr algn="ctr" fontAlgn="ctr"/>
-                      <a:r>
-                        <a:rPr lang="en-US" sz="1100" u="none" strike="noStrike">
-                          <a:effectLst/>
-                        </a:rPr>
-                        <a:t>1</a:t>
-                      </a:r>
-                      <a:endParaRPr lang="en-US" sz="1100" b="0" i="0" u="none" strike="noStrike">
-                        <a:solidFill>
-                          <a:srgbClr val="000000"/>
-                        </a:solidFill>
-                        <a:effectLst/>
-                        <a:latin typeface="Calibri"/>
-                      </a:endParaRPr>
-                    </a:p>
-                  </a:txBody>
-                  <a:tcPr marL="12700" marR="12700" marT="12700" marB="0" anchor="ctr"/>
-                </a:tc>
-                <a:tc>
-                  <a:txBody>
-                    <a:bodyPr/>
-                    <a:lstStyle/>
-                    <a:p>
-                      <a:pPr algn="r" fontAlgn="ctr"/>
-                      <a:r>
-                        <a:rPr lang="en-US" sz="1100" u="none" strike="noStrike">
-                          <a:effectLst/>
-                        </a:rPr>
-                        <a:t>$13.00</a:t>
-                      </a:r>
-                      <a:endParaRPr lang="en-US" sz="1100" b="0" i="0" u="none" strike="noStrike">
-                        <a:solidFill>
-                          <a:srgbClr val="000000"/>
-                        </a:solidFill>
-                        <a:effectLst/>
-                        <a:latin typeface="Calibri"/>
-                      </a:endParaRPr>
-                    </a:p>
-                  </a:txBody>
-                  <a:tcPr marL="12700" marR="12700" marT="12700" marB="0" anchor="ctr"/>
-                </a:tc>
-              </a:tr>
-              <a:tr h="334400">
-                <a:tc>
-                  <a:txBody>
-                    <a:bodyPr/>
-                    <a:lstStyle/>
-                    <a:p>
-                      <a:pPr algn="l" fontAlgn="b"/>
-                      <a:r>
-                        <a:rPr lang="en-US" sz="1100" u="none" strike="noStrike">
-                          <a:effectLst/>
-                        </a:rPr>
-                        <a:t>Button</a:t>
-                      </a:r>
-                      <a:endParaRPr lang="en-US" sz="1100" b="0" i="0" u="none" strike="noStrike">
-                        <a:solidFill>
-                          <a:srgbClr val="000000"/>
-                        </a:solidFill>
-                        <a:effectLst/>
-                        <a:latin typeface="Calibri"/>
-                      </a:endParaRPr>
-                    </a:p>
-                  </a:txBody>
-                  <a:tcPr marL="12700" marR="12700" marT="12700" marB="0" anchor="b"/>
-                </a:tc>
-                <a:tc>
-                  <a:txBody>
-                    <a:bodyPr/>
-                    <a:lstStyle/>
-                    <a:p>
-                      <a:pPr algn="ctr" fontAlgn="ctr"/>
-                      <a:r>
-                        <a:rPr lang="en-US" sz="1100" u="none" strike="noStrike">
-                          <a:effectLst/>
-                        </a:rPr>
-                        <a:t>$0.50</a:t>
-                      </a:r>
-                      <a:endParaRPr lang="en-US" sz="1100" b="0" i="0" u="none" strike="noStrike">
-                        <a:solidFill>
-                          <a:srgbClr val="000000"/>
-                        </a:solidFill>
-                        <a:effectLst/>
-                        <a:latin typeface="Calibri"/>
-                      </a:endParaRPr>
-                    </a:p>
-                  </a:txBody>
-                  <a:tcPr marL="12700" marR="12700" marT="12700" marB="0" anchor="ctr"/>
-                </a:tc>
-                <a:tc>
-                  <a:txBody>
-                    <a:bodyPr/>
-                    <a:lstStyle/>
-                    <a:p>
-                      <a:pPr algn="ctr" fontAlgn="ctr"/>
-                      <a:r>
-                        <a:rPr lang="en-US" sz="1100" u="none" strike="noStrike">
-                          <a:effectLst/>
-                        </a:rPr>
-                        <a:t>4</a:t>
-                      </a:r>
-                      <a:endParaRPr lang="en-US" sz="1100" b="0" i="0" u="none" strike="noStrike">
-                        <a:solidFill>
-                          <a:srgbClr val="000000"/>
-                        </a:solidFill>
-                        <a:effectLst/>
-                        <a:latin typeface="Calibri"/>
-                      </a:endParaRPr>
-                    </a:p>
-                  </a:txBody>
-                  <a:tcPr marL="12700" marR="12700" marT="12700" marB="0" anchor="ctr"/>
-                </a:tc>
-                <a:tc>
-                  <a:txBody>
-                    <a:bodyPr/>
-                    <a:lstStyle/>
-                    <a:p>
-                      <a:pPr algn="r" fontAlgn="ctr"/>
-                      <a:r>
-                        <a:rPr lang="en-US" sz="1100" u="none" strike="noStrike">
-                          <a:effectLst/>
-                        </a:rPr>
-                        <a:t>$2.00</a:t>
-                      </a:r>
-                      <a:endParaRPr lang="en-US" sz="1100" b="0" i="0" u="none" strike="noStrike">
-                        <a:solidFill>
-                          <a:srgbClr val="000000"/>
-                        </a:solidFill>
-                        <a:effectLst/>
-                        <a:latin typeface="Calibri"/>
-                      </a:endParaRPr>
-                    </a:p>
-                  </a:txBody>
-                  <a:tcPr marL="12700" marR="12700" marT="12700" marB="0" anchor="ctr"/>
-                </a:tc>
-              </a:tr>
-              <a:tr h="334400">
-                <a:tc>
-                  <a:txBody>
-                    <a:bodyPr/>
-                    <a:lstStyle/>
-                    <a:p>
-                      <a:pPr algn="l" fontAlgn="b"/>
-                      <a:r>
-                        <a:rPr lang="en-US" sz="1100" u="none" strike="noStrike">
-                          <a:effectLst/>
-                        </a:rPr>
-                        <a:t>LED</a:t>
-                      </a:r>
-                      <a:endParaRPr lang="en-US" sz="1100" b="0" i="0" u="none" strike="noStrike">
-                        <a:solidFill>
-                          <a:srgbClr val="000000"/>
-                        </a:solidFill>
-                        <a:effectLst/>
-                        <a:latin typeface="Calibri"/>
-                      </a:endParaRPr>
-                    </a:p>
-                  </a:txBody>
-                  <a:tcPr marL="12700" marR="12700" marT="12700" marB="0" anchor="b"/>
-                </a:tc>
-                <a:tc>
-                  <a:txBody>
-                    <a:bodyPr/>
-                    <a:lstStyle/>
-                    <a:p>
-                      <a:pPr algn="ctr" fontAlgn="ctr"/>
-                      <a:r>
-                        <a:rPr lang="en-US" sz="1100" u="none" strike="noStrike">
-                          <a:effectLst/>
-                        </a:rPr>
-                        <a:t>$0.35</a:t>
-                      </a:r>
-                      <a:endParaRPr lang="en-US" sz="1100" b="0" i="0" u="none" strike="noStrike">
-                        <a:solidFill>
-                          <a:srgbClr val="000000"/>
-                        </a:solidFill>
-                        <a:effectLst/>
-                        <a:latin typeface="Calibri"/>
-                      </a:endParaRPr>
-                    </a:p>
-                  </a:txBody>
-                  <a:tcPr marL="12700" marR="12700" marT="12700" marB="0" anchor="ctr"/>
-                </a:tc>
-                <a:tc>
-                  <a:txBody>
-                    <a:bodyPr/>
-                    <a:lstStyle/>
-                    <a:p>
-                      <a:pPr algn="ctr" fontAlgn="ctr"/>
-                      <a:r>
-                        <a:rPr lang="en-US" sz="1100" u="none" strike="noStrike">
-                          <a:effectLst/>
-                        </a:rPr>
-                        <a:t>4</a:t>
-                      </a:r>
-                      <a:endParaRPr lang="en-US" sz="1100" b="0" i="0" u="none" strike="noStrike">
-                        <a:solidFill>
-                          <a:srgbClr val="000000"/>
-                        </a:solidFill>
-                        <a:effectLst/>
-                        <a:latin typeface="Calibri"/>
-                      </a:endParaRPr>
-                    </a:p>
-                  </a:txBody>
-                  <a:tcPr marL="12700" marR="12700" marT="12700" marB="0" anchor="ctr"/>
-                </a:tc>
-                <a:tc>
-                  <a:txBody>
-                    <a:bodyPr/>
-                    <a:lstStyle/>
-                    <a:p>
-                      <a:pPr algn="r" fontAlgn="ctr"/>
-                      <a:r>
-                        <a:rPr lang="en-US" sz="1100" u="none" strike="noStrike">
-                          <a:effectLst/>
-                        </a:rPr>
-                        <a:t>$1.40</a:t>
-                      </a:r>
-                      <a:endParaRPr lang="en-US" sz="1100" b="0" i="0" u="none" strike="noStrike">
-                        <a:solidFill>
-                          <a:srgbClr val="000000"/>
-                        </a:solidFill>
-                        <a:effectLst/>
-                        <a:latin typeface="Calibri"/>
-                      </a:endParaRPr>
-                    </a:p>
-                  </a:txBody>
-                  <a:tcPr marL="12700" marR="12700" marT="12700" marB="0" anchor="ctr"/>
-                </a:tc>
-              </a:tr>
-              <a:tr h="334400">
-                <a:tc>
-                  <a:txBody>
-                    <a:bodyPr/>
-                    <a:lstStyle/>
-                    <a:p>
-                      <a:pPr algn="l" fontAlgn="b"/>
-                      <a:r>
-                        <a:rPr lang="en-US" sz="1100" u="none" strike="noStrike">
-                          <a:effectLst/>
-                        </a:rPr>
-                        <a:t>Rasberry Pi</a:t>
-                      </a:r>
-                      <a:endParaRPr lang="en-US" sz="1100" b="0" i="0" u="none" strike="noStrike">
-                        <a:solidFill>
-                          <a:srgbClr val="000000"/>
-                        </a:solidFill>
-                        <a:effectLst/>
-                        <a:latin typeface="Calibri"/>
-                      </a:endParaRPr>
-                    </a:p>
-                  </a:txBody>
-                  <a:tcPr marL="12700" marR="12700" marT="12700" marB="0" anchor="b"/>
-                </a:tc>
-                <a:tc>
-                  <a:txBody>
-                    <a:bodyPr/>
-                    <a:lstStyle/>
-                    <a:p>
-                      <a:pPr algn="ctr" fontAlgn="ctr"/>
-                      <a:r>
-                        <a:rPr lang="en-US" sz="1100" u="none" strike="noStrike">
-                          <a:effectLst/>
-                        </a:rPr>
-                        <a:t>$42.00</a:t>
-                      </a:r>
-                      <a:endParaRPr lang="en-US" sz="1100" b="0" i="0" u="none" strike="noStrike">
-                        <a:solidFill>
-                          <a:srgbClr val="000000"/>
-                        </a:solidFill>
-                        <a:effectLst/>
-                        <a:latin typeface="Calibri"/>
-                      </a:endParaRPr>
-                    </a:p>
-                  </a:txBody>
-                  <a:tcPr marL="12700" marR="12700" marT="12700" marB="0" anchor="ctr"/>
-                </a:tc>
-                <a:tc>
-                  <a:txBody>
-                    <a:bodyPr/>
-                    <a:lstStyle/>
-                    <a:p>
-                      <a:pPr algn="ctr" fontAlgn="ctr"/>
-                      <a:r>
-                        <a:rPr lang="en-US" sz="1100" u="none" strike="noStrike">
-                          <a:effectLst/>
-                        </a:rPr>
-                        <a:t>1</a:t>
-                      </a:r>
-                      <a:endParaRPr lang="en-US" sz="1100" b="0" i="0" u="none" strike="noStrike">
-                        <a:solidFill>
-                          <a:srgbClr val="000000"/>
-                        </a:solidFill>
-                        <a:effectLst/>
-                        <a:latin typeface="Calibri"/>
-                      </a:endParaRPr>
-                    </a:p>
-                  </a:txBody>
-                  <a:tcPr marL="12700" marR="12700" marT="12700" marB="0" anchor="ctr"/>
-                </a:tc>
-                <a:tc>
-                  <a:txBody>
-                    <a:bodyPr/>
-                    <a:lstStyle/>
-                    <a:p>
-                      <a:pPr algn="r" fontAlgn="ctr"/>
-                      <a:r>
-                        <a:rPr lang="en-US" sz="1100" u="none" strike="noStrike">
-                          <a:effectLst/>
-                        </a:rPr>
-                        <a:t>$42.00</a:t>
-                      </a:r>
-                      <a:endParaRPr lang="en-US" sz="1100" b="0" i="0" u="none" strike="noStrike">
-                        <a:solidFill>
-                          <a:srgbClr val="000000"/>
-                        </a:solidFill>
-                        <a:effectLst/>
-                        <a:latin typeface="Calibri"/>
-                      </a:endParaRPr>
-                    </a:p>
-                  </a:txBody>
-                  <a:tcPr marL="12700" marR="12700" marT="12700" marB="0" anchor="ctr"/>
-                </a:tc>
-              </a:tr>
-              <a:tr h="334400">
-                <a:tc>
-                  <a:txBody>
-                    <a:bodyPr/>
-                    <a:lstStyle/>
-                    <a:p>
-                      <a:pPr algn="l" fontAlgn="b"/>
-                      <a:r>
-                        <a:rPr lang="en-US" sz="1100" u="none" strike="noStrike">
-                          <a:effectLst/>
-                        </a:rPr>
-                        <a:t>Wifi Source Module</a:t>
-                      </a:r>
-                      <a:endParaRPr lang="en-US" sz="1100" b="0" i="0" u="none" strike="noStrike">
-                        <a:solidFill>
-                          <a:srgbClr val="000000"/>
-                        </a:solidFill>
-                        <a:effectLst/>
-                        <a:latin typeface="Calibri"/>
-                      </a:endParaRPr>
-                    </a:p>
-                  </a:txBody>
-                  <a:tcPr marL="12700" marR="12700" marT="12700" marB="0" anchor="b"/>
-                </a:tc>
-                <a:tc>
-                  <a:txBody>
-                    <a:bodyPr/>
-                    <a:lstStyle/>
-                    <a:p>
-                      <a:pPr algn="ctr" fontAlgn="ctr"/>
-                      <a:r>
-                        <a:rPr lang="en-US" sz="1100" u="none" strike="noStrike">
-                          <a:effectLst/>
-                        </a:rPr>
-                        <a:t>$20.00</a:t>
-                      </a:r>
-                      <a:endParaRPr lang="en-US" sz="1100" b="0" i="0" u="none" strike="noStrike">
-                        <a:solidFill>
-                          <a:srgbClr val="000000"/>
-                        </a:solidFill>
-                        <a:effectLst/>
-                        <a:latin typeface="Calibri"/>
-                      </a:endParaRPr>
-                    </a:p>
-                  </a:txBody>
-                  <a:tcPr marL="12700" marR="12700" marT="12700" marB="0" anchor="ctr"/>
-                </a:tc>
-                <a:tc>
-                  <a:txBody>
-                    <a:bodyPr/>
-                    <a:lstStyle/>
-                    <a:p>
-                      <a:pPr algn="ctr" fontAlgn="ctr"/>
-                      <a:r>
-                        <a:rPr lang="en-US" sz="1100" u="none" strike="noStrike">
-                          <a:effectLst/>
-                        </a:rPr>
-                        <a:t>1</a:t>
-                      </a:r>
-                      <a:endParaRPr lang="en-US" sz="1100" b="0" i="0" u="none" strike="noStrike">
-                        <a:solidFill>
-                          <a:srgbClr val="000000"/>
-                        </a:solidFill>
-                        <a:effectLst/>
-                        <a:latin typeface="Calibri"/>
-                      </a:endParaRPr>
-                    </a:p>
-                  </a:txBody>
-                  <a:tcPr marL="12700" marR="12700" marT="12700" marB="0" anchor="ctr"/>
-                </a:tc>
-                <a:tc>
-                  <a:txBody>
-                    <a:bodyPr/>
-                    <a:lstStyle/>
-                    <a:p>
-                      <a:pPr algn="r" fontAlgn="ctr"/>
-                      <a:r>
-                        <a:rPr lang="en-US" sz="1100" u="none" strike="noStrike">
-                          <a:effectLst/>
-                        </a:rPr>
-                        <a:t>$20.00</a:t>
-                      </a:r>
-                      <a:endParaRPr lang="en-US" sz="1100" b="0" i="0" u="none" strike="noStrike">
-                        <a:solidFill>
-                          <a:srgbClr val="000000"/>
-                        </a:solidFill>
-                        <a:effectLst/>
-                        <a:latin typeface="Calibri"/>
-                      </a:endParaRPr>
-                    </a:p>
-                  </a:txBody>
-                  <a:tcPr marL="12700" marR="12700" marT="12700" marB="0" anchor="ctr"/>
-                </a:tc>
-              </a:tr>
-              <a:tr h="334400">
-                <a:tc>
-                  <a:txBody>
-                    <a:bodyPr/>
-                    <a:lstStyle/>
-                    <a:p>
-                      <a:pPr algn="l" fontAlgn="b"/>
-                      <a:r>
-                        <a:rPr lang="en-US" sz="1100" u="none" strike="noStrike">
-                          <a:effectLst/>
-                        </a:rPr>
-                        <a:t>Wall Adapter</a:t>
-                      </a:r>
-                      <a:endParaRPr lang="en-US" sz="1100" b="0" i="0" u="none" strike="noStrike">
-                        <a:solidFill>
-                          <a:srgbClr val="000000"/>
-                        </a:solidFill>
-                        <a:effectLst/>
-                        <a:latin typeface="Calibri"/>
-                      </a:endParaRPr>
-                    </a:p>
-                  </a:txBody>
-                  <a:tcPr marL="12700" marR="12700" marT="12700" marB="0" anchor="b"/>
-                </a:tc>
-                <a:tc>
-                  <a:txBody>
-                    <a:bodyPr/>
-                    <a:lstStyle/>
-                    <a:p>
-                      <a:pPr algn="ctr" fontAlgn="ctr"/>
-                      <a:r>
-                        <a:rPr lang="en-US" sz="1100" u="none" strike="noStrike" dirty="0">
-                          <a:effectLst/>
-                        </a:rPr>
-                        <a:t>$3.00</a:t>
-                      </a:r>
-                      <a:endParaRPr lang="en-US" sz="1100" b="0" i="0" u="none" strike="noStrike" dirty="0">
-                        <a:solidFill>
-                          <a:srgbClr val="000000"/>
-                        </a:solidFill>
-                        <a:effectLst/>
-                        <a:latin typeface="Calibri"/>
-                      </a:endParaRPr>
-                    </a:p>
-                  </a:txBody>
-                  <a:tcPr marL="12700" marR="12700" marT="12700" marB="0" anchor="ctr"/>
-                </a:tc>
-                <a:tc>
-                  <a:txBody>
-                    <a:bodyPr/>
-                    <a:lstStyle/>
-                    <a:p>
-                      <a:pPr algn="ctr" fontAlgn="ctr"/>
-                      <a:r>
-                        <a:rPr lang="en-US" sz="1100" u="none" strike="noStrike">
-                          <a:effectLst/>
-                        </a:rPr>
-                        <a:t>1</a:t>
-                      </a:r>
-                      <a:endParaRPr lang="en-US" sz="1100" b="0" i="0" u="none" strike="noStrike">
-                        <a:solidFill>
-                          <a:srgbClr val="000000"/>
-                        </a:solidFill>
-                        <a:effectLst/>
-                        <a:latin typeface="Calibri"/>
-                      </a:endParaRPr>
-                    </a:p>
-                  </a:txBody>
-                  <a:tcPr marL="12700" marR="12700" marT="12700" marB="0" anchor="ctr"/>
-                </a:tc>
-                <a:tc>
-                  <a:txBody>
-                    <a:bodyPr/>
-                    <a:lstStyle/>
-                    <a:p>
-                      <a:pPr algn="r" fontAlgn="ctr"/>
-                      <a:r>
-                        <a:rPr lang="en-US" sz="1100" u="none" strike="noStrike">
-                          <a:effectLst/>
-                        </a:rPr>
-                        <a:t>$3.00</a:t>
-                      </a:r>
-                      <a:endParaRPr lang="en-US" sz="1100" b="0" i="0" u="none" strike="noStrike">
-                        <a:solidFill>
-                          <a:srgbClr val="000000"/>
-                        </a:solidFill>
-                        <a:effectLst/>
-                        <a:latin typeface="Calibri"/>
-                      </a:endParaRPr>
-                    </a:p>
-                  </a:txBody>
-                  <a:tcPr marL="12700" marR="12700" marT="12700" marB="0" anchor="ctr"/>
-                </a:tc>
-              </a:tr>
-              <a:tr h="334400">
-                <a:tc>
-                  <a:txBody>
-                    <a:bodyPr/>
-                    <a:lstStyle/>
-                    <a:p>
-                      <a:pPr algn="l" fontAlgn="b"/>
-                      <a:r>
-                        <a:rPr lang="en-US" sz="1100" u="none" strike="noStrike">
-                          <a:effectLst/>
-                        </a:rPr>
-                        <a:t>Programming Board</a:t>
-                      </a:r>
-                      <a:endParaRPr lang="en-US" sz="1100" b="0" i="0" u="none" strike="noStrike">
-                        <a:solidFill>
-                          <a:srgbClr val="000000"/>
-                        </a:solidFill>
-                        <a:effectLst/>
-                        <a:latin typeface="Calibri"/>
-                      </a:endParaRPr>
-                    </a:p>
-                  </a:txBody>
-                  <a:tcPr marL="12700" marR="12700" marT="12700" marB="0" anchor="b"/>
-                </a:tc>
-                <a:tc>
-                  <a:txBody>
-                    <a:bodyPr/>
-                    <a:lstStyle/>
-                    <a:p>
-                      <a:pPr algn="ctr" fontAlgn="ctr"/>
-                      <a:r>
-                        <a:rPr lang="en-US" sz="1100" u="none" strike="noStrike">
-                          <a:effectLst/>
-                        </a:rPr>
-                        <a:t>$15.00</a:t>
-                      </a:r>
-                      <a:endParaRPr lang="en-US" sz="1100" b="0" i="0" u="none" strike="noStrike">
-                        <a:solidFill>
-                          <a:srgbClr val="000000"/>
-                        </a:solidFill>
-                        <a:effectLst/>
-                        <a:latin typeface="Calibri"/>
-                      </a:endParaRPr>
-                    </a:p>
-                  </a:txBody>
-                  <a:tcPr marL="12700" marR="12700" marT="12700" marB="0" anchor="ctr"/>
-                </a:tc>
-                <a:tc>
-                  <a:txBody>
-                    <a:bodyPr/>
-                    <a:lstStyle/>
-                    <a:p>
-                      <a:pPr algn="ctr" fontAlgn="b"/>
-                      <a:r>
-                        <a:rPr lang="en-US" sz="1100" u="none" strike="noStrike">
-                          <a:effectLst/>
-                        </a:rPr>
-                        <a:t>1</a:t>
-                      </a:r>
-                      <a:endParaRPr lang="en-US" sz="1100" b="0" i="0" u="none" strike="noStrike">
-                        <a:solidFill>
-                          <a:srgbClr val="000000"/>
-                        </a:solidFill>
-                        <a:effectLst/>
-                        <a:latin typeface="Calibri"/>
-                      </a:endParaRPr>
-                    </a:p>
-                  </a:txBody>
-                  <a:tcPr marL="12700" marR="12700" marT="12700" marB="0" anchor="b"/>
-                </a:tc>
-                <a:tc>
-                  <a:txBody>
-                    <a:bodyPr/>
-                    <a:lstStyle/>
-                    <a:p>
-                      <a:pPr algn="r" fontAlgn="ctr"/>
-                      <a:r>
-                        <a:rPr lang="en-US" sz="1100" u="none" strike="noStrike" dirty="0">
-                          <a:effectLst/>
-                        </a:rPr>
-                        <a:t>$15.00</a:t>
-                      </a:r>
-                      <a:endParaRPr lang="en-US" sz="1100" b="0" i="0" u="none" strike="noStrike" dirty="0">
-                        <a:solidFill>
-                          <a:srgbClr val="000000"/>
-                        </a:solidFill>
-                        <a:effectLst/>
-                        <a:latin typeface="Calibri"/>
-                      </a:endParaRPr>
-                    </a:p>
-                  </a:txBody>
-                  <a:tcPr marL="12700" marR="12700" marT="12700" marB="0" anchor="ctr"/>
-                </a:tc>
-              </a:tr>
-              <a:tr h="353239">
-                <a:tc>
-                  <a:txBody>
-                    <a:bodyPr/>
-                    <a:lstStyle/>
-                    <a:p>
-                      <a:pPr algn="l" fontAlgn="b"/>
-                      <a:r>
-                        <a:rPr lang="en-US" sz="1100" u="none" strike="noStrike">
-                          <a:effectLst/>
-                        </a:rPr>
-                        <a:t>3D Printing Materials</a:t>
-                      </a:r>
-                      <a:endParaRPr lang="en-US" sz="1100" b="0" i="0" u="none" strike="noStrike">
-                        <a:solidFill>
-                          <a:srgbClr val="000000"/>
-                        </a:solidFill>
-                        <a:effectLst/>
-                        <a:latin typeface="Calibri"/>
-                      </a:endParaRPr>
-                    </a:p>
-                  </a:txBody>
-                  <a:tcPr marL="12700" marR="12700" marT="12700" marB="0" anchor="b"/>
-                </a:tc>
-                <a:tc>
-                  <a:txBody>
-                    <a:bodyPr/>
-                    <a:lstStyle/>
-                    <a:p>
-                      <a:pPr algn="ctr" fontAlgn="b"/>
-                      <a:r>
-                        <a:rPr lang="en-US" sz="1100" u="none" strike="noStrike">
-                          <a:effectLst/>
-                        </a:rPr>
-                        <a:t>$20.00</a:t>
-                      </a:r>
-                      <a:endParaRPr lang="en-US" sz="1100" b="0" i="0" u="none" strike="noStrike">
-                        <a:solidFill>
-                          <a:srgbClr val="000000"/>
-                        </a:solidFill>
-                        <a:effectLst/>
-                        <a:latin typeface="Calibri"/>
-                      </a:endParaRPr>
-                    </a:p>
-                  </a:txBody>
-                  <a:tcPr marL="12700" marR="12700" marT="12700" marB="0" anchor="b"/>
-                </a:tc>
-                <a:tc>
-                  <a:txBody>
-                    <a:bodyPr/>
-                    <a:lstStyle/>
-                    <a:p>
-                      <a:pPr algn="ctr" fontAlgn="ctr"/>
-                      <a:r>
-                        <a:rPr lang="en-US" sz="1100" u="none" strike="noStrike">
-                          <a:effectLst/>
-                        </a:rPr>
-                        <a:t>1</a:t>
-                      </a:r>
-                      <a:endParaRPr lang="en-US" sz="1100" b="0" i="0" u="none" strike="noStrike">
-                        <a:solidFill>
-                          <a:srgbClr val="000000"/>
-                        </a:solidFill>
-                        <a:effectLst/>
-                        <a:latin typeface="Calibri"/>
-                      </a:endParaRPr>
-                    </a:p>
-                  </a:txBody>
-                  <a:tcPr marL="12700" marR="12700" marT="12700" marB="0" anchor="ctr"/>
-                </a:tc>
-                <a:tc>
-                  <a:txBody>
-                    <a:bodyPr/>
-                    <a:lstStyle/>
-                    <a:p>
-                      <a:pPr algn="r" fontAlgn="ctr"/>
-                      <a:r>
-                        <a:rPr lang="en-US" sz="1100" u="none" strike="noStrike">
-                          <a:effectLst/>
-                        </a:rPr>
-                        <a:t>$20.00</a:t>
-                      </a:r>
-                      <a:endParaRPr lang="en-US" sz="1100" b="0" i="0" u="none" strike="noStrike">
-                        <a:solidFill>
-                          <a:srgbClr val="000000"/>
-                        </a:solidFill>
-                        <a:effectLst/>
-                        <a:latin typeface="Calibri"/>
-                      </a:endParaRPr>
-                    </a:p>
-                  </a:txBody>
-                  <a:tcPr marL="12700" marR="12700" marT="12700" marB="0" anchor="ctr"/>
-                </a:tc>
-              </a:tr>
-              <a:tr h="353239">
-                <a:tc>
-                  <a:txBody>
-                    <a:bodyPr/>
-                    <a:lstStyle/>
-                    <a:p>
-                      <a:pPr algn="l" fontAlgn="b"/>
-                      <a:r>
-                        <a:rPr lang="en-US" sz="1100" u="none" strike="noStrike">
-                          <a:effectLst/>
-                        </a:rPr>
-                        <a:t>Totals</a:t>
-                      </a:r>
-                      <a:endParaRPr lang="en-US" sz="1100" b="1" i="0" u="none" strike="noStrike">
-                        <a:solidFill>
-                          <a:srgbClr val="000000"/>
-                        </a:solidFill>
-                        <a:effectLst/>
-                        <a:latin typeface="Calibri"/>
-                      </a:endParaRPr>
-                    </a:p>
-                  </a:txBody>
-                  <a:tcPr marL="12700" marR="12700" marT="12700" marB="0" anchor="b"/>
-                </a:tc>
-                <a:tc>
-                  <a:txBody>
-                    <a:bodyPr/>
-                    <a:lstStyle/>
-                    <a:p>
-                      <a:pPr algn="l" fontAlgn="b"/>
-                      <a:r>
-                        <a:rPr lang="en-US" sz="1100" u="none" strike="noStrike">
-                          <a:effectLst/>
-                        </a:rPr>
-                        <a:t> </a:t>
-                      </a:r>
-                      <a:endParaRPr lang="en-US" sz="1100" b="0" i="0" u="none" strike="noStrike">
-                        <a:solidFill>
-                          <a:srgbClr val="000000"/>
-                        </a:solidFill>
-                        <a:effectLst/>
-                        <a:latin typeface="Calibri"/>
-                      </a:endParaRPr>
-                    </a:p>
-                  </a:txBody>
-                  <a:tcPr marL="12700" marR="12700" marT="12700" marB="0" anchor="b"/>
-                </a:tc>
-                <a:tc>
-                  <a:txBody>
-                    <a:bodyPr/>
-                    <a:lstStyle/>
-                    <a:p>
-                      <a:pPr algn="l" fontAlgn="b"/>
-                      <a:r>
-                        <a:rPr lang="en-US" sz="1100" u="none" strike="noStrike">
-                          <a:effectLst/>
-                        </a:rPr>
-                        <a:t> </a:t>
-                      </a:r>
-                      <a:endParaRPr lang="en-US" sz="1100" b="0" i="0" u="none" strike="noStrike">
-                        <a:solidFill>
-                          <a:srgbClr val="000000"/>
-                        </a:solidFill>
-                        <a:effectLst/>
-                        <a:latin typeface="Calibri"/>
-                      </a:endParaRPr>
-                    </a:p>
-                  </a:txBody>
-                  <a:tcPr marL="12700" marR="12700" marT="12700" marB="0" anchor="b"/>
-                </a:tc>
-                <a:tc>
-                  <a:txBody>
-                    <a:bodyPr/>
-                    <a:lstStyle/>
-                    <a:p>
-                      <a:pPr algn="r" fontAlgn="b"/>
-                      <a:r>
-                        <a:rPr lang="en-US" sz="1100" u="none" strike="noStrike" dirty="0">
-                          <a:effectLst/>
-                        </a:rPr>
-                        <a:t>$284.40</a:t>
-                      </a:r>
-                      <a:endParaRPr lang="en-US" sz="1100" b="0" i="0" u="none" strike="noStrike" dirty="0">
-                        <a:solidFill>
-                          <a:srgbClr val="000000"/>
-                        </a:solidFill>
-                        <a:effectLst/>
-                        <a:latin typeface="Calibri"/>
-                      </a:endParaRPr>
-                    </a:p>
-                  </a:txBody>
-                  <a:tcPr marL="12700" marR="12700" marT="12700" marB="0" anchor="b"/>
-                </a:tc>
-              </a:tr>
-            </a:tbl>
-          </a:graphicData>
-        </a:graphic>
-      </p:graphicFrame>
-    </p:spTree>
-    <p:extLst>
-      <p:ext uri="{BB962C8B-B14F-4D97-AF65-F5344CB8AC3E}">
-        <p14:creationId xmlns:p14="http://schemas.microsoft.com/office/powerpoint/2010/main" val="1499879029"/>
-      </p:ext>
-    </p:extLst>
-  </p:cSld>
-  <p:clrMapOvr>
-    <a:masterClrMapping/>
-  </p:clrMapOvr>
-  <p:timing>
-    <p:tnLst>
-      <p:par>
-        <p:cTn xmlns:p14="http://schemas.microsoft.com/office/powerpoint/2010/main" id="1" dur="indefinite" restart="never" nodeType="tmRoot"/>
-      </p:par>
-    </p:tnLst>
-  </p:timing>
-</p:sld>
-</file>
-
-<file path=ppt/slides/slide7.xml><?xml version="1.0" encoding="utf-8"?>
-<p:sld xmlns:a="http://schemas.openxmlformats.org/drawingml/2006/main" xmlns:r="http://schemas.openxmlformats.org/officeDocument/2006/relationships" xmlns:p="http://schemas.openxmlformats.org/presentationml/2006/main">
-  <p:cSld>
-    <p:spTree>
-      <p:nvGrpSpPr>
-        <p:cNvPr id="1" name=""/>
-        <p:cNvGrpSpPr/>
-        <p:nvPr/>
-      </p:nvGrpSpPr>
-      <p:grpSpPr>
-        <a:xfrm>
-          <a:off x="0" y="0"/>
-          <a:ext cx="0" cy="0"/>
-          <a:chOff x="0" y="0"/>
-          <a:chExt cx="0" cy="0"/>
-        </a:xfrm>
-      </p:grpSpPr>
-      <p:sp>
-        <p:nvSpPr>
-          <p:cNvPr id="2" name="Title 1"/>
-          <p:cNvSpPr>
-            <a:spLocks noGrp="1"/>
-          </p:cNvSpPr>
-          <p:nvPr>
-            <p:ph type="title"/>
-          </p:nvPr>
-        </p:nvSpPr>
-        <p:spPr/>
-        <p:txBody>
-          <a:bodyPr/>
-          <a:lstStyle/>
-          <a:p>
-            <a:r>
-              <a:rPr lang="en-US" dirty="0" smtClean="0"/>
-              <a:t>How ours is different</a:t>
-            </a:r>
-            <a:endParaRPr lang="en-US" dirty="0"/>
-          </a:p>
-        </p:txBody>
-      </p:sp>
-      <p:sp>
-        <p:nvSpPr>
-          <p:cNvPr id="3" name="Content Placeholder 2"/>
-          <p:cNvSpPr>
-            <a:spLocks noGrp="1"/>
-          </p:cNvSpPr>
-          <p:nvPr>
-            <p:ph idx="1"/>
-          </p:nvPr>
-        </p:nvSpPr>
-        <p:spPr/>
-        <p:txBody>
-          <a:bodyPr/>
-          <a:lstStyle/>
-          <a:p>
-            <a:r>
-              <a:rPr lang="en-US" dirty="0" smtClean="0"/>
-              <a:t>From Wi-Fi </a:t>
-            </a:r>
-            <a:r>
-              <a:rPr lang="en-US" dirty="0" err="1" smtClean="0"/>
-              <a:t>lightbulbs</a:t>
-            </a:r>
-            <a:endParaRPr lang="en-US" dirty="0"/>
-          </a:p>
-          <a:p>
-            <a:pPr lvl="1"/>
-            <a:r>
-              <a:rPr lang="en-US" dirty="0" smtClean="0"/>
-              <a:t>Don’t need to replace an expensive </a:t>
-            </a:r>
-            <a:r>
-              <a:rPr lang="en-US" dirty="0" err="1" smtClean="0"/>
-              <a:t>lightbulb</a:t>
-            </a:r>
-            <a:r>
-              <a:rPr lang="en-US" dirty="0" smtClean="0"/>
-              <a:t> whenever it dies</a:t>
-            </a:r>
-          </a:p>
-          <a:p>
-            <a:pPr lvl="1"/>
-            <a:r>
-              <a:rPr lang="en-US" dirty="0" smtClean="0"/>
-              <a:t>More sophisticated and synchronized system/setup</a:t>
-            </a:r>
-          </a:p>
-          <a:p>
-            <a:r>
-              <a:rPr lang="en-US" dirty="0" smtClean="0"/>
-              <a:t>From similar switches (</a:t>
-            </a:r>
-            <a:r>
-              <a:rPr lang="en-US" dirty="0" err="1" smtClean="0"/>
-              <a:t>Wemo</a:t>
-            </a:r>
-            <a:r>
-              <a:rPr lang="en-US" dirty="0" smtClean="0"/>
-              <a:t>)</a:t>
-            </a:r>
-          </a:p>
-          <a:p>
-            <a:pPr lvl="1"/>
-            <a:r>
-              <a:rPr lang="en-US" dirty="0" smtClean="0"/>
-              <a:t>Motion Sensor</a:t>
-            </a:r>
-          </a:p>
-          <a:p>
-            <a:pPr lvl="1"/>
-            <a:r>
-              <a:rPr lang="en-US" dirty="0" smtClean="0"/>
-              <a:t>Rules</a:t>
-            </a:r>
-          </a:p>
-        </p:txBody>
-      </p:sp>
-    </p:spTree>
-    <p:extLst>
-      <p:ext uri="{BB962C8B-B14F-4D97-AF65-F5344CB8AC3E}">
-        <p14:creationId xmlns:p14="http://schemas.microsoft.com/office/powerpoint/2010/main" val="3903585292"/>
       </p:ext>
     </p:extLst>
   </p:cSld>
@@ -14307,16 +13477,1597 @@
           <a:p>
             <a:r>
               <a:rPr lang="en-US" dirty="0" smtClean="0"/>
-              <a:t>Questions?</a:t>
+              <a:t>Budget</a:t>
             </a:r>
             <a:endParaRPr lang="en-US" dirty="0"/>
+          </a:p>
+        </p:txBody>
+      </p:sp>
+      <p:graphicFrame>
+        <p:nvGraphicFramePr>
+          <p:cNvPr id="4" name="Table 3"/>
+          <p:cNvGraphicFramePr>
+            <a:graphicFrameLocks noGrp="1"/>
+          </p:cNvGraphicFramePr>
+          <p:nvPr>
+            <p:extLst>
+              <p:ext uri="{D42A27DB-BD31-4B8C-83A1-F6EECF244321}">
+                <p14:modId xmlns:p14="http://schemas.microsoft.com/office/powerpoint/2010/main" val="2089835287"/>
+              </p:ext>
+            </p:extLst>
+          </p:nvPr>
+        </p:nvGraphicFramePr>
+        <p:xfrm>
+          <a:off x="685800" y="1360584"/>
+          <a:ext cx="7770813" cy="5209102"/>
+        </p:xfrm>
+        <a:graphic>
+          <a:graphicData uri="http://schemas.openxmlformats.org/drawingml/2006/table">
+            <a:tbl>
+              <a:tblPr>
+                <a:tableStyleId>{3C2FFA5D-87B4-456A-9821-1D502468CF0F}</a:tableStyleId>
+              </a:tblPr>
+              <a:tblGrid>
+                <a:gridCol w="1501806"/>
+                <a:gridCol w="2466269"/>
+                <a:gridCol w="1446694"/>
+                <a:gridCol w="2356044"/>
+              </a:tblGrid>
+              <a:tr h="470985">
+                <a:tc>
+                  <a:txBody>
+                    <a:bodyPr/>
+                    <a:lstStyle/>
+                    <a:p>
+                      <a:pPr algn="l" fontAlgn="b"/>
+                      <a:r>
+                        <a:rPr lang="en-US" sz="1500" u="none" strike="noStrike">
+                          <a:effectLst/>
+                        </a:rPr>
+                        <a:t>Part List</a:t>
+                      </a:r>
+                      <a:endParaRPr lang="en-US" sz="1500" b="1" i="0" u="none" strike="noStrike">
+                        <a:solidFill>
+                          <a:srgbClr val="44546A"/>
+                        </a:solidFill>
+                        <a:effectLst/>
+                        <a:latin typeface="Calibri"/>
+                      </a:endParaRPr>
+                    </a:p>
+                  </a:txBody>
+                  <a:tcPr marL="12700" marR="12700" marT="12700" marB="0" anchor="b"/>
+                </a:tc>
+                <a:tc>
+                  <a:txBody>
+                    <a:bodyPr/>
+                    <a:lstStyle/>
+                    <a:p>
+                      <a:pPr algn="l" fontAlgn="b"/>
+                      <a:r>
+                        <a:rPr lang="en-US" sz="1500" u="none" strike="noStrike" dirty="0">
+                          <a:effectLst/>
+                        </a:rPr>
+                        <a:t>Cost Estimate Per Part</a:t>
+                      </a:r>
+                      <a:endParaRPr lang="en-US" sz="1500" b="1" i="0" u="none" strike="noStrike" dirty="0">
+                        <a:solidFill>
+                          <a:srgbClr val="44546A"/>
+                        </a:solidFill>
+                        <a:effectLst/>
+                        <a:latin typeface="Calibri"/>
+                      </a:endParaRPr>
+                    </a:p>
+                  </a:txBody>
+                  <a:tcPr marL="12700" marR="12700" marT="12700" marB="0" anchor="b"/>
+                </a:tc>
+                <a:tc>
+                  <a:txBody>
+                    <a:bodyPr/>
+                    <a:lstStyle/>
+                    <a:p>
+                      <a:pPr algn="l" fontAlgn="b"/>
+                      <a:r>
+                        <a:rPr lang="en-US" sz="1500" u="none" strike="noStrike">
+                          <a:effectLst/>
+                        </a:rPr>
+                        <a:t>Quantity</a:t>
+                      </a:r>
+                      <a:endParaRPr lang="en-US" sz="1500" b="1" i="0" u="none" strike="noStrike">
+                        <a:solidFill>
+                          <a:srgbClr val="44546A"/>
+                        </a:solidFill>
+                        <a:effectLst/>
+                        <a:latin typeface="Calibri"/>
+                      </a:endParaRPr>
+                    </a:p>
+                  </a:txBody>
+                  <a:tcPr marL="12700" marR="12700" marT="12700" marB="0" anchor="b"/>
+                </a:tc>
+                <a:tc>
+                  <a:txBody>
+                    <a:bodyPr/>
+                    <a:lstStyle/>
+                    <a:p>
+                      <a:pPr algn="r" fontAlgn="b"/>
+                      <a:r>
+                        <a:rPr lang="en-US" sz="1500" u="none" strike="noStrike">
+                          <a:effectLst/>
+                        </a:rPr>
+                        <a:t>Cost Estimate(-tax)</a:t>
+                      </a:r>
+                      <a:endParaRPr lang="en-US" sz="1500" b="1" i="0" u="none" strike="noStrike">
+                        <a:solidFill>
+                          <a:srgbClr val="44546A"/>
+                        </a:solidFill>
+                        <a:effectLst/>
+                        <a:latin typeface="Calibri"/>
+                      </a:endParaRPr>
+                    </a:p>
+                  </a:txBody>
+                  <a:tcPr marL="12700" marR="12700" marT="12700" marB="0" anchor="b"/>
+                </a:tc>
+              </a:tr>
+              <a:tr h="353239">
+                <a:tc>
+                  <a:txBody>
+                    <a:bodyPr/>
+                    <a:lstStyle/>
+                    <a:p>
+                      <a:pPr algn="l" fontAlgn="ctr"/>
+                      <a:r>
+                        <a:rPr lang="en-US" sz="1100" u="none" strike="noStrike">
+                          <a:effectLst/>
+                        </a:rPr>
+                        <a:t>Arduino</a:t>
+                      </a:r>
+                      <a:endParaRPr lang="en-US" sz="1100" b="0" i="0" u="none" strike="noStrike">
+                        <a:solidFill>
+                          <a:srgbClr val="000000"/>
+                        </a:solidFill>
+                        <a:effectLst/>
+                        <a:latin typeface="Calibri"/>
+                      </a:endParaRPr>
+                    </a:p>
+                  </a:txBody>
+                  <a:tcPr marL="12700" marR="12700" marT="12700" marB="0" anchor="ctr"/>
+                </a:tc>
+                <a:tc>
+                  <a:txBody>
+                    <a:bodyPr/>
+                    <a:lstStyle/>
+                    <a:p>
+                      <a:pPr algn="ctr" fontAlgn="ctr"/>
+                      <a:r>
+                        <a:rPr lang="en-US" sz="1100" u="none" strike="noStrike">
+                          <a:effectLst/>
+                        </a:rPr>
+                        <a:t>$10.00</a:t>
+                      </a:r>
+                      <a:endParaRPr lang="en-US" sz="1100" b="0" i="0" u="none" strike="noStrike">
+                        <a:solidFill>
+                          <a:srgbClr val="000000"/>
+                        </a:solidFill>
+                        <a:effectLst/>
+                        <a:latin typeface="Calibri"/>
+                      </a:endParaRPr>
+                    </a:p>
+                  </a:txBody>
+                  <a:tcPr marL="12700" marR="12700" marT="12700" marB="0" anchor="ctr"/>
+                </a:tc>
+                <a:tc>
+                  <a:txBody>
+                    <a:bodyPr/>
+                    <a:lstStyle/>
+                    <a:p>
+                      <a:pPr algn="ctr" fontAlgn="ctr"/>
+                      <a:r>
+                        <a:rPr lang="en-US" sz="1100" u="none" strike="noStrike">
+                          <a:effectLst/>
+                        </a:rPr>
+                        <a:t>4</a:t>
+                      </a:r>
+                      <a:endParaRPr lang="en-US" sz="1100" b="0" i="0" u="none" strike="noStrike">
+                        <a:solidFill>
+                          <a:srgbClr val="000000"/>
+                        </a:solidFill>
+                        <a:effectLst/>
+                        <a:latin typeface="Calibri"/>
+                      </a:endParaRPr>
+                    </a:p>
+                  </a:txBody>
+                  <a:tcPr marL="12700" marR="12700" marT="12700" marB="0" anchor="ctr"/>
+                </a:tc>
+                <a:tc>
+                  <a:txBody>
+                    <a:bodyPr/>
+                    <a:lstStyle/>
+                    <a:p>
+                      <a:pPr algn="r" fontAlgn="ctr"/>
+                      <a:r>
+                        <a:rPr lang="en-US" sz="1100" u="none" strike="noStrike">
+                          <a:effectLst/>
+                        </a:rPr>
+                        <a:t>$40.00</a:t>
+                      </a:r>
+                      <a:endParaRPr lang="en-US" sz="1100" b="0" i="0" u="none" strike="noStrike">
+                        <a:solidFill>
+                          <a:srgbClr val="000000"/>
+                        </a:solidFill>
+                        <a:effectLst/>
+                        <a:latin typeface="Calibri"/>
+                      </a:endParaRPr>
+                    </a:p>
+                  </a:txBody>
+                  <a:tcPr marL="12700" marR="12700" marT="12700" marB="0" anchor="ctr"/>
+                </a:tc>
+              </a:tr>
+              <a:tr h="334400">
+                <a:tc>
+                  <a:txBody>
+                    <a:bodyPr/>
+                    <a:lstStyle/>
+                    <a:p>
+                      <a:pPr algn="l" fontAlgn="b"/>
+                      <a:r>
+                        <a:rPr lang="en-US" sz="1100" u="none" strike="noStrike" dirty="0">
+                          <a:effectLst/>
+                        </a:rPr>
+                        <a:t>Motion Sensor</a:t>
+                      </a:r>
+                      <a:endParaRPr lang="en-US" sz="1100" b="0" i="0" u="none" strike="noStrike" dirty="0">
+                        <a:solidFill>
+                          <a:srgbClr val="000000"/>
+                        </a:solidFill>
+                        <a:effectLst/>
+                        <a:latin typeface="Calibri"/>
+                      </a:endParaRPr>
+                    </a:p>
+                  </a:txBody>
+                  <a:tcPr marL="12700" marR="12700" marT="12700" marB="0" anchor="b"/>
+                </a:tc>
+                <a:tc>
+                  <a:txBody>
+                    <a:bodyPr/>
+                    <a:lstStyle/>
+                    <a:p>
+                      <a:pPr algn="ctr" fontAlgn="ctr"/>
+                      <a:r>
+                        <a:rPr lang="en-US" sz="1100" u="none" strike="noStrike">
+                          <a:effectLst/>
+                        </a:rPr>
+                        <a:t>$10.00</a:t>
+                      </a:r>
+                      <a:endParaRPr lang="en-US" sz="1100" b="0" i="0" u="none" strike="noStrike">
+                        <a:solidFill>
+                          <a:srgbClr val="000000"/>
+                        </a:solidFill>
+                        <a:effectLst/>
+                        <a:latin typeface="Calibri"/>
+                      </a:endParaRPr>
+                    </a:p>
+                  </a:txBody>
+                  <a:tcPr marL="12700" marR="12700" marT="12700" marB="0" anchor="ctr"/>
+                </a:tc>
+                <a:tc>
+                  <a:txBody>
+                    <a:bodyPr/>
+                    <a:lstStyle/>
+                    <a:p>
+                      <a:pPr algn="ctr" fontAlgn="ctr"/>
+                      <a:r>
+                        <a:rPr lang="en-US" sz="1100" u="none" strike="noStrike">
+                          <a:effectLst/>
+                        </a:rPr>
+                        <a:t>4</a:t>
+                      </a:r>
+                      <a:endParaRPr lang="en-US" sz="1100" b="0" i="0" u="none" strike="noStrike">
+                        <a:solidFill>
+                          <a:srgbClr val="000000"/>
+                        </a:solidFill>
+                        <a:effectLst/>
+                        <a:latin typeface="Calibri"/>
+                      </a:endParaRPr>
+                    </a:p>
+                  </a:txBody>
+                  <a:tcPr marL="12700" marR="12700" marT="12700" marB="0" anchor="ctr"/>
+                </a:tc>
+                <a:tc>
+                  <a:txBody>
+                    <a:bodyPr/>
+                    <a:lstStyle/>
+                    <a:p>
+                      <a:pPr algn="r" fontAlgn="ctr"/>
+                      <a:r>
+                        <a:rPr lang="en-US" sz="1100" u="none" strike="noStrike" dirty="0">
+                          <a:effectLst/>
+                        </a:rPr>
+                        <a:t>$40.00</a:t>
+                      </a:r>
+                      <a:endParaRPr lang="en-US" sz="1100" b="0" i="0" u="none" strike="noStrike" dirty="0">
+                        <a:solidFill>
+                          <a:srgbClr val="000000"/>
+                        </a:solidFill>
+                        <a:effectLst/>
+                        <a:latin typeface="Calibri"/>
+                      </a:endParaRPr>
+                    </a:p>
+                  </a:txBody>
+                  <a:tcPr marL="12700" marR="12700" marT="12700" marB="0" anchor="ctr"/>
+                </a:tc>
+              </a:tr>
+              <a:tr h="334400">
+                <a:tc>
+                  <a:txBody>
+                    <a:bodyPr/>
+                    <a:lstStyle/>
+                    <a:p>
+                      <a:pPr algn="l" fontAlgn="b"/>
+                      <a:r>
+                        <a:rPr lang="en-US" sz="1100" u="none" strike="noStrike">
+                          <a:effectLst/>
+                        </a:rPr>
+                        <a:t>Wifi Module</a:t>
+                      </a:r>
+                      <a:endParaRPr lang="en-US" sz="1100" b="0" i="0" u="none" strike="noStrike">
+                        <a:solidFill>
+                          <a:srgbClr val="000000"/>
+                        </a:solidFill>
+                        <a:effectLst/>
+                        <a:latin typeface="Calibri"/>
+                      </a:endParaRPr>
+                    </a:p>
+                  </a:txBody>
+                  <a:tcPr marL="12700" marR="12700" marT="12700" marB="0" anchor="b"/>
+                </a:tc>
+                <a:tc>
+                  <a:txBody>
+                    <a:bodyPr/>
+                    <a:lstStyle/>
+                    <a:p>
+                      <a:pPr algn="ctr" fontAlgn="ctr"/>
+                      <a:r>
+                        <a:rPr lang="en-US" sz="1100" u="none" strike="noStrike">
+                          <a:effectLst/>
+                        </a:rPr>
+                        <a:t>$7.00</a:t>
+                      </a:r>
+                      <a:endParaRPr lang="en-US" sz="1100" b="0" i="0" u="none" strike="noStrike">
+                        <a:solidFill>
+                          <a:srgbClr val="000000"/>
+                        </a:solidFill>
+                        <a:effectLst/>
+                        <a:latin typeface="Calibri"/>
+                      </a:endParaRPr>
+                    </a:p>
+                  </a:txBody>
+                  <a:tcPr marL="12700" marR="12700" marT="12700" marB="0" anchor="ctr"/>
+                </a:tc>
+                <a:tc>
+                  <a:txBody>
+                    <a:bodyPr/>
+                    <a:lstStyle/>
+                    <a:p>
+                      <a:pPr algn="ctr" fontAlgn="ctr"/>
+                      <a:r>
+                        <a:rPr lang="en-US" sz="1100" u="none" strike="noStrike">
+                          <a:effectLst/>
+                        </a:rPr>
+                        <a:t>4</a:t>
+                      </a:r>
+                      <a:endParaRPr lang="en-US" sz="1100" b="0" i="0" u="none" strike="noStrike">
+                        <a:solidFill>
+                          <a:srgbClr val="000000"/>
+                        </a:solidFill>
+                        <a:effectLst/>
+                        <a:latin typeface="Calibri"/>
+                      </a:endParaRPr>
+                    </a:p>
+                  </a:txBody>
+                  <a:tcPr marL="12700" marR="12700" marT="12700" marB="0" anchor="ctr"/>
+                </a:tc>
+                <a:tc>
+                  <a:txBody>
+                    <a:bodyPr/>
+                    <a:lstStyle/>
+                    <a:p>
+                      <a:pPr algn="r" fontAlgn="ctr"/>
+                      <a:r>
+                        <a:rPr lang="en-US" sz="1100" u="none" strike="noStrike">
+                          <a:effectLst/>
+                        </a:rPr>
+                        <a:t>$28.00</a:t>
+                      </a:r>
+                      <a:endParaRPr lang="en-US" sz="1100" b="0" i="0" u="none" strike="noStrike">
+                        <a:solidFill>
+                          <a:srgbClr val="000000"/>
+                        </a:solidFill>
+                        <a:effectLst/>
+                        <a:latin typeface="Calibri"/>
+                      </a:endParaRPr>
+                    </a:p>
+                  </a:txBody>
+                  <a:tcPr marL="12700" marR="12700" marT="12700" marB="0" anchor="ctr"/>
+                </a:tc>
+              </a:tr>
+              <a:tr h="334400">
+                <a:tc>
+                  <a:txBody>
+                    <a:bodyPr/>
+                    <a:lstStyle/>
+                    <a:p>
+                      <a:pPr algn="l" fontAlgn="b"/>
+                      <a:r>
+                        <a:rPr lang="en-US" sz="1100" u="none" strike="noStrike">
+                          <a:effectLst/>
+                        </a:rPr>
+                        <a:t>Relay</a:t>
+                      </a:r>
+                      <a:endParaRPr lang="en-US" sz="1100" b="0" i="0" u="none" strike="noStrike">
+                        <a:solidFill>
+                          <a:srgbClr val="000000"/>
+                        </a:solidFill>
+                        <a:effectLst/>
+                        <a:latin typeface="Calibri"/>
+                      </a:endParaRPr>
+                    </a:p>
+                  </a:txBody>
+                  <a:tcPr marL="12700" marR="12700" marT="12700" marB="0" anchor="b"/>
+                </a:tc>
+                <a:tc>
+                  <a:txBody>
+                    <a:bodyPr/>
+                    <a:lstStyle/>
+                    <a:p>
+                      <a:pPr algn="ctr" fontAlgn="ctr"/>
+                      <a:r>
+                        <a:rPr lang="en-US" sz="1100" u="none" strike="noStrike" dirty="0">
+                          <a:effectLst/>
+                        </a:rPr>
+                        <a:t>$8.00</a:t>
+                      </a:r>
+                      <a:endParaRPr lang="en-US" sz="1100" b="0" i="0" u="none" strike="noStrike" dirty="0">
+                        <a:solidFill>
+                          <a:srgbClr val="000000"/>
+                        </a:solidFill>
+                        <a:effectLst/>
+                        <a:latin typeface="Calibri"/>
+                      </a:endParaRPr>
+                    </a:p>
+                  </a:txBody>
+                  <a:tcPr marL="12700" marR="12700" marT="12700" marB="0" anchor="ctr"/>
+                </a:tc>
+                <a:tc>
+                  <a:txBody>
+                    <a:bodyPr/>
+                    <a:lstStyle/>
+                    <a:p>
+                      <a:pPr algn="ctr" fontAlgn="ctr"/>
+                      <a:r>
+                        <a:rPr lang="en-US" sz="1100" u="none" strike="noStrike">
+                          <a:effectLst/>
+                        </a:rPr>
+                        <a:t>4</a:t>
+                      </a:r>
+                      <a:endParaRPr lang="en-US" sz="1100" b="0" i="0" u="none" strike="noStrike">
+                        <a:solidFill>
+                          <a:srgbClr val="000000"/>
+                        </a:solidFill>
+                        <a:effectLst/>
+                        <a:latin typeface="Calibri"/>
+                      </a:endParaRPr>
+                    </a:p>
+                  </a:txBody>
+                  <a:tcPr marL="12700" marR="12700" marT="12700" marB="0" anchor="ctr"/>
+                </a:tc>
+                <a:tc>
+                  <a:txBody>
+                    <a:bodyPr/>
+                    <a:lstStyle/>
+                    <a:p>
+                      <a:pPr algn="r" fontAlgn="ctr"/>
+                      <a:r>
+                        <a:rPr lang="en-US" sz="1100" u="none" strike="noStrike">
+                          <a:effectLst/>
+                        </a:rPr>
+                        <a:t>$32.00</a:t>
+                      </a:r>
+                      <a:endParaRPr lang="en-US" sz="1100" b="0" i="0" u="none" strike="noStrike">
+                        <a:solidFill>
+                          <a:srgbClr val="000000"/>
+                        </a:solidFill>
+                        <a:effectLst/>
+                        <a:latin typeface="Calibri"/>
+                      </a:endParaRPr>
+                    </a:p>
+                  </a:txBody>
+                  <a:tcPr marL="12700" marR="12700" marT="12700" marB="0" anchor="ctr"/>
+                </a:tc>
+              </a:tr>
+              <a:tr h="334400">
+                <a:tc>
+                  <a:txBody>
+                    <a:bodyPr/>
+                    <a:lstStyle/>
+                    <a:p>
+                      <a:pPr algn="l" fontAlgn="b"/>
+                      <a:r>
+                        <a:rPr lang="en-US" sz="1100" u="none" strike="noStrike">
+                          <a:effectLst/>
+                        </a:rPr>
+                        <a:t>Transformer</a:t>
+                      </a:r>
+                      <a:endParaRPr lang="en-US" sz="1100" b="0" i="0" u="none" strike="noStrike">
+                        <a:solidFill>
+                          <a:srgbClr val="000000"/>
+                        </a:solidFill>
+                        <a:effectLst/>
+                        <a:latin typeface="Calibri"/>
+                      </a:endParaRPr>
+                    </a:p>
+                  </a:txBody>
+                  <a:tcPr marL="12700" marR="12700" marT="12700" marB="0" anchor="b"/>
+                </a:tc>
+                <a:tc>
+                  <a:txBody>
+                    <a:bodyPr/>
+                    <a:lstStyle/>
+                    <a:p>
+                      <a:pPr algn="ctr" fontAlgn="ctr"/>
+                      <a:r>
+                        <a:rPr lang="en-US" sz="1100" u="none" strike="noStrike">
+                          <a:effectLst/>
+                        </a:rPr>
+                        <a:t>$7.00</a:t>
+                      </a:r>
+                      <a:endParaRPr lang="en-US" sz="1100" b="0" i="0" u="none" strike="noStrike">
+                        <a:solidFill>
+                          <a:srgbClr val="000000"/>
+                        </a:solidFill>
+                        <a:effectLst/>
+                        <a:latin typeface="Calibri"/>
+                      </a:endParaRPr>
+                    </a:p>
+                  </a:txBody>
+                  <a:tcPr marL="12700" marR="12700" marT="12700" marB="0" anchor="ctr"/>
+                </a:tc>
+                <a:tc>
+                  <a:txBody>
+                    <a:bodyPr/>
+                    <a:lstStyle/>
+                    <a:p>
+                      <a:pPr algn="ctr" fontAlgn="ctr"/>
+                      <a:r>
+                        <a:rPr lang="en-US" sz="1100" u="none" strike="noStrike">
+                          <a:effectLst/>
+                        </a:rPr>
+                        <a:t>4</a:t>
+                      </a:r>
+                      <a:endParaRPr lang="en-US" sz="1100" b="0" i="0" u="none" strike="noStrike">
+                        <a:solidFill>
+                          <a:srgbClr val="000000"/>
+                        </a:solidFill>
+                        <a:effectLst/>
+                        <a:latin typeface="Calibri"/>
+                      </a:endParaRPr>
+                    </a:p>
+                  </a:txBody>
+                  <a:tcPr marL="12700" marR="12700" marT="12700" marB="0" anchor="ctr"/>
+                </a:tc>
+                <a:tc>
+                  <a:txBody>
+                    <a:bodyPr/>
+                    <a:lstStyle/>
+                    <a:p>
+                      <a:pPr algn="r" fontAlgn="ctr"/>
+                      <a:r>
+                        <a:rPr lang="en-US" sz="1100" u="none" strike="noStrike">
+                          <a:effectLst/>
+                        </a:rPr>
+                        <a:t>$28.00</a:t>
+                      </a:r>
+                      <a:endParaRPr lang="en-US" sz="1100" b="0" i="0" u="none" strike="noStrike">
+                        <a:solidFill>
+                          <a:srgbClr val="000000"/>
+                        </a:solidFill>
+                        <a:effectLst/>
+                        <a:latin typeface="Calibri"/>
+                      </a:endParaRPr>
+                    </a:p>
+                  </a:txBody>
+                  <a:tcPr marL="12700" marR="12700" marT="12700" marB="0" anchor="ctr"/>
+                </a:tc>
+              </a:tr>
+              <a:tr h="334400">
+                <a:tc>
+                  <a:txBody>
+                    <a:bodyPr/>
+                    <a:lstStyle/>
+                    <a:p>
+                      <a:pPr algn="l" fontAlgn="b"/>
+                      <a:r>
+                        <a:rPr lang="en-US" sz="1100" u="none" strike="noStrike">
+                          <a:effectLst/>
+                        </a:rPr>
+                        <a:t>Micro SD Card</a:t>
+                      </a:r>
+                      <a:endParaRPr lang="en-US" sz="1100" b="0" i="0" u="none" strike="noStrike">
+                        <a:solidFill>
+                          <a:srgbClr val="000000"/>
+                        </a:solidFill>
+                        <a:effectLst/>
+                        <a:latin typeface="Calibri"/>
+                      </a:endParaRPr>
+                    </a:p>
+                  </a:txBody>
+                  <a:tcPr marL="12700" marR="12700" marT="12700" marB="0" anchor="b"/>
+                </a:tc>
+                <a:tc>
+                  <a:txBody>
+                    <a:bodyPr/>
+                    <a:lstStyle/>
+                    <a:p>
+                      <a:pPr algn="ctr" fontAlgn="ctr"/>
+                      <a:r>
+                        <a:rPr lang="en-US" sz="1100" u="none" strike="noStrike">
+                          <a:effectLst/>
+                        </a:rPr>
+                        <a:t>$13.00</a:t>
+                      </a:r>
+                      <a:endParaRPr lang="en-US" sz="1100" b="0" i="0" u="none" strike="noStrike">
+                        <a:solidFill>
+                          <a:srgbClr val="000000"/>
+                        </a:solidFill>
+                        <a:effectLst/>
+                        <a:latin typeface="Calibri"/>
+                      </a:endParaRPr>
+                    </a:p>
+                  </a:txBody>
+                  <a:tcPr marL="12700" marR="12700" marT="12700" marB="0" anchor="ctr"/>
+                </a:tc>
+                <a:tc>
+                  <a:txBody>
+                    <a:bodyPr/>
+                    <a:lstStyle/>
+                    <a:p>
+                      <a:pPr algn="ctr" fontAlgn="ctr"/>
+                      <a:r>
+                        <a:rPr lang="en-US" sz="1100" u="none" strike="noStrike">
+                          <a:effectLst/>
+                        </a:rPr>
+                        <a:t>1</a:t>
+                      </a:r>
+                      <a:endParaRPr lang="en-US" sz="1100" b="0" i="0" u="none" strike="noStrike">
+                        <a:solidFill>
+                          <a:srgbClr val="000000"/>
+                        </a:solidFill>
+                        <a:effectLst/>
+                        <a:latin typeface="Calibri"/>
+                      </a:endParaRPr>
+                    </a:p>
+                  </a:txBody>
+                  <a:tcPr marL="12700" marR="12700" marT="12700" marB="0" anchor="ctr"/>
+                </a:tc>
+                <a:tc>
+                  <a:txBody>
+                    <a:bodyPr/>
+                    <a:lstStyle/>
+                    <a:p>
+                      <a:pPr algn="r" fontAlgn="ctr"/>
+                      <a:r>
+                        <a:rPr lang="en-US" sz="1100" u="none" strike="noStrike">
+                          <a:effectLst/>
+                        </a:rPr>
+                        <a:t>$13.00</a:t>
+                      </a:r>
+                      <a:endParaRPr lang="en-US" sz="1100" b="0" i="0" u="none" strike="noStrike">
+                        <a:solidFill>
+                          <a:srgbClr val="000000"/>
+                        </a:solidFill>
+                        <a:effectLst/>
+                        <a:latin typeface="Calibri"/>
+                      </a:endParaRPr>
+                    </a:p>
+                  </a:txBody>
+                  <a:tcPr marL="12700" marR="12700" marT="12700" marB="0" anchor="ctr"/>
+                </a:tc>
+              </a:tr>
+              <a:tr h="334400">
+                <a:tc>
+                  <a:txBody>
+                    <a:bodyPr/>
+                    <a:lstStyle/>
+                    <a:p>
+                      <a:pPr algn="l" fontAlgn="b"/>
+                      <a:r>
+                        <a:rPr lang="en-US" sz="1100" u="none" strike="noStrike">
+                          <a:effectLst/>
+                        </a:rPr>
+                        <a:t>Button</a:t>
+                      </a:r>
+                      <a:endParaRPr lang="en-US" sz="1100" b="0" i="0" u="none" strike="noStrike">
+                        <a:solidFill>
+                          <a:srgbClr val="000000"/>
+                        </a:solidFill>
+                        <a:effectLst/>
+                        <a:latin typeface="Calibri"/>
+                      </a:endParaRPr>
+                    </a:p>
+                  </a:txBody>
+                  <a:tcPr marL="12700" marR="12700" marT="12700" marB="0" anchor="b"/>
+                </a:tc>
+                <a:tc>
+                  <a:txBody>
+                    <a:bodyPr/>
+                    <a:lstStyle/>
+                    <a:p>
+                      <a:pPr algn="ctr" fontAlgn="ctr"/>
+                      <a:r>
+                        <a:rPr lang="en-US" sz="1100" u="none" strike="noStrike">
+                          <a:effectLst/>
+                        </a:rPr>
+                        <a:t>$0.50</a:t>
+                      </a:r>
+                      <a:endParaRPr lang="en-US" sz="1100" b="0" i="0" u="none" strike="noStrike">
+                        <a:solidFill>
+                          <a:srgbClr val="000000"/>
+                        </a:solidFill>
+                        <a:effectLst/>
+                        <a:latin typeface="Calibri"/>
+                      </a:endParaRPr>
+                    </a:p>
+                  </a:txBody>
+                  <a:tcPr marL="12700" marR="12700" marT="12700" marB="0" anchor="ctr"/>
+                </a:tc>
+                <a:tc>
+                  <a:txBody>
+                    <a:bodyPr/>
+                    <a:lstStyle/>
+                    <a:p>
+                      <a:pPr algn="ctr" fontAlgn="ctr"/>
+                      <a:r>
+                        <a:rPr lang="en-US" sz="1100" u="none" strike="noStrike">
+                          <a:effectLst/>
+                        </a:rPr>
+                        <a:t>4</a:t>
+                      </a:r>
+                      <a:endParaRPr lang="en-US" sz="1100" b="0" i="0" u="none" strike="noStrike">
+                        <a:solidFill>
+                          <a:srgbClr val="000000"/>
+                        </a:solidFill>
+                        <a:effectLst/>
+                        <a:latin typeface="Calibri"/>
+                      </a:endParaRPr>
+                    </a:p>
+                  </a:txBody>
+                  <a:tcPr marL="12700" marR="12700" marT="12700" marB="0" anchor="ctr"/>
+                </a:tc>
+                <a:tc>
+                  <a:txBody>
+                    <a:bodyPr/>
+                    <a:lstStyle/>
+                    <a:p>
+                      <a:pPr algn="r" fontAlgn="ctr"/>
+                      <a:r>
+                        <a:rPr lang="en-US" sz="1100" u="none" strike="noStrike">
+                          <a:effectLst/>
+                        </a:rPr>
+                        <a:t>$2.00</a:t>
+                      </a:r>
+                      <a:endParaRPr lang="en-US" sz="1100" b="0" i="0" u="none" strike="noStrike">
+                        <a:solidFill>
+                          <a:srgbClr val="000000"/>
+                        </a:solidFill>
+                        <a:effectLst/>
+                        <a:latin typeface="Calibri"/>
+                      </a:endParaRPr>
+                    </a:p>
+                  </a:txBody>
+                  <a:tcPr marL="12700" marR="12700" marT="12700" marB="0" anchor="ctr"/>
+                </a:tc>
+              </a:tr>
+              <a:tr h="334400">
+                <a:tc>
+                  <a:txBody>
+                    <a:bodyPr/>
+                    <a:lstStyle/>
+                    <a:p>
+                      <a:pPr algn="l" fontAlgn="b"/>
+                      <a:r>
+                        <a:rPr lang="en-US" sz="1100" u="none" strike="noStrike">
+                          <a:effectLst/>
+                        </a:rPr>
+                        <a:t>LED</a:t>
+                      </a:r>
+                      <a:endParaRPr lang="en-US" sz="1100" b="0" i="0" u="none" strike="noStrike">
+                        <a:solidFill>
+                          <a:srgbClr val="000000"/>
+                        </a:solidFill>
+                        <a:effectLst/>
+                        <a:latin typeface="Calibri"/>
+                      </a:endParaRPr>
+                    </a:p>
+                  </a:txBody>
+                  <a:tcPr marL="12700" marR="12700" marT="12700" marB="0" anchor="b"/>
+                </a:tc>
+                <a:tc>
+                  <a:txBody>
+                    <a:bodyPr/>
+                    <a:lstStyle/>
+                    <a:p>
+                      <a:pPr algn="ctr" fontAlgn="ctr"/>
+                      <a:r>
+                        <a:rPr lang="en-US" sz="1100" u="none" strike="noStrike">
+                          <a:effectLst/>
+                        </a:rPr>
+                        <a:t>$0.35</a:t>
+                      </a:r>
+                      <a:endParaRPr lang="en-US" sz="1100" b="0" i="0" u="none" strike="noStrike">
+                        <a:solidFill>
+                          <a:srgbClr val="000000"/>
+                        </a:solidFill>
+                        <a:effectLst/>
+                        <a:latin typeface="Calibri"/>
+                      </a:endParaRPr>
+                    </a:p>
+                  </a:txBody>
+                  <a:tcPr marL="12700" marR="12700" marT="12700" marB="0" anchor="ctr"/>
+                </a:tc>
+                <a:tc>
+                  <a:txBody>
+                    <a:bodyPr/>
+                    <a:lstStyle/>
+                    <a:p>
+                      <a:pPr algn="ctr" fontAlgn="ctr"/>
+                      <a:r>
+                        <a:rPr lang="en-US" sz="1100" u="none" strike="noStrike">
+                          <a:effectLst/>
+                        </a:rPr>
+                        <a:t>4</a:t>
+                      </a:r>
+                      <a:endParaRPr lang="en-US" sz="1100" b="0" i="0" u="none" strike="noStrike">
+                        <a:solidFill>
+                          <a:srgbClr val="000000"/>
+                        </a:solidFill>
+                        <a:effectLst/>
+                        <a:latin typeface="Calibri"/>
+                      </a:endParaRPr>
+                    </a:p>
+                  </a:txBody>
+                  <a:tcPr marL="12700" marR="12700" marT="12700" marB="0" anchor="ctr"/>
+                </a:tc>
+                <a:tc>
+                  <a:txBody>
+                    <a:bodyPr/>
+                    <a:lstStyle/>
+                    <a:p>
+                      <a:pPr algn="r" fontAlgn="ctr"/>
+                      <a:r>
+                        <a:rPr lang="en-US" sz="1100" u="none" strike="noStrike">
+                          <a:effectLst/>
+                        </a:rPr>
+                        <a:t>$1.40</a:t>
+                      </a:r>
+                      <a:endParaRPr lang="en-US" sz="1100" b="0" i="0" u="none" strike="noStrike">
+                        <a:solidFill>
+                          <a:srgbClr val="000000"/>
+                        </a:solidFill>
+                        <a:effectLst/>
+                        <a:latin typeface="Calibri"/>
+                      </a:endParaRPr>
+                    </a:p>
+                  </a:txBody>
+                  <a:tcPr marL="12700" marR="12700" marT="12700" marB="0" anchor="ctr"/>
+                </a:tc>
+              </a:tr>
+              <a:tr h="334400">
+                <a:tc>
+                  <a:txBody>
+                    <a:bodyPr/>
+                    <a:lstStyle/>
+                    <a:p>
+                      <a:pPr algn="l" fontAlgn="b"/>
+                      <a:r>
+                        <a:rPr lang="en-US" sz="1100" u="none" strike="noStrike">
+                          <a:effectLst/>
+                        </a:rPr>
+                        <a:t>Rasberry Pi</a:t>
+                      </a:r>
+                      <a:endParaRPr lang="en-US" sz="1100" b="0" i="0" u="none" strike="noStrike">
+                        <a:solidFill>
+                          <a:srgbClr val="000000"/>
+                        </a:solidFill>
+                        <a:effectLst/>
+                        <a:latin typeface="Calibri"/>
+                      </a:endParaRPr>
+                    </a:p>
+                  </a:txBody>
+                  <a:tcPr marL="12700" marR="12700" marT="12700" marB="0" anchor="b"/>
+                </a:tc>
+                <a:tc>
+                  <a:txBody>
+                    <a:bodyPr/>
+                    <a:lstStyle/>
+                    <a:p>
+                      <a:pPr algn="ctr" fontAlgn="ctr"/>
+                      <a:r>
+                        <a:rPr lang="en-US" sz="1100" u="none" strike="noStrike">
+                          <a:effectLst/>
+                        </a:rPr>
+                        <a:t>$42.00</a:t>
+                      </a:r>
+                      <a:endParaRPr lang="en-US" sz="1100" b="0" i="0" u="none" strike="noStrike">
+                        <a:solidFill>
+                          <a:srgbClr val="000000"/>
+                        </a:solidFill>
+                        <a:effectLst/>
+                        <a:latin typeface="Calibri"/>
+                      </a:endParaRPr>
+                    </a:p>
+                  </a:txBody>
+                  <a:tcPr marL="12700" marR="12700" marT="12700" marB="0" anchor="ctr"/>
+                </a:tc>
+                <a:tc>
+                  <a:txBody>
+                    <a:bodyPr/>
+                    <a:lstStyle/>
+                    <a:p>
+                      <a:pPr algn="ctr" fontAlgn="ctr"/>
+                      <a:r>
+                        <a:rPr lang="en-US" sz="1100" u="none" strike="noStrike">
+                          <a:effectLst/>
+                        </a:rPr>
+                        <a:t>1</a:t>
+                      </a:r>
+                      <a:endParaRPr lang="en-US" sz="1100" b="0" i="0" u="none" strike="noStrike">
+                        <a:solidFill>
+                          <a:srgbClr val="000000"/>
+                        </a:solidFill>
+                        <a:effectLst/>
+                        <a:latin typeface="Calibri"/>
+                      </a:endParaRPr>
+                    </a:p>
+                  </a:txBody>
+                  <a:tcPr marL="12700" marR="12700" marT="12700" marB="0" anchor="ctr"/>
+                </a:tc>
+                <a:tc>
+                  <a:txBody>
+                    <a:bodyPr/>
+                    <a:lstStyle/>
+                    <a:p>
+                      <a:pPr algn="r" fontAlgn="ctr"/>
+                      <a:r>
+                        <a:rPr lang="en-US" sz="1100" u="none" strike="noStrike">
+                          <a:effectLst/>
+                        </a:rPr>
+                        <a:t>$42.00</a:t>
+                      </a:r>
+                      <a:endParaRPr lang="en-US" sz="1100" b="0" i="0" u="none" strike="noStrike">
+                        <a:solidFill>
+                          <a:srgbClr val="000000"/>
+                        </a:solidFill>
+                        <a:effectLst/>
+                        <a:latin typeface="Calibri"/>
+                      </a:endParaRPr>
+                    </a:p>
+                  </a:txBody>
+                  <a:tcPr marL="12700" marR="12700" marT="12700" marB="0" anchor="ctr"/>
+                </a:tc>
+              </a:tr>
+              <a:tr h="334400">
+                <a:tc>
+                  <a:txBody>
+                    <a:bodyPr/>
+                    <a:lstStyle/>
+                    <a:p>
+                      <a:pPr algn="l" fontAlgn="b"/>
+                      <a:r>
+                        <a:rPr lang="en-US" sz="1100" u="none" strike="noStrike">
+                          <a:effectLst/>
+                        </a:rPr>
+                        <a:t>Wifi Source Module</a:t>
+                      </a:r>
+                      <a:endParaRPr lang="en-US" sz="1100" b="0" i="0" u="none" strike="noStrike">
+                        <a:solidFill>
+                          <a:srgbClr val="000000"/>
+                        </a:solidFill>
+                        <a:effectLst/>
+                        <a:latin typeface="Calibri"/>
+                      </a:endParaRPr>
+                    </a:p>
+                  </a:txBody>
+                  <a:tcPr marL="12700" marR="12700" marT="12700" marB="0" anchor="b"/>
+                </a:tc>
+                <a:tc>
+                  <a:txBody>
+                    <a:bodyPr/>
+                    <a:lstStyle/>
+                    <a:p>
+                      <a:pPr algn="ctr" fontAlgn="ctr"/>
+                      <a:r>
+                        <a:rPr lang="en-US" sz="1100" u="none" strike="noStrike">
+                          <a:effectLst/>
+                        </a:rPr>
+                        <a:t>$20.00</a:t>
+                      </a:r>
+                      <a:endParaRPr lang="en-US" sz="1100" b="0" i="0" u="none" strike="noStrike">
+                        <a:solidFill>
+                          <a:srgbClr val="000000"/>
+                        </a:solidFill>
+                        <a:effectLst/>
+                        <a:latin typeface="Calibri"/>
+                      </a:endParaRPr>
+                    </a:p>
+                  </a:txBody>
+                  <a:tcPr marL="12700" marR="12700" marT="12700" marB="0" anchor="ctr"/>
+                </a:tc>
+                <a:tc>
+                  <a:txBody>
+                    <a:bodyPr/>
+                    <a:lstStyle/>
+                    <a:p>
+                      <a:pPr algn="ctr" fontAlgn="ctr"/>
+                      <a:r>
+                        <a:rPr lang="en-US" sz="1100" u="none" strike="noStrike">
+                          <a:effectLst/>
+                        </a:rPr>
+                        <a:t>1</a:t>
+                      </a:r>
+                      <a:endParaRPr lang="en-US" sz="1100" b="0" i="0" u="none" strike="noStrike">
+                        <a:solidFill>
+                          <a:srgbClr val="000000"/>
+                        </a:solidFill>
+                        <a:effectLst/>
+                        <a:latin typeface="Calibri"/>
+                      </a:endParaRPr>
+                    </a:p>
+                  </a:txBody>
+                  <a:tcPr marL="12700" marR="12700" marT="12700" marB="0" anchor="ctr"/>
+                </a:tc>
+                <a:tc>
+                  <a:txBody>
+                    <a:bodyPr/>
+                    <a:lstStyle/>
+                    <a:p>
+                      <a:pPr algn="r" fontAlgn="ctr"/>
+                      <a:r>
+                        <a:rPr lang="en-US" sz="1100" u="none" strike="noStrike">
+                          <a:effectLst/>
+                        </a:rPr>
+                        <a:t>$20.00</a:t>
+                      </a:r>
+                      <a:endParaRPr lang="en-US" sz="1100" b="0" i="0" u="none" strike="noStrike">
+                        <a:solidFill>
+                          <a:srgbClr val="000000"/>
+                        </a:solidFill>
+                        <a:effectLst/>
+                        <a:latin typeface="Calibri"/>
+                      </a:endParaRPr>
+                    </a:p>
+                  </a:txBody>
+                  <a:tcPr marL="12700" marR="12700" marT="12700" marB="0" anchor="ctr"/>
+                </a:tc>
+              </a:tr>
+              <a:tr h="334400">
+                <a:tc>
+                  <a:txBody>
+                    <a:bodyPr/>
+                    <a:lstStyle/>
+                    <a:p>
+                      <a:pPr algn="l" fontAlgn="b"/>
+                      <a:r>
+                        <a:rPr lang="en-US" sz="1100" u="none" strike="noStrike">
+                          <a:effectLst/>
+                        </a:rPr>
+                        <a:t>Wall Adapter</a:t>
+                      </a:r>
+                      <a:endParaRPr lang="en-US" sz="1100" b="0" i="0" u="none" strike="noStrike">
+                        <a:solidFill>
+                          <a:srgbClr val="000000"/>
+                        </a:solidFill>
+                        <a:effectLst/>
+                        <a:latin typeface="Calibri"/>
+                      </a:endParaRPr>
+                    </a:p>
+                  </a:txBody>
+                  <a:tcPr marL="12700" marR="12700" marT="12700" marB="0" anchor="b"/>
+                </a:tc>
+                <a:tc>
+                  <a:txBody>
+                    <a:bodyPr/>
+                    <a:lstStyle/>
+                    <a:p>
+                      <a:pPr algn="ctr" fontAlgn="ctr"/>
+                      <a:r>
+                        <a:rPr lang="en-US" sz="1100" u="none" strike="noStrike" dirty="0">
+                          <a:effectLst/>
+                        </a:rPr>
+                        <a:t>$3.00</a:t>
+                      </a:r>
+                      <a:endParaRPr lang="en-US" sz="1100" b="0" i="0" u="none" strike="noStrike" dirty="0">
+                        <a:solidFill>
+                          <a:srgbClr val="000000"/>
+                        </a:solidFill>
+                        <a:effectLst/>
+                        <a:latin typeface="Calibri"/>
+                      </a:endParaRPr>
+                    </a:p>
+                  </a:txBody>
+                  <a:tcPr marL="12700" marR="12700" marT="12700" marB="0" anchor="ctr"/>
+                </a:tc>
+                <a:tc>
+                  <a:txBody>
+                    <a:bodyPr/>
+                    <a:lstStyle/>
+                    <a:p>
+                      <a:pPr algn="ctr" fontAlgn="ctr"/>
+                      <a:r>
+                        <a:rPr lang="en-US" sz="1100" u="none" strike="noStrike">
+                          <a:effectLst/>
+                        </a:rPr>
+                        <a:t>1</a:t>
+                      </a:r>
+                      <a:endParaRPr lang="en-US" sz="1100" b="0" i="0" u="none" strike="noStrike">
+                        <a:solidFill>
+                          <a:srgbClr val="000000"/>
+                        </a:solidFill>
+                        <a:effectLst/>
+                        <a:latin typeface="Calibri"/>
+                      </a:endParaRPr>
+                    </a:p>
+                  </a:txBody>
+                  <a:tcPr marL="12700" marR="12700" marT="12700" marB="0" anchor="ctr"/>
+                </a:tc>
+                <a:tc>
+                  <a:txBody>
+                    <a:bodyPr/>
+                    <a:lstStyle/>
+                    <a:p>
+                      <a:pPr algn="r" fontAlgn="ctr"/>
+                      <a:r>
+                        <a:rPr lang="en-US" sz="1100" u="none" strike="noStrike">
+                          <a:effectLst/>
+                        </a:rPr>
+                        <a:t>$3.00</a:t>
+                      </a:r>
+                      <a:endParaRPr lang="en-US" sz="1100" b="0" i="0" u="none" strike="noStrike">
+                        <a:solidFill>
+                          <a:srgbClr val="000000"/>
+                        </a:solidFill>
+                        <a:effectLst/>
+                        <a:latin typeface="Calibri"/>
+                      </a:endParaRPr>
+                    </a:p>
+                  </a:txBody>
+                  <a:tcPr marL="12700" marR="12700" marT="12700" marB="0" anchor="ctr"/>
+                </a:tc>
+              </a:tr>
+              <a:tr h="334400">
+                <a:tc>
+                  <a:txBody>
+                    <a:bodyPr/>
+                    <a:lstStyle/>
+                    <a:p>
+                      <a:pPr algn="l" fontAlgn="b"/>
+                      <a:r>
+                        <a:rPr lang="en-US" sz="1100" u="none" strike="noStrike">
+                          <a:effectLst/>
+                        </a:rPr>
+                        <a:t>Programming Board</a:t>
+                      </a:r>
+                      <a:endParaRPr lang="en-US" sz="1100" b="0" i="0" u="none" strike="noStrike">
+                        <a:solidFill>
+                          <a:srgbClr val="000000"/>
+                        </a:solidFill>
+                        <a:effectLst/>
+                        <a:latin typeface="Calibri"/>
+                      </a:endParaRPr>
+                    </a:p>
+                  </a:txBody>
+                  <a:tcPr marL="12700" marR="12700" marT="12700" marB="0" anchor="b"/>
+                </a:tc>
+                <a:tc>
+                  <a:txBody>
+                    <a:bodyPr/>
+                    <a:lstStyle/>
+                    <a:p>
+                      <a:pPr algn="ctr" fontAlgn="ctr"/>
+                      <a:r>
+                        <a:rPr lang="en-US" sz="1100" u="none" strike="noStrike">
+                          <a:effectLst/>
+                        </a:rPr>
+                        <a:t>$15.00</a:t>
+                      </a:r>
+                      <a:endParaRPr lang="en-US" sz="1100" b="0" i="0" u="none" strike="noStrike">
+                        <a:solidFill>
+                          <a:srgbClr val="000000"/>
+                        </a:solidFill>
+                        <a:effectLst/>
+                        <a:latin typeface="Calibri"/>
+                      </a:endParaRPr>
+                    </a:p>
+                  </a:txBody>
+                  <a:tcPr marL="12700" marR="12700" marT="12700" marB="0" anchor="ctr"/>
+                </a:tc>
+                <a:tc>
+                  <a:txBody>
+                    <a:bodyPr/>
+                    <a:lstStyle/>
+                    <a:p>
+                      <a:pPr algn="ctr" fontAlgn="b"/>
+                      <a:r>
+                        <a:rPr lang="en-US" sz="1100" u="none" strike="noStrike">
+                          <a:effectLst/>
+                        </a:rPr>
+                        <a:t>1</a:t>
+                      </a:r>
+                      <a:endParaRPr lang="en-US" sz="1100" b="0" i="0" u="none" strike="noStrike">
+                        <a:solidFill>
+                          <a:srgbClr val="000000"/>
+                        </a:solidFill>
+                        <a:effectLst/>
+                        <a:latin typeface="Calibri"/>
+                      </a:endParaRPr>
+                    </a:p>
+                  </a:txBody>
+                  <a:tcPr marL="12700" marR="12700" marT="12700" marB="0" anchor="b"/>
+                </a:tc>
+                <a:tc>
+                  <a:txBody>
+                    <a:bodyPr/>
+                    <a:lstStyle/>
+                    <a:p>
+                      <a:pPr algn="r" fontAlgn="ctr"/>
+                      <a:r>
+                        <a:rPr lang="en-US" sz="1100" u="none" strike="noStrike" dirty="0">
+                          <a:effectLst/>
+                        </a:rPr>
+                        <a:t>$15.00</a:t>
+                      </a:r>
+                      <a:endParaRPr lang="en-US" sz="1100" b="0" i="0" u="none" strike="noStrike" dirty="0">
+                        <a:solidFill>
+                          <a:srgbClr val="000000"/>
+                        </a:solidFill>
+                        <a:effectLst/>
+                        <a:latin typeface="Calibri"/>
+                      </a:endParaRPr>
+                    </a:p>
+                  </a:txBody>
+                  <a:tcPr marL="12700" marR="12700" marT="12700" marB="0" anchor="ctr"/>
+                </a:tc>
+              </a:tr>
+              <a:tr h="353239">
+                <a:tc>
+                  <a:txBody>
+                    <a:bodyPr/>
+                    <a:lstStyle/>
+                    <a:p>
+                      <a:pPr algn="l" fontAlgn="b"/>
+                      <a:r>
+                        <a:rPr lang="en-US" sz="1100" u="none" strike="noStrike">
+                          <a:effectLst/>
+                        </a:rPr>
+                        <a:t>3D Printing Materials</a:t>
+                      </a:r>
+                      <a:endParaRPr lang="en-US" sz="1100" b="0" i="0" u="none" strike="noStrike">
+                        <a:solidFill>
+                          <a:srgbClr val="000000"/>
+                        </a:solidFill>
+                        <a:effectLst/>
+                        <a:latin typeface="Calibri"/>
+                      </a:endParaRPr>
+                    </a:p>
+                  </a:txBody>
+                  <a:tcPr marL="12700" marR="12700" marT="12700" marB="0" anchor="b"/>
+                </a:tc>
+                <a:tc>
+                  <a:txBody>
+                    <a:bodyPr/>
+                    <a:lstStyle/>
+                    <a:p>
+                      <a:pPr algn="ctr" fontAlgn="b"/>
+                      <a:r>
+                        <a:rPr lang="en-US" sz="1100" u="none" strike="noStrike">
+                          <a:effectLst/>
+                        </a:rPr>
+                        <a:t>$20.00</a:t>
+                      </a:r>
+                      <a:endParaRPr lang="en-US" sz="1100" b="0" i="0" u="none" strike="noStrike">
+                        <a:solidFill>
+                          <a:srgbClr val="000000"/>
+                        </a:solidFill>
+                        <a:effectLst/>
+                        <a:latin typeface="Calibri"/>
+                      </a:endParaRPr>
+                    </a:p>
+                  </a:txBody>
+                  <a:tcPr marL="12700" marR="12700" marT="12700" marB="0" anchor="b"/>
+                </a:tc>
+                <a:tc>
+                  <a:txBody>
+                    <a:bodyPr/>
+                    <a:lstStyle/>
+                    <a:p>
+                      <a:pPr algn="ctr" fontAlgn="ctr"/>
+                      <a:r>
+                        <a:rPr lang="en-US" sz="1100" u="none" strike="noStrike">
+                          <a:effectLst/>
+                        </a:rPr>
+                        <a:t>1</a:t>
+                      </a:r>
+                      <a:endParaRPr lang="en-US" sz="1100" b="0" i="0" u="none" strike="noStrike">
+                        <a:solidFill>
+                          <a:srgbClr val="000000"/>
+                        </a:solidFill>
+                        <a:effectLst/>
+                        <a:latin typeface="Calibri"/>
+                      </a:endParaRPr>
+                    </a:p>
+                  </a:txBody>
+                  <a:tcPr marL="12700" marR="12700" marT="12700" marB="0" anchor="ctr"/>
+                </a:tc>
+                <a:tc>
+                  <a:txBody>
+                    <a:bodyPr/>
+                    <a:lstStyle/>
+                    <a:p>
+                      <a:pPr algn="r" fontAlgn="ctr"/>
+                      <a:r>
+                        <a:rPr lang="en-US" sz="1100" u="none" strike="noStrike">
+                          <a:effectLst/>
+                        </a:rPr>
+                        <a:t>$20.00</a:t>
+                      </a:r>
+                      <a:endParaRPr lang="en-US" sz="1100" b="0" i="0" u="none" strike="noStrike">
+                        <a:solidFill>
+                          <a:srgbClr val="000000"/>
+                        </a:solidFill>
+                        <a:effectLst/>
+                        <a:latin typeface="Calibri"/>
+                      </a:endParaRPr>
+                    </a:p>
+                  </a:txBody>
+                  <a:tcPr marL="12700" marR="12700" marT="12700" marB="0" anchor="ctr"/>
+                </a:tc>
+              </a:tr>
+              <a:tr h="353239">
+                <a:tc>
+                  <a:txBody>
+                    <a:bodyPr/>
+                    <a:lstStyle/>
+                    <a:p>
+                      <a:pPr algn="l" fontAlgn="b"/>
+                      <a:r>
+                        <a:rPr lang="en-US" sz="1100" u="none" strike="noStrike">
+                          <a:effectLst/>
+                        </a:rPr>
+                        <a:t>Totals</a:t>
+                      </a:r>
+                      <a:endParaRPr lang="en-US" sz="1100" b="1" i="0" u="none" strike="noStrike">
+                        <a:solidFill>
+                          <a:srgbClr val="000000"/>
+                        </a:solidFill>
+                        <a:effectLst/>
+                        <a:latin typeface="Calibri"/>
+                      </a:endParaRPr>
+                    </a:p>
+                  </a:txBody>
+                  <a:tcPr marL="12700" marR="12700" marT="12700" marB="0" anchor="b"/>
+                </a:tc>
+                <a:tc>
+                  <a:txBody>
+                    <a:bodyPr/>
+                    <a:lstStyle/>
+                    <a:p>
+                      <a:pPr algn="l" fontAlgn="b"/>
+                      <a:r>
+                        <a:rPr lang="en-US" sz="1100" u="none" strike="noStrike">
+                          <a:effectLst/>
+                        </a:rPr>
+                        <a:t> </a:t>
+                      </a:r>
+                      <a:endParaRPr lang="en-US" sz="1100" b="0" i="0" u="none" strike="noStrike">
+                        <a:solidFill>
+                          <a:srgbClr val="000000"/>
+                        </a:solidFill>
+                        <a:effectLst/>
+                        <a:latin typeface="Calibri"/>
+                      </a:endParaRPr>
+                    </a:p>
+                  </a:txBody>
+                  <a:tcPr marL="12700" marR="12700" marT="12700" marB="0" anchor="b"/>
+                </a:tc>
+                <a:tc>
+                  <a:txBody>
+                    <a:bodyPr/>
+                    <a:lstStyle/>
+                    <a:p>
+                      <a:pPr algn="l" fontAlgn="b"/>
+                      <a:r>
+                        <a:rPr lang="en-US" sz="1100" u="none" strike="noStrike">
+                          <a:effectLst/>
+                        </a:rPr>
+                        <a:t> </a:t>
+                      </a:r>
+                      <a:endParaRPr lang="en-US" sz="1100" b="0" i="0" u="none" strike="noStrike">
+                        <a:solidFill>
+                          <a:srgbClr val="000000"/>
+                        </a:solidFill>
+                        <a:effectLst/>
+                        <a:latin typeface="Calibri"/>
+                      </a:endParaRPr>
+                    </a:p>
+                  </a:txBody>
+                  <a:tcPr marL="12700" marR="12700" marT="12700" marB="0" anchor="b"/>
+                </a:tc>
+                <a:tc>
+                  <a:txBody>
+                    <a:bodyPr/>
+                    <a:lstStyle/>
+                    <a:p>
+                      <a:pPr algn="r" fontAlgn="b"/>
+                      <a:r>
+                        <a:rPr lang="en-US" sz="1100" u="none" strike="noStrike" dirty="0">
+                          <a:effectLst/>
+                        </a:rPr>
+                        <a:t>$284.40</a:t>
+                      </a:r>
+                      <a:endParaRPr lang="en-US" sz="1100" b="0" i="0" u="none" strike="noStrike" dirty="0">
+                        <a:solidFill>
+                          <a:srgbClr val="000000"/>
+                        </a:solidFill>
+                        <a:effectLst/>
+                        <a:latin typeface="Calibri"/>
+                      </a:endParaRPr>
+                    </a:p>
+                  </a:txBody>
+                  <a:tcPr marL="12700" marR="12700" marT="12700" marB="0" anchor="b"/>
+                </a:tc>
+              </a:tr>
+            </a:tbl>
+          </a:graphicData>
+        </a:graphic>
+      </p:graphicFrame>
+    </p:spTree>
+    <p:extLst>
+      <p:ext uri="{BB962C8B-B14F-4D97-AF65-F5344CB8AC3E}">
+        <p14:creationId xmlns:p14="http://schemas.microsoft.com/office/powerpoint/2010/main" val="1499879029"/>
+      </p:ext>
+    </p:extLst>
+  </p:cSld>
+  <p:clrMapOvr>
+    <a:masterClrMapping/>
+  </p:clrMapOvr>
+  <p:timing>
+    <p:tnLst>
+      <p:par>
+        <p:cTn xmlns:p14="http://schemas.microsoft.com/office/powerpoint/2010/main" id="1" dur="indefinite" restart="never" nodeType="tmRoot"/>
+      </p:par>
+    </p:tnLst>
+  </p:timing>
+</p:sld>
+</file>
+
+<file path=ppt/slides/slide9.xml><?xml version="1.0" encoding="utf-8"?>
+<p:sld xmlns:a="http://schemas.openxmlformats.org/drawingml/2006/main" xmlns:r="http://schemas.openxmlformats.org/officeDocument/2006/relationships" xmlns:p="http://schemas.openxmlformats.org/presentationml/2006/main">
+  <p:cSld>
+    <p:spTree>
+      <p:nvGrpSpPr>
+        <p:cNvPr id="1" name=""/>
+        <p:cNvGrpSpPr/>
+        <p:nvPr/>
+      </p:nvGrpSpPr>
+      <p:grpSpPr>
+        <a:xfrm>
+          <a:off x="0" y="0"/>
+          <a:ext cx="0" cy="0"/>
+          <a:chOff x="0" y="0"/>
+          <a:chExt cx="0" cy="0"/>
+        </a:xfrm>
+      </p:grpSpPr>
+      <p:sp>
+        <p:nvSpPr>
+          <p:cNvPr id="2" name="Title 1"/>
+          <p:cNvSpPr>
+            <a:spLocks noGrp="1"/>
+          </p:cNvSpPr>
+          <p:nvPr>
+            <p:ph type="title"/>
+          </p:nvPr>
+        </p:nvSpPr>
+        <p:spPr/>
+        <p:txBody>
+          <a:bodyPr/>
+          <a:lstStyle/>
+          <a:p>
+            <a:r>
+              <a:rPr lang="en-US" dirty="0" smtClean="0"/>
+              <a:t>How ours is different</a:t>
+            </a:r>
+            <a:endParaRPr lang="en-US" dirty="0"/>
+          </a:p>
+        </p:txBody>
+      </p:sp>
+      <p:sp>
+        <p:nvSpPr>
+          <p:cNvPr id="3" name="Content Placeholder 2"/>
+          <p:cNvSpPr>
+            <a:spLocks noGrp="1"/>
+          </p:cNvSpPr>
+          <p:nvPr>
+            <p:ph idx="1"/>
+          </p:nvPr>
+        </p:nvSpPr>
+        <p:spPr/>
+        <p:txBody>
+          <a:bodyPr/>
+          <a:lstStyle/>
+          <a:p>
+            <a:r>
+              <a:rPr lang="en-US" dirty="0" smtClean="0"/>
+              <a:t>From Wi-Fi </a:t>
+            </a:r>
+            <a:r>
+              <a:rPr lang="en-US" dirty="0" err="1" smtClean="0"/>
+              <a:t>lightbulbs</a:t>
+            </a:r>
+            <a:endParaRPr lang="en-US" dirty="0"/>
+          </a:p>
+          <a:p>
+            <a:pPr lvl="1"/>
+            <a:r>
+              <a:rPr lang="en-US" dirty="0" smtClean="0"/>
+              <a:t>Don’t need to replace an expensive </a:t>
+            </a:r>
+            <a:r>
+              <a:rPr lang="en-US" dirty="0" err="1" smtClean="0"/>
+              <a:t>lightbulb</a:t>
+            </a:r>
+            <a:r>
+              <a:rPr lang="en-US" dirty="0" smtClean="0"/>
+              <a:t> whenever it dies</a:t>
+            </a:r>
+          </a:p>
+          <a:p>
+            <a:pPr lvl="1"/>
+            <a:r>
+              <a:rPr lang="en-US" dirty="0" smtClean="0"/>
+              <a:t>More sophisticated and synchronized system/setup</a:t>
+            </a:r>
+          </a:p>
+          <a:p>
+            <a:r>
+              <a:rPr lang="en-US" dirty="0" smtClean="0"/>
+              <a:t>From similar switches (</a:t>
+            </a:r>
+            <a:r>
+              <a:rPr lang="en-US" dirty="0" err="1" smtClean="0"/>
+              <a:t>Wemo</a:t>
+            </a:r>
+            <a:r>
+              <a:rPr lang="en-US" dirty="0" smtClean="0"/>
+              <a:t>)</a:t>
+            </a:r>
+          </a:p>
+          <a:p>
+            <a:pPr lvl="1"/>
+            <a:r>
+              <a:rPr lang="en-US" dirty="0" smtClean="0"/>
+              <a:t>Motion Sensor</a:t>
+            </a:r>
+          </a:p>
+          <a:p>
+            <a:pPr lvl="1"/>
+            <a:r>
+              <a:rPr lang="en-US" dirty="0" smtClean="0"/>
+              <a:t>Rules</a:t>
+            </a:r>
           </a:p>
         </p:txBody>
       </p:sp>
     </p:spTree>
     <p:extLst>
       <p:ext uri="{BB962C8B-B14F-4D97-AF65-F5344CB8AC3E}">
-        <p14:creationId xmlns:p14="http://schemas.microsoft.com/office/powerpoint/2010/main" val="1079122949"/>
+        <p14:creationId xmlns:p14="http://schemas.microsoft.com/office/powerpoint/2010/main" val="3903585292"/>
       </p:ext>
     </p:extLst>
   </p:cSld>

</xml_diff>

<commit_message>
Added animation to the software slide
</commit_message>
<xml_diff>
--- a/Presentation.pptx
+++ b/Presentation.pptx
@@ -13,7 +13,7 @@
     <p:sldId id="257" r:id="rId4"/>
     <p:sldId id="265" r:id="rId5"/>
     <p:sldId id="258" r:id="rId6"/>
-    <p:sldId id="262" r:id="rId7"/>
+    <p:sldId id="266" r:id="rId7"/>
     <p:sldId id="259" r:id="rId8"/>
     <p:sldId id="260" r:id="rId9"/>
     <p:sldId id="263" r:id="rId10"/>
@@ -116,6 +116,22 @@
       </a:defRPr>
     </a:lvl9pPr>
   </p:defaultTextStyle>
+  <p:extLst>
+    <p:ext uri="{EFAFB233-063F-42B5-8137-9DF3F51BA10A}">
+      <p15:sldGuideLst xmlns:p15="http://schemas.microsoft.com/office/powerpoint/2012/main">
+        <p15:guide id="1" orient="horz" pos="2160">
+          <p15:clr>
+            <a:srgbClr val="A4A3A4"/>
+          </p15:clr>
+        </p15:guide>
+        <p15:guide id="2" pos="2880">
+          <p15:clr>
+            <a:srgbClr val="A4A3A4"/>
+          </p15:clr>
+        </p15:guide>
+      </p15:sldGuideLst>
+    </p:ext>
+  </p:extLst>
 </p:presentation>
 </file>
 
@@ -201,7 +217,7 @@
           <a:p>
             <a:fld id="{3054C299-8359-5B4D-8FA7-E9A587887A0D}" type="datetimeFigureOut">
               <a:rPr lang="en-US" smtClean="0"/>
-              <a:t>8/19/15</a:t>
+              <a:t>8/19/2015</a:t>
             </a:fld>
             <a:endParaRPr lang="en-US"/>
           </a:p>
@@ -811,7 +827,7 @@
     </p:spTree>
     <p:extLst>
       <p:ext uri="{BB962C8B-B14F-4D97-AF65-F5344CB8AC3E}">
-        <p14:creationId xmlns:p14="http://schemas.microsoft.com/office/powerpoint/2010/main" val="1151576839"/>
+        <p14:creationId xmlns:p14="http://schemas.microsoft.com/office/powerpoint/2010/main" val="3340116549"/>
       </p:ext>
     </p:extLst>
   </p:cSld>
@@ -1394,7 +1410,7 @@
           <a:p>
             <a:fld id="{651A0C47-018D-4460-B945-BFF7981B6CA6}" type="datetimeFigureOut">
               <a:rPr lang="en-US" smtClean="0"/>
-              <a:t>8/19/15</a:t>
+              <a:t>8/19/2015</a:t>
             </a:fld>
             <a:endParaRPr lang="en-US"/>
           </a:p>
@@ -1726,7 +1742,7 @@
           <a:p>
             <a:fld id="{651A0C47-018D-4460-B945-BFF7981B6CA6}" type="datetimeFigureOut">
               <a:rPr lang="en-US" smtClean="0"/>
-              <a:t>8/19/15</a:t>
+              <a:t>8/19/2015</a:t>
             </a:fld>
             <a:endParaRPr lang="en-US"/>
           </a:p>
@@ -2058,7 +2074,7 @@
           <a:p>
             <a:fld id="{651A0C47-018D-4460-B945-BFF7981B6CA6}" type="datetimeFigureOut">
               <a:rPr lang="en-US" smtClean="0"/>
-              <a:t>8/19/15</a:t>
+              <a:t>8/19/2015</a:t>
             </a:fld>
             <a:endParaRPr lang="en-US"/>
           </a:p>
@@ -2390,7 +2406,7 @@
           <a:p>
             <a:fld id="{651A0C47-018D-4460-B945-BFF7981B6CA6}" type="datetimeFigureOut">
               <a:rPr lang="en-US" smtClean="0"/>
-              <a:t>8/19/15</a:t>
+              <a:t>8/19/2015</a:t>
             </a:fld>
             <a:endParaRPr lang="en-US"/>
           </a:p>
@@ -3079,7 +3095,7 @@
           <a:p>
             <a:fld id="{651A0C47-018D-4460-B945-BFF7981B6CA6}" type="datetimeFigureOut">
               <a:rPr lang="en-US" smtClean="0"/>
-              <a:t>8/19/15</a:t>
+              <a:t>8/19/2015</a:t>
             </a:fld>
             <a:endParaRPr lang="en-US"/>
           </a:p>
@@ -3258,7 +3274,7 @@
           <a:p>
             <a:fld id="{651A0C47-018D-4460-B945-BFF7981B6CA6}" type="datetimeFigureOut">
               <a:rPr lang="en-US" smtClean="0"/>
-              <a:t>8/19/15</a:t>
+              <a:t>8/19/2015</a:t>
             </a:fld>
             <a:endParaRPr lang="en-US"/>
           </a:p>
@@ -3432,7 +3448,7 @@
           <a:p>
             <a:fld id="{651A0C47-018D-4460-B945-BFF7981B6CA6}" type="datetimeFigureOut">
               <a:rPr lang="en-US" smtClean="0"/>
-              <a:t>8/19/15</a:t>
+              <a:t>8/19/2015</a:t>
             </a:fld>
             <a:endParaRPr lang="en-US"/>
           </a:p>
@@ -3680,7 +3696,7 @@
           <a:p>
             <a:fld id="{651A0C47-018D-4460-B945-BFF7981B6CA6}" type="datetimeFigureOut">
               <a:rPr lang="en-US" smtClean="0"/>
-              <a:t>8/19/15</a:t>
+              <a:t>8/19/2015</a:t>
             </a:fld>
             <a:endParaRPr lang="en-US"/>
           </a:p>
@@ -4010,7 +4026,7 @@
           <a:p>
             <a:fld id="{651A0C47-018D-4460-B945-BFF7981B6CA6}" type="datetimeFigureOut">
               <a:rPr lang="en-US" smtClean="0"/>
-              <a:t>8/19/15</a:t>
+              <a:t>8/19/2015</a:t>
             </a:fld>
             <a:endParaRPr lang="en-US"/>
           </a:p>
@@ -4302,7 +4318,7 @@
           <a:p>
             <a:fld id="{651A0C47-018D-4460-B945-BFF7981B6CA6}" type="datetimeFigureOut">
               <a:rPr lang="en-US" smtClean="0"/>
-              <a:t>8/19/15</a:t>
+              <a:t>8/19/2015</a:t>
             </a:fld>
             <a:endParaRPr lang="en-US"/>
           </a:p>
@@ -4738,7 +4754,7 @@
           <a:p>
             <a:fld id="{651A0C47-018D-4460-B945-BFF7981B6CA6}" type="datetimeFigureOut">
               <a:rPr lang="en-US" smtClean="0"/>
-              <a:t>8/19/15</a:t>
+              <a:t>8/19/2015</a:t>
             </a:fld>
             <a:endParaRPr lang="en-US"/>
           </a:p>
@@ -4925,7 +4941,7 @@
           <a:p>
             <a:fld id="{651A0C47-018D-4460-B945-BFF7981B6CA6}" type="datetimeFigureOut">
               <a:rPr lang="en-US" smtClean="0"/>
-              <a:t>8/19/15</a:t>
+              <a:t>8/19/2015</a:t>
             </a:fld>
             <a:endParaRPr lang="en-US"/>
           </a:p>
@@ -5015,7 +5031,7 @@
           <a:p>
             <a:fld id="{651A0C47-018D-4460-B945-BFF7981B6CA6}" type="datetimeFigureOut">
               <a:rPr lang="en-US" smtClean="0"/>
-              <a:t>8/19/15</a:t>
+              <a:t>8/19/2015</a:t>
             </a:fld>
             <a:endParaRPr lang="en-US"/>
           </a:p>
@@ -5296,7 +5312,7 @@
           <a:p>
             <a:fld id="{651A0C47-018D-4460-B945-BFF7981B6CA6}" type="datetimeFigureOut">
               <a:rPr lang="en-US" smtClean="0"/>
-              <a:t>8/19/15</a:t>
+              <a:t>8/19/2015</a:t>
             </a:fld>
             <a:endParaRPr lang="en-US"/>
           </a:p>
@@ -5511,7 +5527,7 @@
           <a:p>
             <a:fld id="{651A0C47-018D-4460-B945-BFF7981B6CA6}" type="datetimeFigureOut">
               <a:rPr lang="en-US" smtClean="0"/>
-              <a:t>8/19/15</a:t>
+              <a:t>8/19/2015</a:t>
             </a:fld>
             <a:endParaRPr lang="en-US"/>
           </a:p>
@@ -6153,7 +6169,7 @@
   <p:timing>
     <p:tnLst>
       <p:par>
-        <p:cTn xmlns:p14="http://schemas.microsoft.com/office/powerpoint/2010/main" id="1" dur="indefinite" restart="never" nodeType="tmRoot"/>
+        <p:cTn id="1" dur="indefinite" restart="never" nodeType="tmRoot"/>
       </p:par>
     </p:tnLst>
   </p:timing>
@@ -6213,7 +6229,7 @@
   <p:timing>
     <p:tnLst>
       <p:par>
-        <p:cTn xmlns:p14="http://schemas.microsoft.com/office/powerpoint/2010/main" id="1" dur="indefinite" restart="never" nodeType="tmRoot"/>
+        <p:cTn id="1" dur="indefinite" restart="never" nodeType="tmRoot"/>
       </p:par>
     </p:tnLst>
   </p:timing>
@@ -6246,7 +6262,7 @@
           <p:nvPr/>
         </p:nvPicPr>
         <p:blipFill>
-          <a:blip r:embed="rId3" cstate="print">
+          <a:blip r:embed="rId3" cstate="email">
             <a:extLst>
               <a:ext uri="{28A0092B-C50C-407E-A947-70E740481C1C}">
                 <a14:useLocalDpi xmlns:a14="http://schemas.microsoft.com/office/drawing/2010/main" val="0"/>
@@ -6276,7 +6292,7 @@
           <p:nvPr/>
         </p:nvPicPr>
         <p:blipFill>
-          <a:blip r:embed="rId4">
+          <a:blip r:embed="rId4" cstate="email">
             <a:extLst>
               <a:ext uri="{28A0092B-C50C-407E-A947-70E740481C1C}">
                 <a14:useLocalDpi xmlns:a14="http://schemas.microsoft.com/office/drawing/2010/main" val="0"/>
@@ -6306,7 +6322,7 @@
           <p:nvPr/>
         </p:nvPicPr>
         <p:blipFill>
-          <a:blip r:embed="rId5">
+          <a:blip r:embed="rId5" cstate="email">
             <a:extLst>
               <a:ext uri="{28A0092B-C50C-407E-A947-70E740481C1C}">
                 <a14:useLocalDpi xmlns:a14="http://schemas.microsoft.com/office/drawing/2010/main" val="0"/>
@@ -6410,7 +6426,7 @@
   <p:timing>
     <p:tnLst>
       <p:par>
-        <p:cTn xmlns:p14="http://schemas.microsoft.com/office/powerpoint/2010/main" id="1" dur="indefinite" restart="never" nodeType="tmRoot">
+        <p:cTn id="1" dur="indefinite" restart="never" nodeType="tmRoot">
           <p:childTnLst>
             <p:seq concurrent="1" nextAc="seek">
               <p:cTn id="2" dur="indefinite" nodeType="mainSeq">
@@ -6853,7 +6869,7 @@
           <p:nvPr/>
         </p:nvPicPr>
         <p:blipFill>
-          <a:blip r:embed="rId3">
+          <a:blip r:embed="rId3" cstate="email">
             <a:extLst>
               <a:ext uri="{28A0092B-C50C-407E-A947-70E740481C1C}">
                 <a14:useLocalDpi xmlns:a14="http://schemas.microsoft.com/office/drawing/2010/main" val="0"/>
@@ -6887,7 +6903,7 @@
   <p:timing>
     <p:tnLst>
       <p:par>
-        <p:cTn xmlns:p14="http://schemas.microsoft.com/office/powerpoint/2010/main" id="1" dur="indefinite" restart="never" nodeType="tmRoot"/>
+        <p:cTn id="1" dur="indefinite" restart="never" nodeType="tmRoot"/>
       </p:par>
     </p:tnLst>
   </p:timing>
@@ -7099,7 +7115,7 @@
   <p:timing>
     <p:tnLst>
       <p:par>
-        <p:cTn xmlns:p14="http://schemas.microsoft.com/office/powerpoint/2010/main" id="1" dur="indefinite" restart="never" nodeType="tmRoot"/>
+        <p:cTn id="1" dur="indefinite" restart="never" nodeType="tmRoot"/>
       </p:par>
     </p:tnLst>
   </p:timing>
@@ -7175,22 +7191,1763 @@
           </a:p>
         </p:txBody>
       </p:sp>
+      <p:sp>
+        <p:nvSpPr>
+          <p:cNvPr id="2" name="Rounded Rectangle 1"/>
+          <p:cNvSpPr/>
+          <p:nvPr/>
+        </p:nvSpPr>
+        <p:spPr>
+          <a:xfrm>
+            <a:off x="816746" y="2090554"/>
+            <a:ext cx="1069759" cy="998875"/>
+          </a:xfrm>
+          <a:prstGeom prst="roundRect">
+            <a:avLst/>
+          </a:prstGeom>
+          <a:solidFill>
+            <a:srgbClr val="407320">
+              <a:alpha val="0"/>
+            </a:srgbClr>
+          </a:solidFill>
+          <a:ln w="38100">
+            <a:solidFill>
+              <a:srgbClr val="FF0000"/>
+            </a:solidFill>
+          </a:ln>
+        </p:spPr>
+        <p:style>
+          <a:lnRef idx="1">
+            <a:schemeClr val="accent1"/>
+          </a:lnRef>
+          <a:fillRef idx="3">
+            <a:schemeClr val="accent1"/>
+          </a:fillRef>
+          <a:effectRef idx="2">
+            <a:schemeClr val="accent1"/>
+          </a:effectRef>
+          <a:fontRef idx="minor">
+            <a:schemeClr val="lt1"/>
+          </a:fontRef>
+        </p:style>
+        <p:txBody>
+          <a:bodyPr rtlCol="0" anchor="ctr"/>
+          <a:lstStyle/>
+          <a:p>
+            <a:pPr algn="ctr"/>
+            <a:endParaRPr lang="en-US"/>
+          </a:p>
+        </p:txBody>
+      </p:sp>
+      <p:sp>
+        <p:nvSpPr>
+          <p:cNvPr id="6" name="Rounded Rectangle 5"/>
+          <p:cNvSpPr/>
+          <p:nvPr/>
+        </p:nvSpPr>
+        <p:spPr>
+          <a:xfrm>
+            <a:off x="766456" y="3832999"/>
+            <a:ext cx="1069759" cy="615114"/>
+          </a:xfrm>
+          <a:prstGeom prst="roundRect">
+            <a:avLst/>
+          </a:prstGeom>
+          <a:solidFill>
+            <a:srgbClr val="407320">
+              <a:alpha val="0"/>
+            </a:srgbClr>
+          </a:solidFill>
+          <a:ln w="38100">
+            <a:solidFill>
+              <a:srgbClr val="FF0000"/>
+            </a:solidFill>
+          </a:ln>
+        </p:spPr>
+        <p:style>
+          <a:lnRef idx="1">
+            <a:schemeClr val="accent1"/>
+          </a:lnRef>
+          <a:fillRef idx="3">
+            <a:schemeClr val="accent1"/>
+          </a:fillRef>
+          <a:effectRef idx="2">
+            <a:schemeClr val="accent1"/>
+          </a:effectRef>
+          <a:fontRef idx="minor">
+            <a:schemeClr val="lt1"/>
+          </a:fontRef>
+        </p:style>
+        <p:txBody>
+          <a:bodyPr rtlCol="0" anchor="ctr"/>
+          <a:lstStyle/>
+          <a:p>
+            <a:pPr algn="ctr"/>
+            <a:endParaRPr lang="en-US"/>
+          </a:p>
+        </p:txBody>
+      </p:sp>
+      <p:sp>
+        <p:nvSpPr>
+          <p:cNvPr id="7" name="Rounded Rectangle 6"/>
+          <p:cNvSpPr/>
+          <p:nvPr/>
+        </p:nvSpPr>
+        <p:spPr>
+          <a:xfrm>
+            <a:off x="2364192" y="2138450"/>
+            <a:ext cx="3227714" cy="821013"/>
+          </a:xfrm>
+          <a:prstGeom prst="roundRect">
+            <a:avLst/>
+          </a:prstGeom>
+          <a:solidFill>
+            <a:srgbClr val="407320">
+              <a:alpha val="0"/>
+            </a:srgbClr>
+          </a:solidFill>
+          <a:ln w="38100">
+            <a:solidFill>
+              <a:srgbClr val="FF0000"/>
+            </a:solidFill>
+          </a:ln>
+        </p:spPr>
+        <p:style>
+          <a:lnRef idx="1">
+            <a:schemeClr val="accent1"/>
+          </a:lnRef>
+          <a:fillRef idx="3">
+            <a:schemeClr val="accent1"/>
+          </a:fillRef>
+          <a:effectRef idx="2">
+            <a:schemeClr val="accent1"/>
+          </a:effectRef>
+          <a:fontRef idx="minor">
+            <a:schemeClr val="lt1"/>
+          </a:fontRef>
+        </p:style>
+        <p:txBody>
+          <a:bodyPr rtlCol="0" anchor="ctr"/>
+          <a:lstStyle/>
+          <a:p>
+            <a:pPr algn="ctr"/>
+            <a:endParaRPr lang="en-US"/>
+          </a:p>
+        </p:txBody>
+      </p:sp>
+      <p:sp>
+        <p:nvSpPr>
+          <p:cNvPr id="10" name="Rounded Rectangle 9"/>
+          <p:cNvSpPr/>
+          <p:nvPr/>
+        </p:nvSpPr>
+        <p:spPr>
+          <a:xfrm>
+            <a:off x="3019027" y="4781812"/>
+            <a:ext cx="1069759" cy="615114"/>
+          </a:xfrm>
+          <a:prstGeom prst="roundRect">
+            <a:avLst/>
+          </a:prstGeom>
+          <a:solidFill>
+            <a:srgbClr val="407320">
+              <a:alpha val="0"/>
+            </a:srgbClr>
+          </a:solidFill>
+          <a:ln w="38100">
+            <a:solidFill>
+              <a:srgbClr val="FF0000"/>
+            </a:solidFill>
+          </a:ln>
+        </p:spPr>
+        <p:style>
+          <a:lnRef idx="1">
+            <a:schemeClr val="accent1"/>
+          </a:lnRef>
+          <a:fillRef idx="3">
+            <a:schemeClr val="accent1"/>
+          </a:fillRef>
+          <a:effectRef idx="2">
+            <a:schemeClr val="accent1"/>
+          </a:effectRef>
+          <a:fontRef idx="minor">
+            <a:schemeClr val="lt1"/>
+          </a:fontRef>
+        </p:style>
+        <p:txBody>
+          <a:bodyPr rtlCol="0" anchor="ctr"/>
+          <a:lstStyle/>
+          <a:p>
+            <a:pPr algn="ctr"/>
+            <a:endParaRPr lang="en-US"/>
+          </a:p>
+        </p:txBody>
+      </p:sp>
+      <p:sp>
+        <p:nvSpPr>
+          <p:cNvPr id="12" name="Rounded Rectangle 11"/>
+          <p:cNvSpPr/>
+          <p:nvPr/>
+        </p:nvSpPr>
+        <p:spPr>
+          <a:xfrm>
+            <a:off x="8074241" y="4911598"/>
+            <a:ext cx="1069759" cy="615114"/>
+          </a:xfrm>
+          <a:prstGeom prst="roundRect">
+            <a:avLst/>
+          </a:prstGeom>
+          <a:solidFill>
+            <a:srgbClr val="407320">
+              <a:alpha val="0"/>
+            </a:srgbClr>
+          </a:solidFill>
+          <a:ln w="38100">
+            <a:solidFill>
+              <a:srgbClr val="FF0000"/>
+            </a:solidFill>
+          </a:ln>
+        </p:spPr>
+        <p:style>
+          <a:lnRef idx="1">
+            <a:schemeClr val="accent1"/>
+          </a:lnRef>
+          <a:fillRef idx="3">
+            <a:schemeClr val="accent1"/>
+          </a:fillRef>
+          <a:effectRef idx="2">
+            <a:schemeClr val="accent1"/>
+          </a:effectRef>
+          <a:fontRef idx="minor">
+            <a:schemeClr val="lt1"/>
+          </a:fontRef>
+        </p:style>
+        <p:txBody>
+          <a:bodyPr rtlCol="0" anchor="ctr"/>
+          <a:lstStyle/>
+          <a:p>
+            <a:pPr algn="ctr"/>
+            <a:endParaRPr lang="en-US"/>
+          </a:p>
+        </p:txBody>
+      </p:sp>
+      <p:sp>
+        <p:nvSpPr>
+          <p:cNvPr id="13" name="Rounded Rectangle 12"/>
+          <p:cNvSpPr/>
+          <p:nvPr/>
+        </p:nvSpPr>
+        <p:spPr>
+          <a:xfrm>
+            <a:off x="5057026" y="4140556"/>
+            <a:ext cx="1069759" cy="615114"/>
+          </a:xfrm>
+          <a:prstGeom prst="roundRect">
+            <a:avLst/>
+          </a:prstGeom>
+          <a:solidFill>
+            <a:srgbClr val="407320">
+              <a:alpha val="0"/>
+            </a:srgbClr>
+          </a:solidFill>
+          <a:ln w="38100">
+            <a:solidFill>
+              <a:srgbClr val="FF0000"/>
+            </a:solidFill>
+          </a:ln>
+        </p:spPr>
+        <p:style>
+          <a:lnRef idx="1">
+            <a:schemeClr val="accent1"/>
+          </a:lnRef>
+          <a:fillRef idx="3">
+            <a:schemeClr val="accent1"/>
+          </a:fillRef>
+          <a:effectRef idx="2">
+            <a:schemeClr val="accent1"/>
+          </a:effectRef>
+          <a:fontRef idx="minor">
+            <a:schemeClr val="lt1"/>
+          </a:fontRef>
+        </p:style>
+        <p:txBody>
+          <a:bodyPr rtlCol="0" anchor="ctr"/>
+          <a:lstStyle/>
+          <a:p>
+            <a:pPr algn="ctr"/>
+            <a:endParaRPr lang="en-US"/>
+          </a:p>
+        </p:txBody>
+      </p:sp>
+      <p:sp>
+        <p:nvSpPr>
+          <p:cNvPr id="14" name="Rounded Rectangle 13"/>
+          <p:cNvSpPr/>
+          <p:nvPr/>
+        </p:nvSpPr>
+        <p:spPr>
+          <a:xfrm>
+            <a:off x="3910614" y="3013025"/>
+            <a:ext cx="1069759" cy="615114"/>
+          </a:xfrm>
+          <a:prstGeom prst="roundRect">
+            <a:avLst/>
+          </a:prstGeom>
+          <a:solidFill>
+            <a:srgbClr val="407320">
+              <a:alpha val="0"/>
+            </a:srgbClr>
+          </a:solidFill>
+          <a:ln w="38100">
+            <a:solidFill>
+              <a:srgbClr val="FF0000"/>
+            </a:solidFill>
+          </a:ln>
+        </p:spPr>
+        <p:style>
+          <a:lnRef idx="1">
+            <a:schemeClr val="accent1"/>
+          </a:lnRef>
+          <a:fillRef idx="3">
+            <a:schemeClr val="accent1"/>
+          </a:fillRef>
+          <a:effectRef idx="2">
+            <a:schemeClr val="accent1"/>
+          </a:effectRef>
+          <a:fontRef idx="minor">
+            <a:schemeClr val="lt1"/>
+          </a:fontRef>
+        </p:style>
+        <p:txBody>
+          <a:bodyPr rtlCol="0" anchor="ctr"/>
+          <a:lstStyle/>
+          <a:p>
+            <a:pPr algn="ctr"/>
+            <a:endParaRPr lang="en-US"/>
+          </a:p>
+        </p:txBody>
+      </p:sp>
+      <p:sp>
+        <p:nvSpPr>
+          <p:cNvPr id="15" name="Rounded Rectangle 14"/>
+          <p:cNvSpPr/>
+          <p:nvPr/>
+        </p:nvSpPr>
+        <p:spPr>
+          <a:xfrm>
+            <a:off x="3892041" y="3959357"/>
+            <a:ext cx="1069759" cy="615114"/>
+          </a:xfrm>
+          <a:prstGeom prst="roundRect">
+            <a:avLst/>
+          </a:prstGeom>
+          <a:solidFill>
+            <a:srgbClr val="407320">
+              <a:alpha val="0"/>
+            </a:srgbClr>
+          </a:solidFill>
+          <a:ln w="38100">
+            <a:solidFill>
+              <a:srgbClr val="FF0000"/>
+            </a:solidFill>
+          </a:ln>
+        </p:spPr>
+        <p:style>
+          <a:lnRef idx="1">
+            <a:schemeClr val="accent1"/>
+          </a:lnRef>
+          <a:fillRef idx="3">
+            <a:schemeClr val="accent1"/>
+          </a:fillRef>
+          <a:effectRef idx="2">
+            <a:schemeClr val="accent1"/>
+          </a:effectRef>
+          <a:fontRef idx="minor">
+            <a:schemeClr val="lt1"/>
+          </a:fontRef>
+        </p:style>
+        <p:txBody>
+          <a:bodyPr rtlCol="0" anchor="ctr"/>
+          <a:lstStyle/>
+          <a:p>
+            <a:pPr algn="ctr"/>
+            <a:endParaRPr lang="en-US"/>
+          </a:p>
+        </p:txBody>
+      </p:sp>
+      <p:pic>
+        <p:nvPicPr>
+          <p:cNvPr id="4" name="Picture 3"/>
+          <p:cNvPicPr>
+            <a:picLocks noChangeAspect="1"/>
+          </p:cNvPicPr>
+          <p:nvPr/>
+        </p:nvPicPr>
+        <p:blipFill>
+          <a:blip r:embed="rId4" cstate="email">
+            <a:extLst>
+              <a:ext uri="{28A0092B-C50C-407E-A947-70E740481C1C}">
+                <a14:useLocalDpi xmlns:a14="http://schemas.microsoft.com/office/drawing/2010/main" val="0"/>
+              </a:ext>
+            </a:extLst>
+          </a:blip>
+          <a:stretch>
+            <a:fillRect/>
+          </a:stretch>
+        </p:blipFill>
+        <p:spPr>
+          <a:xfrm>
+            <a:off x="7406672" y="2874864"/>
+            <a:ext cx="2077275" cy="2077275"/>
+          </a:xfrm>
+          <a:prstGeom prst="rect">
+            <a:avLst/>
+          </a:prstGeom>
+        </p:spPr>
+      </p:pic>
+      <p:sp>
+        <p:nvSpPr>
+          <p:cNvPr id="5" name="Rectangle 4"/>
+          <p:cNvSpPr/>
+          <p:nvPr/>
+        </p:nvSpPr>
+        <p:spPr>
+          <a:xfrm>
+            <a:off x="753453" y="2077451"/>
+            <a:ext cx="6423069" cy="1718825"/>
+          </a:xfrm>
+          <a:prstGeom prst="rect">
+            <a:avLst/>
+          </a:prstGeom>
+        </p:spPr>
+        <p:style>
+          <a:lnRef idx="1">
+            <a:schemeClr val="accent6"/>
+          </a:lnRef>
+          <a:fillRef idx="2">
+            <a:schemeClr val="accent6"/>
+          </a:fillRef>
+          <a:effectRef idx="1">
+            <a:schemeClr val="accent6"/>
+          </a:effectRef>
+          <a:fontRef idx="minor">
+            <a:schemeClr val="dk1"/>
+          </a:fontRef>
+        </p:style>
+        <p:txBody>
+          <a:bodyPr rtlCol="0" anchor="ctr"/>
+          <a:lstStyle/>
+          <a:p>
+            <a:r>
+              <a:rPr lang="en-US" dirty="0"/>
+              <a:t>Coffeescript (JS is the worst</a:t>
+            </a:r>
+            <a:r>
+              <a:rPr lang="en-US" dirty="0" smtClean="0"/>
+              <a:t>)</a:t>
+            </a:r>
+          </a:p>
+          <a:p>
+            <a:pPr marL="285750" indent="-285750">
+              <a:buFont typeface="Arial" panose="020B0604020202020204" pitchFamily="34" charset="0"/>
+              <a:buChar char="•"/>
+            </a:pPr>
+            <a:r>
+              <a:rPr lang="en-US" dirty="0" smtClean="0"/>
+              <a:t>Angular</a:t>
+            </a:r>
+          </a:p>
+          <a:p>
+            <a:pPr marL="285750" indent="-285750">
+              <a:buFont typeface="Arial" panose="020B0604020202020204" pitchFamily="34" charset="0"/>
+              <a:buChar char="•"/>
+            </a:pPr>
+            <a:r>
+              <a:rPr lang="en-US" dirty="0" smtClean="0"/>
+              <a:t>Ajax</a:t>
+            </a:r>
+            <a:endParaRPr lang="en-US" dirty="0"/>
+          </a:p>
+        </p:txBody>
+      </p:sp>
+      <p:sp>
+        <p:nvSpPr>
+          <p:cNvPr id="16" name="Rectangle 15"/>
+          <p:cNvSpPr/>
+          <p:nvPr/>
+        </p:nvSpPr>
+        <p:spPr>
+          <a:xfrm>
+            <a:off x="757846" y="3775764"/>
+            <a:ext cx="6423069" cy="1866647"/>
+          </a:xfrm>
+          <a:prstGeom prst="rect">
+            <a:avLst/>
+          </a:prstGeom>
+          <a:solidFill>
+            <a:schemeClr val="accent3">
+              <a:lumMod val="60000"/>
+              <a:lumOff val="40000"/>
+            </a:schemeClr>
+          </a:solidFill>
+        </p:spPr>
+        <p:style>
+          <a:lnRef idx="1">
+            <a:schemeClr val="accent6"/>
+          </a:lnRef>
+          <a:fillRef idx="2">
+            <a:schemeClr val="accent6"/>
+          </a:fillRef>
+          <a:effectRef idx="1">
+            <a:schemeClr val="accent6"/>
+          </a:effectRef>
+          <a:fontRef idx="minor">
+            <a:schemeClr val="dk1"/>
+          </a:fontRef>
+        </p:style>
+        <p:txBody>
+          <a:bodyPr rtlCol="0" anchor="ctr"/>
+          <a:lstStyle/>
+          <a:p>
+            <a:r>
+              <a:rPr lang="en-US" dirty="0" smtClean="0"/>
+              <a:t>Python</a:t>
+            </a:r>
+          </a:p>
+          <a:p>
+            <a:pPr marL="285750" indent="-285750">
+              <a:buFont typeface="Arial" panose="020B0604020202020204" pitchFamily="34" charset="0"/>
+              <a:buChar char="•"/>
+            </a:pPr>
+            <a:r>
+              <a:rPr lang="en-US" dirty="0" smtClean="0"/>
+              <a:t>Flask</a:t>
+            </a:r>
+          </a:p>
+          <a:p>
+            <a:pPr marL="285750" indent="-285750">
+              <a:buFont typeface="Arial" panose="020B0604020202020204" pitchFamily="34" charset="0"/>
+              <a:buChar char="•"/>
+            </a:pPr>
+            <a:r>
+              <a:rPr lang="en-US" dirty="0" err="1" smtClean="0"/>
+              <a:t>SQLAlchemy</a:t>
+            </a:r>
+            <a:endParaRPr lang="en-US" dirty="0" smtClean="0"/>
+          </a:p>
+          <a:p>
+            <a:pPr marL="285750" indent="-285750">
+              <a:buFont typeface="Arial" panose="020B0604020202020204" pitchFamily="34" charset="0"/>
+              <a:buChar char="•"/>
+            </a:pPr>
+            <a:r>
+              <a:rPr lang="en-US" dirty="0" smtClean="0"/>
+              <a:t>Celery (Maybe)</a:t>
+            </a:r>
+          </a:p>
+        </p:txBody>
+      </p:sp>
+      <p:sp>
+        <p:nvSpPr>
+          <p:cNvPr id="17" name="Rectangle 16"/>
+          <p:cNvSpPr/>
+          <p:nvPr/>
+        </p:nvSpPr>
+        <p:spPr>
+          <a:xfrm>
+            <a:off x="762180" y="5637906"/>
+            <a:ext cx="6423069" cy="784561"/>
+          </a:xfrm>
+          <a:prstGeom prst="rect">
+            <a:avLst/>
+          </a:prstGeom>
+          <a:solidFill>
+            <a:schemeClr val="accent1">
+              <a:lumMod val="60000"/>
+              <a:lumOff val="40000"/>
+            </a:schemeClr>
+          </a:solidFill>
+        </p:spPr>
+        <p:style>
+          <a:lnRef idx="1">
+            <a:schemeClr val="accent6"/>
+          </a:lnRef>
+          <a:fillRef idx="2">
+            <a:schemeClr val="accent6"/>
+          </a:fillRef>
+          <a:effectRef idx="1">
+            <a:schemeClr val="accent6"/>
+          </a:effectRef>
+          <a:fontRef idx="minor">
+            <a:schemeClr val="dk1"/>
+          </a:fontRef>
+        </p:style>
+        <p:txBody>
+          <a:bodyPr rtlCol="0" anchor="ctr"/>
+          <a:lstStyle/>
+          <a:p>
+            <a:pPr marL="285750" indent="-285750">
+              <a:buFont typeface="Arial" panose="020B0604020202020204" pitchFamily="34" charset="0"/>
+              <a:buChar char="•"/>
+            </a:pPr>
+            <a:r>
+              <a:rPr lang="en-US" dirty="0" smtClean="0"/>
+              <a:t>SQLite</a:t>
+            </a:r>
+          </a:p>
+          <a:p>
+            <a:pPr marL="285750" indent="-285750">
+              <a:buFont typeface="Arial" panose="020B0604020202020204" pitchFamily="34" charset="0"/>
+              <a:buChar char="•"/>
+            </a:pPr>
+            <a:r>
+              <a:rPr lang="en-US" dirty="0" err="1" smtClean="0"/>
+              <a:t>Cron</a:t>
+            </a:r>
+            <a:r>
+              <a:rPr lang="en-US" dirty="0" smtClean="0"/>
+              <a:t> (Maybe)</a:t>
+            </a:r>
+          </a:p>
+          <a:p>
+            <a:pPr marL="285750" indent="-285750">
+              <a:buFont typeface="Arial" panose="020B0604020202020204" pitchFamily="34" charset="0"/>
+              <a:buChar char="•"/>
+            </a:pPr>
+            <a:endParaRPr lang="en-US" dirty="0"/>
+          </a:p>
+        </p:txBody>
+      </p:sp>
+      <p:pic>
+        <p:nvPicPr>
+          <p:cNvPr id="3" name="Picture 2"/>
+          <p:cNvPicPr>
+            <a:picLocks noChangeAspect="1"/>
+          </p:cNvPicPr>
+          <p:nvPr/>
+        </p:nvPicPr>
+        <p:blipFill>
+          <a:blip r:embed="rId5" cstate="email">
+            <a:extLst>
+              <a:ext uri="{28A0092B-C50C-407E-A947-70E740481C1C}">
+                <a14:useLocalDpi xmlns:a14="http://schemas.microsoft.com/office/drawing/2010/main" val="0"/>
+              </a:ext>
+            </a:extLst>
+          </a:blip>
+          <a:stretch>
+            <a:fillRect/>
+          </a:stretch>
+        </p:blipFill>
+        <p:spPr>
+          <a:xfrm>
+            <a:off x="2837817" y="2367195"/>
+            <a:ext cx="2651765" cy="1881600"/>
+          </a:xfrm>
+          <a:prstGeom prst="rect">
+            <a:avLst/>
+          </a:prstGeom>
+        </p:spPr>
+      </p:pic>
+      <p:pic>
+        <p:nvPicPr>
+          <p:cNvPr id="8" name="Picture 7"/>
+          <p:cNvPicPr>
+            <a:picLocks noChangeAspect="1"/>
+          </p:cNvPicPr>
+          <p:nvPr/>
+        </p:nvPicPr>
+        <p:blipFill>
+          <a:blip r:embed="rId6" cstate="email">
+            <a:extLst>
+              <a:ext uri="{28A0092B-C50C-407E-A947-70E740481C1C}">
+                <a14:useLocalDpi xmlns:a14="http://schemas.microsoft.com/office/drawing/2010/main" val="0"/>
+              </a:ext>
+            </a:extLst>
+          </a:blip>
+          <a:stretch>
+            <a:fillRect/>
+          </a:stretch>
+        </p:blipFill>
+        <p:spPr>
+          <a:xfrm>
+            <a:off x="2122027" y="3876331"/>
+            <a:ext cx="2819924" cy="1472492"/>
+          </a:xfrm>
+          <a:prstGeom prst="rect">
+            <a:avLst/>
+          </a:prstGeom>
+        </p:spPr>
+      </p:pic>
     </p:spTree>
     <p:extLst>
       <p:ext uri="{BB962C8B-B14F-4D97-AF65-F5344CB8AC3E}">
-        <p14:creationId xmlns:p14="http://schemas.microsoft.com/office/powerpoint/2010/main" val="3097873855"/>
+        <p14:creationId xmlns:p14="http://schemas.microsoft.com/office/powerpoint/2010/main" val="803841954"/>
       </p:ext>
     </p:extLst>
   </p:cSld>
   <p:clrMapOvr>
     <a:masterClrMapping/>
   </p:clrMapOvr>
+  <mc:AlternateContent xmlns:mc="http://schemas.openxmlformats.org/markup-compatibility/2006">
+    <mc:Choice xmlns:p14="http://schemas.microsoft.com/office/powerpoint/2010/main" Requires="p14">
+      <p:transition p14:dur="0"/>
+    </mc:Choice>
+    <mc:Fallback>
+      <p:transition/>
+    </mc:Fallback>
+  </mc:AlternateContent>
   <p:timing>
     <p:tnLst>
       <p:par>
-        <p:cTn xmlns:p14="http://schemas.microsoft.com/office/powerpoint/2010/main" id="1" dur="indefinite" restart="never" nodeType="tmRoot"/>
+        <p:cTn id="1" dur="indefinite" restart="never" nodeType="tmRoot">
+          <p:childTnLst>
+            <p:seq concurrent="1" nextAc="seek">
+              <p:cTn id="2" dur="indefinite" nodeType="mainSeq">
+                <p:childTnLst>
+                  <p:par>
+                    <p:cTn id="3" fill="hold">
+                      <p:stCondLst>
+                        <p:cond delay="indefinite"/>
+                      </p:stCondLst>
+                      <p:childTnLst>
+                        <p:par>
+                          <p:cTn id="4" fill="hold">
+                            <p:stCondLst>
+                              <p:cond delay="0"/>
+                            </p:stCondLst>
+                            <p:childTnLst>
+                              <p:par>
+                                <p:cTn id="5" presetID="1" presetClass="entr" presetSubtype="0" fill="hold" grpId="0" nodeType="clickEffect">
+                                  <p:stCondLst>
+                                    <p:cond delay="0"/>
+                                  </p:stCondLst>
+                                  <p:childTnLst>
+                                    <p:set>
+                                      <p:cBhvr>
+                                        <p:cTn id="6" dur="1" fill="hold">
+                                          <p:stCondLst>
+                                            <p:cond delay="0"/>
+                                          </p:stCondLst>
+                                        </p:cTn>
+                                        <p:tgtEl>
+                                          <p:spTgt spid="2"/>
+                                        </p:tgtEl>
+                                        <p:attrNameLst>
+                                          <p:attrName>style.visibility</p:attrName>
+                                        </p:attrNameLst>
+                                      </p:cBhvr>
+                                      <p:to>
+                                        <p:strVal val="visible"/>
+                                      </p:to>
+                                    </p:set>
+                                  </p:childTnLst>
+                                </p:cTn>
+                              </p:par>
+                              <p:par>
+                                <p:cTn id="7" presetID="1" presetClass="entr" presetSubtype="0" fill="hold" nodeType="withEffect">
+                                  <p:stCondLst>
+                                    <p:cond delay="0"/>
+                                  </p:stCondLst>
+                                  <p:childTnLst>
+                                    <p:set>
+                                      <p:cBhvr>
+                                        <p:cTn id="8" dur="1" fill="hold">
+                                          <p:stCondLst>
+                                            <p:cond delay="0"/>
+                                          </p:stCondLst>
+                                        </p:cTn>
+                                        <p:tgtEl>
+                                          <p:spTgt spid="3"/>
+                                        </p:tgtEl>
+                                        <p:attrNameLst>
+                                          <p:attrName>style.visibility</p:attrName>
+                                        </p:attrNameLst>
+                                      </p:cBhvr>
+                                      <p:to>
+                                        <p:strVal val="visible"/>
+                                      </p:to>
+                                    </p:set>
+                                  </p:childTnLst>
+                                </p:cTn>
+                              </p:par>
+                            </p:childTnLst>
+                          </p:cTn>
+                        </p:par>
+                      </p:childTnLst>
+                    </p:cTn>
+                  </p:par>
+                  <p:par>
+                    <p:cTn id="9" fill="hold">
+                      <p:stCondLst>
+                        <p:cond delay="indefinite"/>
+                      </p:stCondLst>
+                      <p:childTnLst>
+                        <p:par>
+                          <p:cTn id="10" fill="hold">
+                            <p:stCondLst>
+                              <p:cond delay="0"/>
+                            </p:stCondLst>
+                            <p:childTnLst>
+                              <p:par>
+                                <p:cTn id="11" presetID="1" presetClass="entr" presetSubtype="0" fill="hold" grpId="0" nodeType="clickEffect">
+                                  <p:stCondLst>
+                                    <p:cond delay="0"/>
+                                  </p:stCondLst>
+                                  <p:childTnLst>
+                                    <p:set>
+                                      <p:cBhvr>
+                                        <p:cTn id="12" dur="1" fill="hold">
+                                          <p:stCondLst>
+                                            <p:cond delay="0"/>
+                                          </p:stCondLst>
+                                        </p:cTn>
+                                        <p:tgtEl>
+                                          <p:spTgt spid="6"/>
+                                        </p:tgtEl>
+                                        <p:attrNameLst>
+                                          <p:attrName>style.visibility</p:attrName>
+                                        </p:attrNameLst>
+                                      </p:cBhvr>
+                                      <p:to>
+                                        <p:strVal val="visible"/>
+                                      </p:to>
+                                    </p:set>
+                                  </p:childTnLst>
+                                </p:cTn>
+                              </p:par>
+                              <p:par>
+                                <p:cTn id="13" presetID="1" presetClass="exit" presetSubtype="0" fill="hold" grpId="1" nodeType="withEffect">
+                                  <p:stCondLst>
+                                    <p:cond delay="0"/>
+                                  </p:stCondLst>
+                                  <p:childTnLst>
+                                    <p:set>
+                                      <p:cBhvr>
+                                        <p:cTn id="14" dur="1" fill="hold">
+                                          <p:stCondLst>
+                                            <p:cond delay="0"/>
+                                          </p:stCondLst>
+                                        </p:cTn>
+                                        <p:tgtEl>
+                                          <p:spTgt spid="2"/>
+                                        </p:tgtEl>
+                                        <p:attrNameLst>
+                                          <p:attrName>style.visibility</p:attrName>
+                                        </p:attrNameLst>
+                                      </p:cBhvr>
+                                      <p:to>
+                                        <p:strVal val="hidden"/>
+                                      </p:to>
+                                    </p:set>
+                                  </p:childTnLst>
+                                </p:cTn>
+                              </p:par>
+                            </p:childTnLst>
+                          </p:cTn>
+                        </p:par>
+                      </p:childTnLst>
+                    </p:cTn>
+                  </p:par>
+                  <p:par>
+                    <p:cTn id="15" fill="hold">
+                      <p:stCondLst>
+                        <p:cond delay="indefinite"/>
+                      </p:stCondLst>
+                      <p:childTnLst>
+                        <p:par>
+                          <p:cTn id="16" fill="hold">
+                            <p:stCondLst>
+                              <p:cond delay="0"/>
+                            </p:stCondLst>
+                            <p:childTnLst>
+                              <p:par>
+                                <p:cTn id="17" presetID="1" presetClass="entr" presetSubtype="0" fill="hold" grpId="0" nodeType="clickEffect">
+                                  <p:stCondLst>
+                                    <p:cond delay="0"/>
+                                  </p:stCondLst>
+                                  <p:childTnLst>
+                                    <p:set>
+                                      <p:cBhvr>
+                                        <p:cTn id="18" dur="1" fill="hold">
+                                          <p:stCondLst>
+                                            <p:cond delay="0"/>
+                                          </p:stCondLst>
+                                        </p:cTn>
+                                        <p:tgtEl>
+                                          <p:spTgt spid="7"/>
+                                        </p:tgtEl>
+                                        <p:attrNameLst>
+                                          <p:attrName>style.visibility</p:attrName>
+                                        </p:attrNameLst>
+                                      </p:cBhvr>
+                                      <p:to>
+                                        <p:strVal val="visible"/>
+                                      </p:to>
+                                    </p:set>
+                                  </p:childTnLst>
+                                </p:cTn>
+                              </p:par>
+                              <p:par>
+                                <p:cTn id="19" presetID="1" presetClass="exit" presetSubtype="0" fill="hold" nodeType="withEffect">
+                                  <p:stCondLst>
+                                    <p:cond delay="0"/>
+                                  </p:stCondLst>
+                                  <p:childTnLst>
+                                    <p:set>
+                                      <p:cBhvr>
+                                        <p:cTn id="20" dur="1" fill="hold">
+                                          <p:stCondLst>
+                                            <p:cond delay="0"/>
+                                          </p:stCondLst>
+                                        </p:cTn>
+                                        <p:tgtEl>
+                                          <p:spTgt spid="3"/>
+                                        </p:tgtEl>
+                                        <p:attrNameLst>
+                                          <p:attrName>style.visibility</p:attrName>
+                                        </p:attrNameLst>
+                                      </p:cBhvr>
+                                      <p:to>
+                                        <p:strVal val="hidden"/>
+                                      </p:to>
+                                    </p:set>
+                                  </p:childTnLst>
+                                </p:cTn>
+                              </p:par>
+                              <p:par>
+                                <p:cTn id="21" presetID="1" presetClass="entr" presetSubtype="0" fill="hold" nodeType="withEffect">
+                                  <p:stCondLst>
+                                    <p:cond delay="0"/>
+                                  </p:stCondLst>
+                                  <p:childTnLst>
+                                    <p:set>
+                                      <p:cBhvr>
+                                        <p:cTn id="22" dur="1" fill="hold">
+                                          <p:stCondLst>
+                                            <p:cond delay="0"/>
+                                          </p:stCondLst>
+                                        </p:cTn>
+                                        <p:tgtEl>
+                                          <p:spTgt spid="8"/>
+                                        </p:tgtEl>
+                                        <p:attrNameLst>
+                                          <p:attrName>style.visibility</p:attrName>
+                                        </p:attrNameLst>
+                                      </p:cBhvr>
+                                      <p:to>
+                                        <p:strVal val="visible"/>
+                                      </p:to>
+                                    </p:set>
+                                  </p:childTnLst>
+                                </p:cTn>
+                              </p:par>
+                              <p:par>
+                                <p:cTn id="23" presetID="1" presetClass="exit" presetSubtype="0" fill="hold" grpId="1" nodeType="withEffect">
+                                  <p:stCondLst>
+                                    <p:cond delay="0"/>
+                                  </p:stCondLst>
+                                  <p:childTnLst>
+                                    <p:set>
+                                      <p:cBhvr>
+                                        <p:cTn id="24" dur="1" fill="hold">
+                                          <p:stCondLst>
+                                            <p:cond delay="0"/>
+                                          </p:stCondLst>
+                                        </p:cTn>
+                                        <p:tgtEl>
+                                          <p:spTgt spid="6"/>
+                                        </p:tgtEl>
+                                        <p:attrNameLst>
+                                          <p:attrName>style.visibility</p:attrName>
+                                        </p:attrNameLst>
+                                      </p:cBhvr>
+                                      <p:to>
+                                        <p:strVal val="hidden"/>
+                                      </p:to>
+                                    </p:set>
+                                  </p:childTnLst>
+                                </p:cTn>
+                              </p:par>
+                            </p:childTnLst>
+                          </p:cTn>
+                        </p:par>
+                      </p:childTnLst>
+                    </p:cTn>
+                  </p:par>
+                  <p:par>
+                    <p:cTn id="25" fill="hold">
+                      <p:stCondLst>
+                        <p:cond delay="indefinite"/>
+                      </p:stCondLst>
+                      <p:childTnLst>
+                        <p:par>
+                          <p:cTn id="26" fill="hold">
+                            <p:stCondLst>
+                              <p:cond delay="0"/>
+                            </p:stCondLst>
+                            <p:childTnLst>
+                              <p:par>
+                                <p:cTn id="27" presetID="1" presetClass="entr" presetSubtype="0" fill="hold" grpId="0" nodeType="clickEffect">
+                                  <p:stCondLst>
+                                    <p:cond delay="0"/>
+                                  </p:stCondLst>
+                                  <p:childTnLst>
+                                    <p:set>
+                                      <p:cBhvr>
+                                        <p:cTn id="28" dur="1" fill="hold">
+                                          <p:stCondLst>
+                                            <p:cond delay="0"/>
+                                          </p:stCondLst>
+                                        </p:cTn>
+                                        <p:tgtEl>
+                                          <p:spTgt spid="10"/>
+                                        </p:tgtEl>
+                                        <p:attrNameLst>
+                                          <p:attrName>style.visibility</p:attrName>
+                                        </p:attrNameLst>
+                                      </p:cBhvr>
+                                      <p:to>
+                                        <p:strVal val="visible"/>
+                                      </p:to>
+                                    </p:set>
+                                  </p:childTnLst>
+                                </p:cTn>
+                              </p:par>
+                              <p:par>
+                                <p:cTn id="29" presetID="1" presetClass="exit" presetSubtype="0" fill="hold" nodeType="withEffect">
+                                  <p:stCondLst>
+                                    <p:cond delay="0"/>
+                                  </p:stCondLst>
+                                  <p:childTnLst>
+                                    <p:set>
+                                      <p:cBhvr>
+                                        <p:cTn id="30" dur="1" fill="hold">
+                                          <p:stCondLst>
+                                            <p:cond delay="0"/>
+                                          </p:stCondLst>
+                                        </p:cTn>
+                                        <p:tgtEl>
+                                          <p:spTgt spid="8"/>
+                                        </p:tgtEl>
+                                        <p:attrNameLst>
+                                          <p:attrName>style.visibility</p:attrName>
+                                        </p:attrNameLst>
+                                      </p:cBhvr>
+                                      <p:to>
+                                        <p:strVal val="hidden"/>
+                                      </p:to>
+                                    </p:set>
+                                  </p:childTnLst>
+                                </p:cTn>
+                              </p:par>
+                              <p:par>
+                                <p:cTn id="31" presetID="1" presetClass="exit" presetSubtype="0" fill="hold" grpId="1" nodeType="withEffect">
+                                  <p:stCondLst>
+                                    <p:cond delay="0"/>
+                                  </p:stCondLst>
+                                  <p:childTnLst>
+                                    <p:set>
+                                      <p:cBhvr>
+                                        <p:cTn id="32" dur="1" fill="hold">
+                                          <p:stCondLst>
+                                            <p:cond delay="0"/>
+                                          </p:stCondLst>
+                                        </p:cTn>
+                                        <p:tgtEl>
+                                          <p:spTgt spid="7"/>
+                                        </p:tgtEl>
+                                        <p:attrNameLst>
+                                          <p:attrName>style.visibility</p:attrName>
+                                        </p:attrNameLst>
+                                      </p:cBhvr>
+                                      <p:to>
+                                        <p:strVal val="hidden"/>
+                                      </p:to>
+                                    </p:set>
+                                  </p:childTnLst>
+                                </p:cTn>
+                              </p:par>
+                            </p:childTnLst>
+                          </p:cTn>
+                        </p:par>
+                      </p:childTnLst>
+                    </p:cTn>
+                  </p:par>
+                  <p:par>
+                    <p:cTn id="33" fill="hold">
+                      <p:stCondLst>
+                        <p:cond delay="indefinite"/>
+                      </p:stCondLst>
+                      <p:childTnLst>
+                        <p:par>
+                          <p:cTn id="34" fill="hold">
+                            <p:stCondLst>
+                              <p:cond delay="0"/>
+                            </p:stCondLst>
+                            <p:childTnLst>
+                              <p:par>
+                                <p:cTn id="35" presetID="1" presetClass="entr" presetSubtype="0" fill="hold" grpId="0" nodeType="clickEffect">
+                                  <p:stCondLst>
+                                    <p:cond delay="0"/>
+                                  </p:stCondLst>
+                                  <p:childTnLst>
+                                    <p:set>
+                                      <p:cBhvr>
+                                        <p:cTn id="36" dur="1" fill="hold">
+                                          <p:stCondLst>
+                                            <p:cond delay="0"/>
+                                          </p:stCondLst>
+                                        </p:cTn>
+                                        <p:tgtEl>
+                                          <p:spTgt spid="12"/>
+                                        </p:tgtEl>
+                                        <p:attrNameLst>
+                                          <p:attrName>style.visibility</p:attrName>
+                                        </p:attrNameLst>
+                                      </p:cBhvr>
+                                      <p:to>
+                                        <p:strVal val="visible"/>
+                                      </p:to>
+                                    </p:set>
+                                  </p:childTnLst>
+                                </p:cTn>
+                              </p:par>
+                              <p:par>
+                                <p:cTn id="37" presetID="1" presetClass="exit" presetSubtype="0" fill="hold" grpId="1" nodeType="withEffect">
+                                  <p:stCondLst>
+                                    <p:cond delay="0"/>
+                                  </p:stCondLst>
+                                  <p:childTnLst>
+                                    <p:set>
+                                      <p:cBhvr>
+                                        <p:cTn id="38" dur="1" fill="hold">
+                                          <p:stCondLst>
+                                            <p:cond delay="0"/>
+                                          </p:stCondLst>
+                                        </p:cTn>
+                                        <p:tgtEl>
+                                          <p:spTgt spid="10"/>
+                                        </p:tgtEl>
+                                        <p:attrNameLst>
+                                          <p:attrName>style.visibility</p:attrName>
+                                        </p:attrNameLst>
+                                      </p:cBhvr>
+                                      <p:to>
+                                        <p:strVal val="hidden"/>
+                                      </p:to>
+                                    </p:set>
+                                  </p:childTnLst>
+                                </p:cTn>
+                              </p:par>
+                            </p:childTnLst>
+                          </p:cTn>
+                        </p:par>
+                      </p:childTnLst>
+                    </p:cTn>
+                  </p:par>
+                  <p:par>
+                    <p:cTn id="39" fill="hold">
+                      <p:stCondLst>
+                        <p:cond delay="indefinite"/>
+                      </p:stCondLst>
+                      <p:childTnLst>
+                        <p:par>
+                          <p:cTn id="40" fill="hold">
+                            <p:stCondLst>
+                              <p:cond delay="0"/>
+                            </p:stCondLst>
+                            <p:childTnLst>
+                              <p:par>
+                                <p:cTn id="41" presetID="1" presetClass="entr" presetSubtype="0" fill="hold" grpId="0" nodeType="clickEffect">
+                                  <p:stCondLst>
+                                    <p:cond delay="0"/>
+                                  </p:stCondLst>
+                                  <p:childTnLst>
+                                    <p:set>
+                                      <p:cBhvr>
+                                        <p:cTn id="42" dur="1" fill="hold">
+                                          <p:stCondLst>
+                                            <p:cond delay="0"/>
+                                          </p:stCondLst>
+                                        </p:cTn>
+                                        <p:tgtEl>
+                                          <p:spTgt spid="13"/>
+                                        </p:tgtEl>
+                                        <p:attrNameLst>
+                                          <p:attrName>style.visibility</p:attrName>
+                                        </p:attrNameLst>
+                                      </p:cBhvr>
+                                      <p:to>
+                                        <p:strVal val="visible"/>
+                                      </p:to>
+                                    </p:set>
+                                  </p:childTnLst>
+                                </p:cTn>
+                              </p:par>
+                              <p:par>
+                                <p:cTn id="43" presetID="1" presetClass="exit" presetSubtype="0" fill="hold" grpId="1" nodeType="withEffect">
+                                  <p:stCondLst>
+                                    <p:cond delay="0"/>
+                                  </p:stCondLst>
+                                  <p:childTnLst>
+                                    <p:set>
+                                      <p:cBhvr>
+                                        <p:cTn id="44" dur="1" fill="hold">
+                                          <p:stCondLst>
+                                            <p:cond delay="0"/>
+                                          </p:stCondLst>
+                                        </p:cTn>
+                                        <p:tgtEl>
+                                          <p:spTgt spid="12"/>
+                                        </p:tgtEl>
+                                        <p:attrNameLst>
+                                          <p:attrName>style.visibility</p:attrName>
+                                        </p:attrNameLst>
+                                      </p:cBhvr>
+                                      <p:to>
+                                        <p:strVal val="hidden"/>
+                                      </p:to>
+                                    </p:set>
+                                  </p:childTnLst>
+                                </p:cTn>
+                              </p:par>
+                            </p:childTnLst>
+                          </p:cTn>
+                        </p:par>
+                      </p:childTnLst>
+                    </p:cTn>
+                  </p:par>
+                  <p:par>
+                    <p:cTn id="45" fill="hold">
+                      <p:stCondLst>
+                        <p:cond delay="indefinite"/>
+                      </p:stCondLst>
+                      <p:childTnLst>
+                        <p:par>
+                          <p:cTn id="46" fill="hold">
+                            <p:stCondLst>
+                              <p:cond delay="0"/>
+                            </p:stCondLst>
+                            <p:childTnLst>
+                              <p:par>
+                                <p:cTn id="47" presetID="1" presetClass="entr" presetSubtype="0" fill="hold" grpId="2" nodeType="clickEffect">
+                                  <p:stCondLst>
+                                    <p:cond delay="0"/>
+                                  </p:stCondLst>
+                                  <p:childTnLst>
+                                    <p:set>
+                                      <p:cBhvr>
+                                        <p:cTn id="48" dur="1" fill="hold">
+                                          <p:stCondLst>
+                                            <p:cond delay="0"/>
+                                          </p:stCondLst>
+                                        </p:cTn>
+                                        <p:tgtEl>
+                                          <p:spTgt spid="7"/>
+                                        </p:tgtEl>
+                                        <p:attrNameLst>
+                                          <p:attrName>style.visibility</p:attrName>
+                                        </p:attrNameLst>
+                                      </p:cBhvr>
+                                      <p:to>
+                                        <p:strVal val="visible"/>
+                                      </p:to>
+                                    </p:set>
+                                  </p:childTnLst>
+                                </p:cTn>
+                              </p:par>
+                              <p:par>
+                                <p:cTn id="49" presetID="1" presetClass="exit" presetSubtype="0" fill="hold" grpId="1" nodeType="withEffect">
+                                  <p:stCondLst>
+                                    <p:cond delay="0"/>
+                                  </p:stCondLst>
+                                  <p:childTnLst>
+                                    <p:set>
+                                      <p:cBhvr>
+                                        <p:cTn id="50" dur="1" fill="hold">
+                                          <p:stCondLst>
+                                            <p:cond delay="0"/>
+                                          </p:stCondLst>
+                                        </p:cTn>
+                                        <p:tgtEl>
+                                          <p:spTgt spid="13"/>
+                                        </p:tgtEl>
+                                        <p:attrNameLst>
+                                          <p:attrName>style.visibility</p:attrName>
+                                        </p:attrNameLst>
+                                      </p:cBhvr>
+                                      <p:to>
+                                        <p:strVal val="hidden"/>
+                                      </p:to>
+                                    </p:set>
+                                  </p:childTnLst>
+                                </p:cTn>
+                              </p:par>
+                            </p:childTnLst>
+                          </p:cTn>
+                        </p:par>
+                      </p:childTnLst>
+                    </p:cTn>
+                  </p:par>
+                  <p:par>
+                    <p:cTn id="51" fill="hold">
+                      <p:stCondLst>
+                        <p:cond delay="indefinite"/>
+                      </p:stCondLst>
+                      <p:childTnLst>
+                        <p:par>
+                          <p:cTn id="52" fill="hold">
+                            <p:stCondLst>
+                              <p:cond delay="0"/>
+                            </p:stCondLst>
+                            <p:childTnLst>
+                              <p:par>
+                                <p:cTn id="53" presetID="1" presetClass="exit" presetSubtype="0" fill="hold" grpId="3" nodeType="clickEffect">
+                                  <p:stCondLst>
+                                    <p:cond delay="0"/>
+                                  </p:stCondLst>
+                                  <p:childTnLst>
+                                    <p:set>
+                                      <p:cBhvr>
+                                        <p:cTn id="54" dur="1" fill="hold">
+                                          <p:stCondLst>
+                                            <p:cond delay="0"/>
+                                          </p:stCondLst>
+                                        </p:cTn>
+                                        <p:tgtEl>
+                                          <p:spTgt spid="7"/>
+                                        </p:tgtEl>
+                                        <p:attrNameLst>
+                                          <p:attrName>style.visibility</p:attrName>
+                                        </p:attrNameLst>
+                                      </p:cBhvr>
+                                      <p:to>
+                                        <p:strVal val="hidden"/>
+                                      </p:to>
+                                    </p:set>
+                                  </p:childTnLst>
+                                </p:cTn>
+                              </p:par>
+                            </p:childTnLst>
+                          </p:cTn>
+                        </p:par>
+                      </p:childTnLst>
+                    </p:cTn>
+                  </p:par>
+                  <p:par>
+                    <p:cTn id="55" fill="hold">
+                      <p:stCondLst>
+                        <p:cond delay="indefinite"/>
+                      </p:stCondLst>
+                      <p:childTnLst>
+                        <p:par>
+                          <p:cTn id="56" fill="hold">
+                            <p:stCondLst>
+                              <p:cond delay="0"/>
+                            </p:stCondLst>
+                            <p:childTnLst>
+                              <p:par>
+                                <p:cTn id="57" presetID="1" presetClass="entr" presetSubtype="0" fill="hold" grpId="0" nodeType="clickEffect">
+                                  <p:stCondLst>
+                                    <p:cond delay="0"/>
+                                  </p:stCondLst>
+                                  <p:childTnLst>
+                                    <p:set>
+                                      <p:cBhvr>
+                                        <p:cTn id="58" dur="1" fill="hold">
+                                          <p:stCondLst>
+                                            <p:cond delay="0"/>
+                                          </p:stCondLst>
+                                        </p:cTn>
+                                        <p:tgtEl>
+                                          <p:spTgt spid="14"/>
+                                        </p:tgtEl>
+                                        <p:attrNameLst>
+                                          <p:attrName>style.visibility</p:attrName>
+                                        </p:attrNameLst>
+                                      </p:cBhvr>
+                                      <p:to>
+                                        <p:strVal val="visible"/>
+                                      </p:to>
+                                    </p:set>
+                                  </p:childTnLst>
+                                </p:cTn>
+                              </p:par>
+                            </p:childTnLst>
+                          </p:cTn>
+                        </p:par>
+                      </p:childTnLst>
+                    </p:cTn>
+                  </p:par>
+                  <p:par>
+                    <p:cTn id="59" fill="hold">
+                      <p:stCondLst>
+                        <p:cond delay="indefinite"/>
+                      </p:stCondLst>
+                      <p:childTnLst>
+                        <p:par>
+                          <p:cTn id="60" fill="hold">
+                            <p:stCondLst>
+                              <p:cond delay="0"/>
+                            </p:stCondLst>
+                            <p:childTnLst>
+                              <p:par>
+                                <p:cTn id="61" presetID="1" presetClass="entr" presetSubtype="0" fill="hold" grpId="0" nodeType="clickEffect">
+                                  <p:stCondLst>
+                                    <p:cond delay="0"/>
+                                  </p:stCondLst>
+                                  <p:childTnLst>
+                                    <p:set>
+                                      <p:cBhvr>
+                                        <p:cTn id="62" dur="1" fill="hold">
+                                          <p:stCondLst>
+                                            <p:cond delay="0"/>
+                                          </p:stCondLst>
+                                        </p:cTn>
+                                        <p:tgtEl>
+                                          <p:spTgt spid="15"/>
+                                        </p:tgtEl>
+                                        <p:attrNameLst>
+                                          <p:attrName>style.visibility</p:attrName>
+                                        </p:attrNameLst>
+                                      </p:cBhvr>
+                                      <p:to>
+                                        <p:strVal val="visible"/>
+                                      </p:to>
+                                    </p:set>
+                                  </p:childTnLst>
+                                </p:cTn>
+                              </p:par>
+                              <p:par>
+                                <p:cTn id="63" presetID="1" presetClass="exit" presetSubtype="0" fill="hold" grpId="1" nodeType="withEffect">
+                                  <p:stCondLst>
+                                    <p:cond delay="0"/>
+                                  </p:stCondLst>
+                                  <p:childTnLst>
+                                    <p:set>
+                                      <p:cBhvr>
+                                        <p:cTn id="64" dur="1" fill="hold">
+                                          <p:stCondLst>
+                                            <p:cond delay="0"/>
+                                          </p:stCondLst>
+                                        </p:cTn>
+                                        <p:tgtEl>
+                                          <p:spTgt spid="14"/>
+                                        </p:tgtEl>
+                                        <p:attrNameLst>
+                                          <p:attrName>style.visibility</p:attrName>
+                                        </p:attrNameLst>
+                                      </p:cBhvr>
+                                      <p:to>
+                                        <p:strVal val="hidden"/>
+                                      </p:to>
+                                    </p:set>
+                                  </p:childTnLst>
+                                </p:cTn>
+                              </p:par>
+                            </p:childTnLst>
+                          </p:cTn>
+                        </p:par>
+                      </p:childTnLst>
+                    </p:cTn>
+                  </p:par>
+                  <p:par>
+                    <p:cTn id="65" fill="hold">
+                      <p:stCondLst>
+                        <p:cond delay="indefinite"/>
+                      </p:stCondLst>
+                      <p:childTnLst>
+                        <p:par>
+                          <p:cTn id="66" fill="hold">
+                            <p:stCondLst>
+                              <p:cond delay="0"/>
+                            </p:stCondLst>
+                            <p:childTnLst>
+                              <p:par>
+                                <p:cTn id="67" presetID="1" presetClass="entr" presetSubtype="0" fill="hold" grpId="2" nodeType="clickEffect">
+                                  <p:stCondLst>
+                                    <p:cond delay="0"/>
+                                  </p:stCondLst>
+                                  <p:childTnLst>
+                                    <p:set>
+                                      <p:cBhvr>
+                                        <p:cTn id="68" dur="1" fill="hold">
+                                          <p:stCondLst>
+                                            <p:cond delay="0"/>
+                                          </p:stCondLst>
+                                        </p:cTn>
+                                        <p:tgtEl>
+                                          <p:spTgt spid="12"/>
+                                        </p:tgtEl>
+                                        <p:attrNameLst>
+                                          <p:attrName>style.visibility</p:attrName>
+                                        </p:attrNameLst>
+                                      </p:cBhvr>
+                                      <p:to>
+                                        <p:strVal val="visible"/>
+                                      </p:to>
+                                    </p:set>
+                                  </p:childTnLst>
+                                </p:cTn>
+                              </p:par>
+                              <p:par>
+                                <p:cTn id="69" presetID="1" presetClass="exit" presetSubtype="0" fill="hold" grpId="1" nodeType="withEffect">
+                                  <p:stCondLst>
+                                    <p:cond delay="0"/>
+                                  </p:stCondLst>
+                                  <p:childTnLst>
+                                    <p:set>
+                                      <p:cBhvr>
+                                        <p:cTn id="70" dur="1" fill="hold">
+                                          <p:stCondLst>
+                                            <p:cond delay="0"/>
+                                          </p:stCondLst>
+                                        </p:cTn>
+                                        <p:tgtEl>
+                                          <p:spTgt spid="15"/>
+                                        </p:tgtEl>
+                                        <p:attrNameLst>
+                                          <p:attrName>style.visibility</p:attrName>
+                                        </p:attrNameLst>
+                                      </p:cBhvr>
+                                      <p:to>
+                                        <p:strVal val="hidden"/>
+                                      </p:to>
+                                    </p:set>
+                                  </p:childTnLst>
+                                </p:cTn>
+                              </p:par>
+                            </p:childTnLst>
+                          </p:cTn>
+                        </p:par>
+                      </p:childTnLst>
+                    </p:cTn>
+                  </p:par>
+                  <p:par>
+                    <p:cTn id="71" fill="hold">
+                      <p:stCondLst>
+                        <p:cond delay="indefinite"/>
+                      </p:stCondLst>
+                      <p:childTnLst>
+                        <p:par>
+                          <p:cTn id="72" fill="hold">
+                            <p:stCondLst>
+                              <p:cond delay="0"/>
+                            </p:stCondLst>
+                            <p:childTnLst>
+                              <p:par>
+                                <p:cTn id="73" presetID="1" presetClass="entr" presetSubtype="0" fill="hold" nodeType="clickEffect">
+                                  <p:stCondLst>
+                                    <p:cond delay="0"/>
+                                  </p:stCondLst>
+                                  <p:childTnLst>
+                                    <p:set>
+                                      <p:cBhvr>
+                                        <p:cTn id="74" dur="1" fill="hold">
+                                          <p:stCondLst>
+                                            <p:cond delay="0"/>
+                                          </p:stCondLst>
+                                        </p:cTn>
+                                        <p:tgtEl>
+                                          <p:spTgt spid="4"/>
+                                        </p:tgtEl>
+                                        <p:attrNameLst>
+                                          <p:attrName>style.visibility</p:attrName>
+                                        </p:attrNameLst>
+                                      </p:cBhvr>
+                                      <p:to>
+                                        <p:strVal val="visible"/>
+                                      </p:to>
+                                    </p:set>
+                                  </p:childTnLst>
+                                </p:cTn>
+                              </p:par>
+                            </p:childTnLst>
+                          </p:cTn>
+                        </p:par>
+                      </p:childTnLst>
+                    </p:cTn>
+                  </p:par>
+                  <p:par>
+                    <p:cTn id="75" fill="hold">
+                      <p:stCondLst>
+                        <p:cond delay="indefinite"/>
+                      </p:stCondLst>
+                      <p:childTnLst>
+                        <p:par>
+                          <p:cTn id="76" fill="hold">
+                            <p:stCondLst>
+                              <p:cond delay="0"/>
+                            </p:stCondLst>
+                            <p:childTnLst>
+                              <p:par>
+                                <p:cTn id="77" presetID="1" presetClass="entr" presetSubtype="0" fill="hold" grpId="0" nodeType="clickEffect">
+                                  <p:stCondLst>
+                                    <p:cond delay="0"/>
+                                  </p:stCondLst>
+                                  <p:childTnLst>
+                                    <p:set>
+                                      <p:cBhvr>
+                                        <p:cTn id="78" dur="1" fill="hold">
+                                          <p:stCondLst>
+                                            <p:cond delay="0"/>
+                                          </p:stCondLst>
+                                        </p:cTn>
+                                        <p:tgtEl>
+                                          <p:spTgt spid="5"/>
+                                        </p:tgtEl>
+                                        <p:attrNameLst>
+                                          <p:attrName>style.visibility</p:attrName>
+                                        </p:attrNameLst>
+                                      </p:cBhvr>
+                                      <p:to>
+                                        <p:strVal val="visible"/>
+                                      </p:to>
+                                    </p:set>
+                                  </p:childTnLst>
+                                </p:cTn>
+                              </p:par>
+                            </p:childTnLst>
+                          </p:cTn>
+                        </p:par>
+                      </p:childTnLst>
+                    </p:cTn>
+                  </p:par>
+                  <p:par>
+                    <p:cTn id="79" fill="hold">
+                      <p:stCondLst>
+                        <p:cond delay="indefinite"/>
+                      </p:stCondLst>
+                      <p:childTnLst>
+                        <p:par>
+                          <p:cTn id="80" fill="hold">
+                            <p:stCondLst>
+                              <p:cond delay="0"/>
+                            </p:stCondLst>
+                            <p:childTnLst>
+                              <p:par>
+                                <p:cTn id="81" presetID="1" presetClass="entr" presetSubtype="0" fill="hold" grpId="0" nodeType="clickEffect">
+                                  <p:stCondLst>
+                                    <p:cond delay="0"/>
+                                  </p:stCondLst>
+                                  <p:childTnLst>
+                                    <p:set>
+                                      <p:cBhvr>
+                                        <p:cTn id="82" dur="1" fill="hold">
+                                          <p:stCondLst>
+                                            <p:cond delay="0"/>
+                                          </p:stCondLst>
+                                        </p:cTn>
+                                        <p:tgtEl>
+                                          <p:spTgt spid="16"/>
+                                        </p:tgtEl>
+                                        <p:attrNameLst>
+                                          <p:attrName>style.visibility</p:attrName>
+                                        </p:attrNameLst>
+                                      </p:cBhvr>
+                                      <p:to>
+                                        <p:strVal val="visible"/>
+                                      </p:to>
+                                    </p:set>
+                                  </p:childTnLst>
+                                </p:cTn>
+                              </p:par>
+                            </p:childTnLst>
+                          </p:cTn>
+                        </p:par>
+                      </p:childTnLst>
+                    </p:cTn>
+                  </p:par>
+                  <p:par>
+                    <p:cTn id="83" fill="hold">
+                      <p:stCondLst>
+                        <p:cond delay="indefinite"/>
+                      </p:stCondLst>
+                      <p:childTnLst>
+                        <p:par>
+                          <p:cTn id="84" fill="hold">
+                            <p:stCondLst>
+                              <p:cond delay="0"/>
+                            </p:stCondLst>
+                            <p:childTnLst>
+                              <p:par>
+                                <p:cTn id="85" presetID="1" presetClass="entr" presetSubtype="0" fill="hold" grpId="0" nodeType="clickEffect">
+                                  <p:stCondLst>
+                                    <p:cond delay="0"/>
+                                  </p:stCondLst>
+                                  <p:childTnLst>
+                                    <p:set>
+                                      <p:cBhvr>
+                                        <p:cTn id="86" dur="1" fill="hold">
+                                          <p:stCondLst>
+                                            <p:cond delay="0"/>
+                                          </p:stCondLst>
+                                        </p:cTn>
+                                        <p:tgtEl>
+                                          <p:spTgt spid="17"/>
+                                        </p:tgtEl>
+                                        <p:attrNameLst>
+                                          <p:attrName>style.visibility</p:attrName>
+                                        </p:attrNameLst>
+                                      </p:cBhvr>
+                                      <p:to>
+                                        <p:strVal val="visible"/>
+                                      </p:to>
+                                    </p:set>
+                                  </p:childTnLst>
+                                </p:cTn>
+                              </p:par>
+                            </p:childTnLst>
+                          </p:cTn>
+                        </p:par>
+                      </p:childTnLst>
+                    </p:cTn>
+                  </p:par>
+                </p:childTnLst>
+              </p:cTn>
+              <p:prevCondLst>
+                <p:cond evt="onPrev" delay="0">
+                  <p:tgtEl>
+                    <p:sldTgt/>
+                  </p:tgtEl>
+                </p:cond>
+              </p:prevCondLst>
+              <p:nextCondLst>
+                <p:cond evt="onNext" delay="0">
+                  <p:tgtEl>
+                    <p:sldTgt/>
+                  </p:tgtEl>
+                </p:cond>
+              </p:nextCondLst>
+            </p:seq>
+          </p:childTnLst>
+        </p:cTn>
       </p:par>
     </p:tnLst>
+    <p:bldLst>
+      <p:bldP spid="2" grpId="0" animBg="1"/>
+      <p:bldP spid="2" grpId="1" animBg="1"/>
+      <p:bldP spid="6" grpId="0" animBg="1"/>
+      <p:bldP spid="6" grpId="1" animBg="1"/>
+      <p:bldP spid="7" grpId="0" animBg="1"/>
+      <p:bldP spid="7" grpId="1" animBg="1"/>
+      <p:bldP spid="7" grpId="2" animBg="1"/>
+      <p:bldP spid="7" grpId="3" animBg="1"/>
+      <p:bldP spid="10" grpId="0" animBg="1"/>
+      <p:bldP spid="10" grpId="1" animBg="1"/>
+      <p:bldP spid="12" grpId="0" animBg="1"/>
+      <p:bldP spid="12" grpId="1" animBg="1"/>
+      <p:bldP spid="12" grpId="2" animBg="1"/>
+      <p:bldP spid="13" grpId="0" animBg="1"/>
+      <p:bldP spid="13" grpId="1" animBg="1"/>
+      <p:bldP spid="14" grpId="0" animBg="1"/>
+      <p:bldP spid="14" grpId="1" animBg="1"/>
+      <p:bldP spid="15" grpId="0" animBg="1"/>
+      <p:bldP spid="15" grpId="1" animBg="1"/>
+      <p:bldP spid="5" grpId="0" animBg="1"/>
+      <p:bldP spid="16" grpId="0" animBg="1"/>
+      <p:bldP spid="17" grpId="0" animBg="1"/>
+    </p:bldLst>
   </p:timing>
 </p:sld>
 </file>
@@ -13436,7 +15193,7 @@
   <p:timing>
     <p:tnLst>
       <p:par>
-        <p:cTn xmlns:p14="http://schemas.microsoft.com/office/powerpoint/2010/main" id="1" dur="indefinite" restart="never" nodeType="tmRoot"/>
+        <p:cTn id="1" dur="indefinite" restart="never" nodeType="tmRoot"/>
       </p:par>
     </p:tnLst>
   </p:timing>
@@ -14940,7 +16697,7 @@
   <p:timing>
     <p:tnLst>
       <p:par>
-        <p:cTn xmlns:p14="http://schemas.microsoft.com/office/powerpoint/2010/main" id="1" dur="indefinite" restart="never" nodeType="tmRoot"/>
+        <p:cTn id="1" dur="indefinite" restart="never" nodeType="tmRoot"/>
       </p:par>
     </p:tnLst>
   </p:timing>
@@ -15077,7 +16834,7 @@
   <p:timing>
     <p:tnLst>
       <p:par>
-        <p:cTn xmlns:p14="http://schemas.microsoft.com/office/powerpoint/2010/main" id="1" dur="indefinite" restart="never" nodeType="tmRoot"/>
+        <p:cTn id="1" dur="indefinite" restart="never" nodeType="tmRoot"/>
       </p:par>
     </p:tnLst>
   </p:timing>

</xml_diff>

<commit_message>
Commiting 8/19 last minute changes, Chris to edit hardware slide and send to John
</commit_message>
<xml_diff>
--- a/Presentation.pptx
+++ b/Presentation.pptx
@@ -5,7 +5,7 @@
     <p:sldMasterId id="2147483660" r:id="rId1"/>
   </p:sldMasterIdLst>
   <p:notesMasterIdLst>
-    <p:notesMasterId r:id="rId12"/>
+    <p:notesMasterId r:id="rId13"/>
   </p:notesMasterIdLst>
   <p:sldIdLst>
     <p:sldId id="256" r:id="rId2"/>
@@ -17,7 +17,8 @@
     <p:sldId id="259" r:id="rId8"/>
     <p:sldId id="260" r:id="rId9"/>
     <p:sldId id="263" r:id="rId10"/>
-    <p:sldId id="261" r:id="rId11"/>
+    <p:sldId id="267" r:id="rId11"/>
+    <p:sldId id="261" r:id="rId12"/>
   </p:sldIdLst>
   <p:sldSz cx="9144000" cy="6858000" type="screen4x3"/>
   <p:notesSz cx="6858000" cy="9144000"/>
@@ -1147,7 +1148,7 @@
           <a:p>
             <a:r>
               <a:rPr lang="en-US" dirty="0" smtClean="0"/>
-              <a:t>Everyone</a:t>
+              <a:t>Gunnar</a:t>
             </a:r>
             <a:endParaRPr lang="en-US" dirty="0"/>
           </a:p>
@@ -1171,6 +1172,94 @@
             <a:fld id="{05332D8B-7B6C-A54D-BAC6-226B3ACA1459}" type="slidenum">
               <a:rPr lang="en-US" smtClean="0"/>
               <a:t>10</a:t>
+            </a:fld>
+            <a:endParaRPr lang="en-US"/>
+          </a:p>
+        </p:txBody>
+      </p:sp>
+    </p:spTree>
+    <p:extLst>
+      <p:ext uri="{BB962C8B-B14F-4D97-AF65-F5344CB8AC3E}">
+        <p14:creationId xmlns:p14="http://schemas.microsoft.com/office/powerpoint/2010/main" val="3647391457"/>
+      </p:ext>
+    </p:extLst>
+  </p:cSld>
+  <p:clrMapOvr>
+    <a:masterClrMapping/>
+  </p:clrMapOvr>
+</p:notes>
+</file>
+
+<file path=ppt/notesSlides/notesSlide9.xml><?xml version="1.0" encoding="utf-8"?>
+<p:notes xmlns:a="http://schemas.openxmlformats.org/drawingml/2006/main" xmlns:r="http://schemas.openxmlformats.org/officeDocument/2006/relationships" xmlns:p="http://schemas.openxmlformats.org/presentationml/2006/main">
+  <p:cSld>
+    <p:spTree>
+      <p:nvGrpSpPr>
+        <p:cNvPr id="1" name=""/>
+        <p:cNvGrpSpPr/>
+        <p:nvPr/>
+      </p:nvGrpSpPr>
+      <p:grpSpPr>
+        <a:xfrm>
+          <a:off x="0" y="0"/>
+          <a:ext cx="0" cy="0"/>
+          <a:chOff x="0" y="0"/>
+          <a:chExt cx="0" cy="0"/>
+        </a:xfrm>
+      </p:grpSpPr>
+      <p:sp>
+        <p:nvSpPr>
+          <p:cNvPr id="2" name="Slide Image Placeholder 1"/>
+          <p:cNvSpPr>
+            <a:spLocks noGrp="1" noRot="1" noChangeAspect="1"/>
+          </p:cNvSpPr>
+          <p:nvPr>
+            <p:ph type="sldImg"/>
+          </p:nvPr>
+        </p:nvSpPr>
+        <p:spPr/>
+      </p:sp>
+      <p:sp>
+        <p:nvSpPr>
+          <p:cNvPr id="3" name="Notes Placeholder 2"/>
+          <p:cNvSpPr>
+            <a:spLocks noGrp="1"/>
+          </p:cNvSpPr>
+          <p:nvPr>
+            <p:ph type="body" idx="1"/>
+          </p:nvPr>
+        </p:nvSpPr>
+        <p:spPr/>
+        <p:txBody>
+          <a:bodyPr/>
+          <a:lstStyle/>
+          <a:p>
+            <a:r>
+              <a:rPr lang="en-US" dirty="0" smtClean="0"/>
+              <a:t>Everyone</a:t>
+            </a:r>
+            <a:endParaRPr lang="en-US" dirty="0"/>
+          </a:p>
+        </p:txBody>
+      </p:sp>
+      <p:sp>
+        <p:nvSpPr>
+          <p:cNvPr id="4" name="Slide Number Placeholder 3"/>
+          <p:cNvSpPr>
+            <a:spLocks noGrp="1"/>
+          </p:cNvSpPr>
+          <p:nvPr>
+            <p:ph type="sldNum" sz="quarter" idx="10"/>
+          </p:nvPr>
+        </p:nvSpPr>
+        <p:spPr/>
+        <p:txBody>
+          <a:bodyPr/>
+          <a:lstStyle/>
+          <a:p>
+            <a:fld id="{05332D8B-7B6C-A54D-BAC6-226B3ACA1459}" type="slidenum">
+              <a:rPr lang="en-US" smtClean="0"/>
+              <a:t>11</a:t>
             </a:fld>
             <a:endParaRPr lang="en-US"/>
           </a:p>
@@ -6203,6 +6292,146 @@
             <p:ph type="title"/>
           </p:nvPr>
         </p:nvSpPr>
+        <p:spPr>
+          <a:xfrm>
+            <a:off x="547777" y="121023"/>
+            <a:ext cx="7770813" cy="1429871"/>
+          </a:xfrm>
+        </p:spPr>
+        <p:txBody>
+          <a:bodyPr/>
+          <a:lstStyle/>
+          <a:p>
+            <a:r>
+              <a:rPr lang="en-US" dirty="0" smtClean="0"/>
+              <a:t>Conclusion</a:t>
+            </a:r>
+            <a:endParaRPr lang="en-US" dirty="0"/>
+          </a:p>
+        </p:txBody>
+      </p:sp>
+      <p:sp>
+        <p:nvSpPr>
+          <p:cNvPr id="3" name="Content Placeholder 2"/>
+          <p:cNvSpPr>
+            <a:spLocks noGrp="1"/>
+          </p:cNvSpPr>
+          <p:nvPr>
+            <p:ph idx="1"/>
+          </p:nvPr>
+        </p:nvSpPr>
+        <p:spPr/>
+        <p:txBody>
+          <a:bodyPr>
+            <a:normAutofit fontScale="92500"/>
+          </a:bodyPr>
+          <a:lstStyle/>
+          <a:p>
+            <a:r>
+              <a:rPr lang="en-US" dirty="0" smtClean="0">
+                <a:effectLst/>
+              </a:rPr>
+              <a:t>Nosferatu is cheaper than the competition</a:t>
+            </a:r>
+          </a:p>
+          <a:p>
+            <a:r>
+              <a:rPr lang="en-US" dirty="0" smtClean="0">
+                <a:effectLst/>
+              </a:rPr>
+              <a:t>Nosferatu is easier to use</a:t>
+            </a:r>
+          </a:p>
+          <a:p>
+            <a:r>
+              <a:rPr lang="en-US" dirty="0" smtClean="0">
+                <a:effectLst/>
+              </a:rPr>
+              <a:t>Nosferatu is the most convenient way to manage your home lighting</a:t>
+            </a:r>
+          </a:p>
+          <a:p>
+            <a:r>
+              <a:rPr lang="en-US" dirty="0" smtClean="0">
+                <a:effectLst/>
+              </a:rPr>
+              <a:t>“I haven’t touched a light switch in weeks, 10/10” – Dan Cardin</a:t>
+            </a:r>
+          </a:p>
+          <a:p>
+            <a:r>
+              <a:rPr lang="en-US" dirty="0" smtClean="0">
+                <a:effectLst/>
+              </a:rPr>
+              <a:t>“Package still hasn’t arrived 1/5” – Amazon Reviewer </a:t>
+            </a:r>
+            <a:r>
+              <a:rPr lang="en-US" dirty="0" err="1" smtClean="0">
+                <a:effectLst/>
+              </a:rPr>
+              <a:t>squidw@rd</a:t>
+            </a:r>
+            <a:endParaRPr lang="en-US" dirty="0" smtClean="0">
+              <a:effectLst/>
+            </a:endParaRPr>
+          </a:p>
+          <a:p>
+            <a:r>
+              <a:rPr lang="en-US" dirty="0" smtClean="0">
+                <a:effectLst/>
+              </a:rPr>
+              <a:t>“Switch works great!  9/10, 10/10 with rice” –/u/DO_U_EVN_SPAGHETTI</a:t>
+            </a:r>
+          </a:p>
+        </p:txBody>
+      </p:sp>
+    </p:spTree>
+    <p:extLst>
+      <p:ext uri="{BB962C8B-B14F-4D97-AF65-F5344CB8AC3E}">
+        <p14:creationId xmlns:p14="http://schemas.microsoft.com/office/powerpoint/2010/main" val="1206270657"/>
+      </p:ext>
+    </p:extLst>
+  </p:cSld>
+  <p:clrMapOvr>
+    <a:masterClrMapping/>
+  </p:clrMapOvr>
+  <p:timing>
+    <p:tnLst>
+      <p:par>
+        <p:cTn id="1" dur="indefinite" restart="never" nodeType="tmRoot"/>
+      </p:par>
+    </p:tnLst>
+  </p:timing>
+</p:sld>
+</file>
+
+<file path=ppt/slides/slide11.xml><?xml version="1.0" encoding="utf-8"?>
+<p:sld xmlns:a="http://schemas.openxmlformats.org/drawingml/2006/main" xmlns:r="http://schemas.openxmlformats.org/officeDocument/2006/relationships" xmlns:p="http://schemas.openxmlformats.org/presentationml/2006/main">
+  <p:cSld>
+    <p:spTree>
+      <p:nvGrpSpPr>
+        <p:cNvPr id="1" name=""/>
+        <p:cNvGrpSpPr/>
+        <p:nvPr/>
+      </p:nvGrpSpPr>
+      <p:grpSpPr>
+        <a:xfrm>
+          <a:off x="0" y="0"/>
+          <a:ext cx="0" cy="0"/>
+          <a:chOff x="0" y="0"/>
+          <a:chExt cx="0" cy="0"/>
+        </a:xfrm>
+      </p:grpSpPr>
+      <p:sp>
+        <p:nvSpPr>
+          <p:cNvPr id="2" name="Title 1"/>
+          <p:cNvSpPr>
+            <a:spLocks noGrp="1"/>
+          </p:cNvSpPr>
+          <p:nvPr>
+            <p:ph type="title"/>
+          </p:nvPr>
+        </p:nvSpPr>
         <p:spPr/>
         <p:txBody>
           <a:bodyPr/>
@@ -6255,7 +6484,7 @@
       </p:grpSpPr>
       <p:pic>
         <p:nvPicPr>
-          <p:cNvPr id="4" name="Picture 3" descr="lutron-Lndry-P_Occ_Sensor_Manual_Switch.jpg"/>
+          <p:cNvPr id="6" name="Picture 5" descr="tumblr_lfo0gz7n2T1qc9h2yo1_500.png"/>
           <p:cNvPicPr>
             <a:picLocks noChangeAspect="1"/>
           </p:cNvPicPr>
@@ -6275,8 +6504,8 @@
         </p:blipFill>
         <p:spPr>
           <a:xfrm>
-            <a:off x="129588" y="3646889"/>
-            <a:ext cx="2823655" cy="2106446"/>
+            <a:off x="6314137" y="3408896"/>
+            <a:ext cx="2829863" cy="2829863"/>
           </a:xfrm>
           <a:prstGeom prst="rect">
             <a:avLst/>
@@ -6285,7 +6514,7 @@
       </p:pic>
       <p:pic>
         <p:nvPicPr>
-          <p:cNvPr id="6" name="Picture 5" descr="tumblr_lfo0gz7n2T1qc9h2yo1_500.png"/>
+          <p:cNvPr id="5" name="Picture 4" descr="giphy.gif"/>
           <p:cNvPicPr>
             <a:picLocks noChangeAspect="1"/>
           </p:cNvPicPr>
@@ -6305,37 +6534,7 @@
         </p:blipFill>
         <p:spPr>
           <a:xfrm>
-            <a:off x="5943192" y="3301266"/>
-            <a:ext cx="2829863" cy="2829863"/>
-          </a:xfrm>
-          <a:prstGeom prst="rect">
-            <a:avLst/>
-          </a:prstGeom>
-        </p:spPr>
-      </p:pic>
-      <p:pic>
-        <p:nvPicPr>
-          <p:cNvPr id="5" name="Picture 4" descr="giphy.gif"/>
-          <p:cNvPicPr>
-            <a:picLocks noChangeAspect="1"/>
-          </p:cNvPicPr>
-          <p:nvPr/>
-        </p:nvPicPr>
-        <p:blipFill>
-          <a:blip r:embed="rId5" cstate="email">
-            <a:extLst>
-              <a:ext uri="{28A0092B-C50C-407E-A947-70E740481C1C}">
-                <a14:useLocalDpi xmlns:a14="http://schemas.microsoft.com/office/drawing/2010/main" val="0"/>
-              </a:ext>
-            </a:extLst>
-          </a:blip>
-          <a:stretch>
-            <a:fillRect/>
-          </a:stretch>
-        </p:blipFill>
-        <p:spPr>
-          <a:xfrm>
-            <a:off x="2112272" y="3301266"/>
+            <a:off x="2281062" y="3307976"/>
             <a:ext cx="4051220" cy="3038415"/>
           </a:xfrm>
           <a:prstGeom prst="rect">
@@ -6395,7 +6594,7 @@
           <a:p>
             <a:r>
               <a:rPr lang="en-US" dirty="0" smtClean="0"/>
-              <a:t>Pesky light switches that are impossible to find in the dark</a:t>
+              <a:t>Forgetting to turn your lights off when you leave your house</a:t>
             </a:r>
           </a:p>
           <a:p>
@@ -6407,12 +6606,49 @@
           <a:p>
             <a:r>
               <a:rPr lang="en-US" dirty="0" smtClean="0"/>
-              <a:t>Bumping into furniture on your way to the bathroom late at night</a:t>
+              <a:t>Bumping </a:t>
             </a:r>
-            <a:endParaRPr lang="en-US" dirty="0"/>
+            <a:r>
+              <a:rPr lang="en-US" dirty="0" smtClean="0"/>
+              <a:t>into furniture on your way to the bathroom late at </a:t>
+            </a:r>
+            <a:r>
+              <a:rPr lang="en-US" dirty="0" smtClean="0"/>
+              <a:t>night</a:t>
+            </a:r>
           </a:p>
         </p:txBody>
       </p:sp>
+      <p:pic>
+        <p:nvPicPr>
+          <p:cNvPr id="7" name="Picture 6"/>
+          <p:cNvPicPr>
+            <a:picLocks noChangeAspect="1"/>
+          </p:cNvPicPr>
+          <p:nvPr/>
+        </p:nvPicPr>
+        <p:blipFill>
+          <a:blip r:embed="rId5" cstate="email">
+            <a:extLst>
+              <a:ext uri="{28A0092B-C50C-407E-A947-70E740481C1C}">
+                <a14:useLocalDpi xmlns:a14="http://schemas.microsoft.com/office/drawing/2010/main" val="0"/>
+              </a:ext>
+            </a:extLst>
+          </a:blip>
+          <a:stretch>
+            <a:fillRect/>
+          </a:stretch>
+        </p:blipFill>
+        <p:spPr>
+          <a:xfrm>
+            <a:off x="0" y="3301266"/>
+            <a:ext cx="2281062" cy="3045125"/>
+          </a:xfrm>
+          <a:prstGeom prst="rect">
+            <a:avLst/>
+          </a:prstGeom>
+        </p:spPr>
+      </p:pic>
     </p:spTree>
     <p:extLst>
       <p:ext uri="{BB962C8B-B14F-4D97-AF65-F5344CB8AC3E}">
@@ -6457,7 +6693,7 @@
                                           </p:stCondLst>
                                         </p:cTn>
                                         <p:tgtEl>
-                                          <p:spTgt spid="4"/>
+                                          <p:spTgt spid="7"/>
                                         </p:tgtEl>
                                         <p:attrNameLst>
                                           <p:attrName>style.visibility</p:attrName>
@@ -6962,7 +7198,9 @@
         </p:nvSpPr>
         <p:spPr/>
         <p:txBody>
-          <a:bodyPr/>
+          <a:bodyPr>
+            <a:normAutofit fontScale="92500" lnSpcReduction="10000"/>
+          </a:bodyPr>
           <a:lstStyle/>
           <a:p>
             <a:r>
@@ -7018,8 +7256,14 @@
               <a:t> </a:t>
             </a:r>
             <a:r>
-              <a:rPr lang="en-US" dirty="0" err="1" smtClean="0"/>
+              <a:rPr lang="en-US" dirty="0" smtClean="0"/>
               <a:t>Larkins</a:t>
+            </a:r>
+          </a:p>
+          <a:p>
+            <a:r>
+              <a:rPr lang="en-US" dirty="0" smtClean="0"/>
+              <a:t>Save on your electric bill by having your lights turn off after time intervals or certain times of day</a:t>
             </a:r>
             <a:endParaRPr lang="en-US" dirty="0"/>
           </a:p>
@@ -7035,6 +7279,13 @@
   <p:clrMapOvr>
     <a:masterClrMapping/>
   </p:clrMapOvr>
+  <p:timing>
+    <p:tnLst>
+      <p:par>
+        <p:cTn id="1" dur="indefinite" restart="never" nodeType="tmRoot"/>
+      </p:par>
+    </p:tnLst>
+  </p:timing>
 </p:sld>
 </file>
 
@@ -7888,11 +8139,11 @@
   <p:clrMapOvr>
     <a:masterClrMapping/>
   </p:clrMapOvr>
-  <mc:AlternateContent xmlns:mc="http://schemas.openxmlformats.org/markup-compatibility/2006">
-    <mc:Choice xmlns:p14="http://schemas.microsoft.com/office/powerpoint/2010/main" Requires="p14">
+  <mc:AlternateContent xmlns:mc="http://schemas.openxmlformats.org/markup-compatibility/2006" xmlns:p14="http://schemas.microsoft.com/office/powerpoint/2010/main">
+    <mc:Choice Requires="p14">
       <p:transition p14:dur="0"/>
     </mc:Choice>
-    <mc:Fallback>
+    <mc:Fallback xmlns="">
       <p:transition/>
     </mc:Fallback>
   </mc:AlternateContent>
@@ -16733,12 +16984,14 @@
         </p:nvSpPr>
         <p:spPr/>
         <p:txBody>
-          <a:bodyPr/>
+          <a:bodyPr>
+            <a:normAutofit fontScale="90000"/>
+          </a:bodyPr>
           <a:lstStyle/>
           <a:p>
             <a:r>
               <a:rPr lang="en-US" dirty="0" smtClean="0"/>
-              <a:t>How ours is different</a:t>
+              <a:t>What makes Nosferatu special</a:t>
             </a:r>
             <a:endParaRPr lang="en-US" dirty="0"/>
           </a:p>
@@ -16761,10 +17014,10 @@
           <a:p>
             <a:r>
               <a:rPr lang="en-US" dirty="0" smtClean="0"/>
-              <a:t>From Wi-Fi </a:t>
+              <a:t>Compared to Wi-Fi </a:t>
             </a:r>
             <a:r>
-              <a:rPr lang="en-US" dirty="0" err="1" smtClean="0"/>
+              <a:rPr lang="en-US" dirty="0" smtClean="0"/>
               <a:t>lightbulbs</a:t>
             </a:r>
             <a:endParaRPr lang="en-US" dirty="0"/>
@@ -16773,15 +17026,7 @@
             <a:pPr lvl="1"/>
             <a:r>
               <a:rPr lang="en-US" dirty="0" smtClean="0"/>
-              <a:t>Don’t need to replace an expensive </a:t>
-            </a:r>
-            <a:r>
-              <a:rPr lang="en-US" dirty="0" err="1" smtClean="0"/>
-              <a:t>lightbulb</a:t>
-            </a:r>
-            <a:r>
-              <a:rPr lang="en-US" dirty="0" smtClean="0"/>
-              <a:t> whenever it dies</a:t>
+              <a:t>Don’t need to replace an expensive lightbulb whenever it dies</a:t>
             </a:r>
           </a:p>
           <a:p>
@@ -16794,11 +17039,15 @@
           <a:p>
             <a:r>
               <a:rPr lang="en-US" dirty="0" smtClean="0"/>
-              <a:t>From similar switches (</a:t>
+              <a:t>Compared to similar switches (such as </a:t>
             </a:r>
             <a:r>
-              <a:rPr lang="en-US" dirty="0" err="1" smtClean="0"/>
-              <a:t>Wemo</a:t>
+              <a:rPr lang="en-US" dirty="0" smtClean="0"/>
+              <a:t>the Belkin </a:t>
+            </a:r>
+            <a:r>
+              <a:rPr lang="en-US" dirty="0" smtClean="0"/>
+              <a:t>WeMo</a:t>
             </a:r>
             <a:r>
               <a:rPr lang="en-US" dirty="0" smtClean="0"/>
@@ -16817,6 +17066,19 @@
             <a:r>
               <a:rPr lang="en-US" dirty="0" smtClean="0"/>
               <a:t>Rules</a:t>
+            </a:r>
+          </a:p>
+          <a:p>
+            <a:pPr lvl="1"/>
+            <a:r>
+              <a:rPr lang="en-US" dirty="0" smtClean="0"/>
+              <a:t>Web API</a:t>
+            </a:r>
+          </a:p>
+          <a:p>
+            <a:r>
+              <a:rPr lang="en-US" dirty="0" smtClean="0"/>
+              <a:t>Cheaper</a:t>
             </a:r>
           </a:p>
         </p:txBody>

</xml_diff>

<commit_message>
Chris' changes on hardware slide
</commit_message>
<xml_diff>
--- a/Presentation.pptx
+++ b/Presentation.pptx
@@ -6606,15 +6606,7 @@
           <a:p>
             <a:r>
               <a:rPr lang="en-US" dirty="0" smtClean="0"/>
-              <a:t>Bumping </a:t>
-            </a:r>
-            <a:r>
-              <a:rPr lang="en-US" dirty="0" smtClean="0"/>
-              <a:t>into furniture on your way to the bathroom late at </a:t>
-            </a:r>
-            <a:r>
-              <a:rPr lang="en-US" dirty="0" smtClean="0"/>
-              <a:t>night</a:t>
+              <a:t>Bumping into furniture on your way to the bathroom late at night</a:t>
             </a:r>
           </a:p>
         </p:txBody>
@@ -7253,11 +7245,7 @@
             </a:r>
             <a:r>
               <a:rPr lang="en-US" dirty="0" smtClean="0"/>
-              <a:t> </a:t>
-            </a:r>
-            <a:r>
-              <a:rPr lang="en-US" dirty="0" smtClean="0"/>
-              <a:t>Larkins</a:t>
+              <a:t> Larkins</a:t>
             </a:r>
           </a:p>
           <a:p>
@@ -7353,6 +7341,194 @@
           </a:prstGeom>
         </p:spPr>
       </p:pic>
+      <p:sp>
+        <p:nvSpPr>
+          <p:cNvPr id="3" name="Rectangle 2"/>
+          <p:cNvSpPr/>
+          <p:nvPr/>
+        </p:nvSpPr>
+        <p:spPr>
+          <a:xfrm>
+            <a:off x="0" y="1308754"/>
+            <a:ext cx="6305909" cy="1727744"/>
+          </a:xfrm>
+          <a:prstGeom prst="rect">
+            <a:avLst/>
+          </a:prstGeom>
+          <a:solidFill>
+            <a:schemeClr val="tx1"/>
+          </a:solidFill>
+          <a:ln>
+            <a:solidFill>
+              <a:schemeClr val="tx1"/>
+            </a:solidFill>
+          </a:ln>
+          <a:effectLst/>
+        </p:spPr>
+        <p:style>
+          <a:lnRef idx="1">
+            <a:schemeClr val="accent1"/>
+          </a:lnRef>
+          <a:fillRef idx="3">
+            <a:schemeClr val="accent1"/>
+          </a:fillRef>
+          <a:effectRef idx="2">
+            <a:schemeClr val="accent1"/>
+          </a:effectRef>
+          <a:fontRef idx="minor">
+            <a:schemeClr val="lt1"/>
+          </a:fontRef>
+        </p:style>
+        <p:txBody>
+          <a:bodyPr rtlCol="0" anchor="ctr"/>
+          <a:lstStyle/>
+          <a:p>
+            <a:pPr algn="ctr"/>
+            <a:endParaRPr lang="en-US"/>
+          </a:p>
+        </p:txBody>
+      </p:sp>
+      <p:sp>
+        <p:nvSpPr>
+          <p:cNvPr id="5" name="Rectangle 4"/>
+          <p:cNvSpPr/>
+          <p:nvPr/>
+        </p:nvSpPr>
+        <p:spPr>
+          <a:xfrm>
+            <a:off x="-1" y="3036497"/>
+            <a:ext cx="6305909" cy="3821503"/>
+          </a:xfrm>
+          <a:prstGeom prst="rect">
+            <a:avLst/>
+          </a:prstGeom>
+          <a:solidFill>
+            <a:schemeClr val="tx1"/>
+          </a:solidFill>
+          <a:ln>
+            <a:solidFill>
+              <a:schemeClr val="tx1"/>
+            </a:solidFill>
+          </a:ln>
+          <a:effectLst/>
+        </p:spPr>
+        <p:style>
+          <a:lnRef idx="1">
+            <a:schemeClr val="accent1"/>
+          </a:lnRef>
+          <a:fillRef idx="3">
+            <a:schemeClr val="accent1"/>
+          </a:fillRef>
+          <a:effectRef idx="2">
+            <a:schemeClr val="accent1"/>
+          </a:effectRef>
+          <a:fontRef idx="minor">
+            <a:schemeClr val="lt1"/>
+          </a:fontRef>
+        </p:style>
+        <p:txBody>
+          <a:bodyPr rtlCol="0" anchor="ctr"/>
+          <a:lstStyle/>
+          <a:p>
+            <a:pPr algn="ctr"/>
+            <a:endParaRPr lang="en-US"/>
+          </a:p>
+        </p:txBody>
+      </p:sp>
+      <p:sp>
+        <p:nvSpPr>
+          <p:cNvPr id="7" name="Rectangle 6"/>
+          <p:cNvSpPr/>
+          <p:nvPr/>
+        </p:nvSpPr>
+        <p:spPr>
+          <a:xfrm>
+            <a:off x="6305909" y="1308754"/>
+            <a:ext cx="2838091" cy="2245329"/>
+          </a:xfrm>
+          <a:prstGeom prst="rect">
+            <a:avLst/>
+          </a:prstGeom>
+          <a:solidFill>
+            <a:schemeClr val="tx1"/>
+          </a:solidFill>
+          <a:ln>
+            <a:solidFill>
+              <a:schemeClr val="tx1"/>
+            </a:solidFill>
+          </a:ln>
+          <a:effectLst/>
+        </p:spPr>
+        <p:style>
+          <a:lnRef idx="1">
+            <a:schemeClr val="accent1"/>
+          </a:lnRef>
+          <a:fillRef idx="3">
+            <a:schemeClr val="accent1"/>
+          </a:fillRef>
+          <a:effectRef idx="2">
+            <a:schemeClr val="accent1"/>
+          </a:effectRef>
+          <a:fontRef idx="minor">
+            <a:schemeClr val="lt1"/>
+          </a:fontRef>
+        </p:style>
+        <p:txBody>
+          <a:bodyPr rtlCol="0" anchor="ctr"/>
+          <a:lstStyle/>
+          <a:p>
+            <a:pPr algn="ctr"/>
+            <a:endParaRPr lang="en-US"/>
+          </a:p>
+        </p:txBody>
+      </p:sp>
+      <p:sp>
+        <p:nvSpPr>
+          <p:cNvPr id="8" name="Rectangle 7"/>
+          <p:cNvSpPr/>
+          <p:nvPr/>
+        </p:nvSpPr>
+        <p:spPr>
+          <a:xfrm>
+            <a:off x="6305909" y="3554083"/>
+            <a:ext cx="2838091" cy="3303917"/>
+          </a:xfrm>
+          <a:prstGeom prst="rect">
+            <a:avLst/>
+          </a:prstGeom>
+          <a:solidFill>
+            <a:schemeClr val="tx1"/>
+          </a:solidFill>
+          <a:ln>
+            <a:solidFill>
+              <a:schemeClr val="tx1"/>
+            </a:solidFill>
+          </a:ln>
+          <a:effectLst/>
+        </p:spPr>
+        <p:style>
+          <a:lnRef idx="1">
+            <a:schemeClr val="accent1"/>
+          </a:lnRef>
+          <a:fillRef idx="3">
+            <a:schemeClr val="accent1"/>
+          </a:fillRef>
+          <a:effectRef idx="2">
+            <a:schemeClr val="accent1"/>
+          </a:effectRef>
+          <a:fontRef idx="minor">
+            <a:schemeClr val="lt1"/>
+          </a:fontRef>
+        </p:style>
+        <p:txBody>
+          <a:bodyPr rtlCol="0" anchor="ctr"/>
+          <a:lstStyle/>
+          <a:p>
+            <a:pPr algn="ctr"/>
+            <a:endParaRPr lang="en-US"/>
+          </a:p>
+        </p:txBody>
+      </p:sp>
     </p:spTree>
     <p:extLst>
       <p:ext uri="{BB962C8B-B14F-4D97-AF65-F5344CB8AC3E}">
@@ -7366,9 +7542,250 @@
   <p:timing>
     <p:tnLst>
       <p:par>
-        <p:cTn id="1" dur="indefinite" restart="never" nodeType="tmRoot"/>
+        <p:cTn id="1" dur="indefinite" restart="never" nodeType="tmRoot">
+          <p:childTnLst>
+            <p:seq concurrent="1" nextAc="seek">
+              <p:cTn id="2" dur="indefinite" nodeType="mainSeq">
+                <p:childTnLst>
+                  <p:par>
+                    <p:cTn id="3" fill="hold">
+                      <p:stCondLst>
+                        <p:cond delay="indefinite"/>
+                      </p:stCondLst>
+                      <p:childTnLst>
+                        <p:par>
+                          <p:cTn id="4" fill="hold">
+                            <p:stCondLst>
+                              <p:cond delay="0"/>
+                            </p:stCondLst>
+                            <p:childTnLst>
+                              <p:par>
+                                <p:cTn id="5" presetID="10" presetClass="exit" presetSubtype="0" fill="hold" grpId="0" nodeType="clickEffect">
+                                  <p:stCondLst>
+                                    <p:cond delay="0"/>
+                                  </p:stCondLst>
+                                  <p:childTnLst>
+                                    <p:animEffect transition="out" filter="fade">
+                                      <p:cBhvr>
+                                        <p:cTn id="6" dur="500"/>
+                                        <p:tgtEl>
+                                          <p:spTgt spid="7"/>
+                                        </p:tgtEl>
+                                      </p:cBhvr>
+                                    </p:animEffect>
+                                    <p:set>
+                                      <p:cBhvr>
+                                        <p:cTn id="7" dur="1" fill="hold">
+                                          <p:stCondLst>
+                                            <p:cond delay="499"/>
+                                          </p:stCondLst>
+                                        </p:cTn>
+                                        <p:tgtEl>
+                                          <p:spTgt spid="7"/>
+                                        </p:tgtEl>
+                                        <p:attrNameLst>
+                                          <p:attrName>style.visibility</p:attrName>
+                                        </p:attrNameLst>
+                                      </p:cBhvr>
+                                      <p:to>
+                                        <p:strVal val="hidden"/>
+                                      </p:to>
+                                    </p:set>
+                                  </p:childTnLst>
+                                </p:cTn>
+                              </p:par>
+                            </p:childTnLst>
+                          </p:cTn>
+                        </p:par>
+                      </p:childTnLst>
+                    </p:cTn>
+                  </p:par>
+                  <p:par>
+                    <p:cTn id="8" fill="hold">
+                      <p:stCondLst>
+                        <p:cond delay="indefinite"/>
+                      </p:stCondLst>
+                      <p:childTnLst>
+                        <p:par>
+                          <p:cTn id="9" fill="hold">
+                            <p:stCondLst>
+                              <p:cond delay="0"/>
+                            </p:stCondLst>
+                            <p:childTnLst>
+                              <p:par>
+                                <p:cTn id="10" presetID="10" presetClass="exit" presetSubtype="0" fill="hold" grpId="0" nodeType="clickEffect">
+                                  <p:stCondLst>
+                                    <p:cond delay="0"/>
+                                  </p:stCondLst>
+                                  <p:childTnLst>
+                                    <p:animEffect transition="out" filter="fade">
+                                      <p:cBhvr>
+                                        <p:cTn id="11" dur="500"/>
+                                        <p:tgtEl>
+                                          <p:spTgt spid="3"/>
+                                        </p:tgtEl>
+                                      </p:cBhvr>
+                                    </p:animEffect>
+                                    <p:set>
+                                      <p:cBhvr>
+                                        <p:cTn id="12" dur="1" fill="hold">
+                                          <p:stCondLst>
+                                            <p:cond delay="499"/>
+                                          </p:stCondLst>
+                                        </p:cTn>
+                                        <p:tgtEl>
+                                          <p:spTgt spid="3"/>
+                                        </p:tgtEl>
+                                        <p:attrNameLst>
+                                          <p:attrName>style.visibility</p:attrName>
+                                        </p:attrNameLst>
+                                      </p:cBhvr>
+                                      <p:to>
+                                        <p:strVal val="hidden"/>
+                                      </p:to>
+                                    </p:set>
+                                  </p:childTnLst>
+                                </p:cTn>
+                              </p:par>
+                            </p:childTnLst>
+                          </p:cTn>
+                        </p:par>
+                      </p:childTnLst>
+                    </p:cTn>
+                  </p:par>
+                  <p:par>
+                    <p:cTn id="13" fill="hold">
+                      <p:stCondLst>
+                        <p:cond delay="indefinite"/>
+                      </p:stCondLst>
+                      <p:childTnLst>
+                        <p:par>
+                          <p:cTn id="14" fill="hold">
+                            <p:stCondLst>
+                              <p:cond delay="0"/>
+                            </p:stCondLst>
+                            <p:childTnLst>
+                              <p:par>
+                                <p:cTn id="15" presetID="10" presetClass="exit" presetSubtype="0" fill="hold" grpId="0" nodeType="clickEffect">
+                                  <p:stCondLst>
+                                    <p:cond delay="0"/>
+                                  </p:stCondLst>
+                                  <p:childTnLst>
+                                    <p:animEffect transition="out" filter="fade">
+                                      <p:cBhvr>
+                                        <p:cTn id="16" dur="500"/>
+                                        <p:tgtEl>
+                                          <p:spTgt spid="5"/>
+                                        </p:tgtEl>
+                                      </p:cBhvr>
+                                    </p:animEffect>
+                                    <p:set>
+                                      <p:cBhvr>
+                                        <p:cTn id="17" dur="1" fill="hold">
+                                          <p:stCondLst>
+                                            <p:cond delay="499"/>
+                                          </p:stCondLst>
+                                        </p:cTn>
+                                        <p:tgtEl>
+                                          <p:spTgt spid="5"/>
+                                        </p:tgtEl>
+                                        <p:attrNameLst>
+                                          <p:attrName>style.visibility</p:attrName>
+                                        </p:attrNameLst>
+                                      </p:cBhvr>
+                                      <p:to>
+                                        <p:strVal val="hidden"/>
+                                      </p:to>
+                                    </p:set>
+                                  </p:childTnLst>
+                                </p:cTn>
+                              </p:par>
+                            </p:childTnLst>
+                          </p:cTn>
+                        </p:par>
+                      </p:childTnLst>
+                    </p:cTn>
+                  </p:par>
+                  <p:par>
+                    <p:cTn id="18" fill="hold">
+                      <p:stCondLst>
+                        <p:cond delay="indefinite"/>
+                      </p:stCondLst>
+                      <p:childTnLst>
+                        <p:par>
+                          <p:cTn id="19" fill="hold">
+                            <p:stCondLst>
+                              <p:cond delay="0"/>
+                            </p:stCondLst>
+                            <p:childTnLst>
+                              <p:par>
+                                <p:cTn id="20" presetID="10" presetClass="exit" presetSubtype="0" fill="hold" grpId="0" nodeType="clickEffect">
+                                  <p:stCondLst>
+                                    <p:cond delay="0"/>
+                                  </p:stCondLst>
+                                  <p:childTnLst>
+                                    <p:animEffect transition="out" filter="fade">
+                                      <p:cBhvr>
+                                        <p:cTn id="21" dur="500"/>
+                                        <p:tgtEl>
+                                          <p:spTgt spid="8"/>
+                                        </p:tgtEl>
+                                      </p:cBhvr>
+                                    </p:animEffect>
+                                    <p:set>
+                                      <p:cBhvr>
+                                        <p:cTn id="22" dur="1" fill="hold">
+                                          <p:stCondLst>
+                                            <p:cond delay="499"/>
+                                          </p:stCondLst>
+                                        </p:cTn>
+                                        <p:tgtEl>
+                                          <p:spTgt spid="8"/>
+                                        </p:tgtEl>
+                                        <p:attrNameLst>
+                                          <p:attrName>style.visibility</p:attrName>
+                                        </p:attrNameLst>
+                                      </p:cBhvr>
+                                      <p:to>
+                                        <p:strVal val="hidden"/>
+                                      </p:to>
+                                    </p:set>
+                                  </p:childTnLst>
+                                </p:cTn>
+                              </p:par>
+                            </p:childTnLst>
+                          </p:cTn>
+                        </p:par>
+                      </p:childTnLst>
+                    </p:cTn>
+                  </p:par>
+                </p:childTnLst>
+              </p:cTn>
+              <p:prevCondLst>
+                <p:cond evt="onPrev" delay="0">
+                  <p:tgtEl>
+                    <p:sldTgt/>
+                  </p:tgtEl>
+                </p:cond>
+              </p:prevCondLst>
+              <p:nextCondLst>
+                <p:cond evt="onNext" delay="0">
+                  <p:tgtEl>
+                    <p:sldTgt/>
+                  </p:tgtEl>
+                </p:cond>
+              </p:nextCondLst>
+            </p:seq>
+          </p:childTnLst>
+        </p:cTn>
       </p:par>
     </p:tnLst>
+    <p:bldLst>
+      <p:bldP spid="3" grpId="0" animBg="1"/>
+      <p:bldP spid="5" grpId="0" animBg="1"/>
+      <p:bldP spid="7" grpId="0" animBg="1"/>
+      <p:bldP spid="8" grpId="0" animBg="1"/>
+    </p:bldLst>
   </p:timing>
 </p:sld>
 </file>
@@ -17014,11 +17431,7 @@
           <a:p>
             <a:r>
               <a:rPr lang="en-US" dirty="0" smtClean="0"/>
-              <a:t>Compared to Wi-Fi </a:t>
-            </a:r>
-            <a:r>
-              <a:rPr lang="en-US" dirty="0" smtClean="0"/>
-              <a:t>lightbulbs</a:t>
+              <a:t>Compared to Wi-Fi lightbulbs</a:t>
             </a:r>
             <a:endParaRPr lang="en-US" dirty="0"/>
           </a:p>
@@ -17039,19 +17452,7 @@
           <a:p>
             <a:r>
               <a:rPr lang="en-US" dirty="0" smtClean="0"/>
-              <a:t>Compared to similar switches (such as </a:t>
-            </a:r>
-            <a:r>
-              <a:rPr lang="en-US" dirty="0" smtClean="0"/>
-              <a:t>the Belkin </a:t>
-            </a:r>
-            <a:r>
-              <a:rPr lang="en-US" dirty="0" smtClean="0"/>
-              <a:t>WeMo</a:t>
-            </a:r>
-            <a:r>
-              <a:rPr lang="en-US" dirty="0" smtClean="0"/>
-              <a:t>)</a:t>
+              <a:t>Compared to similar switches (such as the Belkin WeMo)</a:t>
             </a:r>
           </a:p>
           <a:p>

</xml_diff>